<commit_message>
Presentation template updated with custom headings and introduction data
</commit_message>
<xml_diff>
--- a/Presentation/575-ClassProject-Template.pptx
+++ b/Presentation/575-ClassProject-Template.pptx
@@ -6,14 +6,28 @@
     <p:sldMasterId id="2147483662" r:id="rId2"/>
   </p:sldMasterIdLst>
   <p:notesMasterIdLst>
-    <p:notesMasterId r:id="rId5"/>
+    <p:notesMasterId r:id="rId19"/>
   </p:notesMasterIdLst>
   <p:handoutMasterIdLst>
-    <p:handoutMasterId r:id="rId6"/>
+    <p:handoutMasterId r:id="rId20"/>
   </p:handoutMasterIdLst>
   <p:sldIdLst>
     <p:sldId id="853" r:id="rId3"/>
     <p:sldId id="852" r:id="rId4"/>
+    <p:sldId id="854" r:id="rId5"/>
+    <p:sldId id="855" r:id="rId6"/>
+    <p:sldId id="856" r:id="rId7"/>
+    <p:sldId id="857" r:id="rId8"/>
+    <p:sldId id="858" r:id="rId9"/>
+    <p:sldId id="859" r:id="rId10"/>
+    <p:sldId id="860" r:id="rId11"/>
+    <p:sldId id="861" r:id="rId12"/>
+    <p:sldId id="862" r:id="rId13"/>
+    <p:sldId id="863" r:id="rId14"/>
+    <p:sldId id="864" r:id="rId15"/>
+    <p:sldId id="865" r:id="rId16"/>
+    <p:sldId id="867" r:id="rId17"/>
+    <p:sldId id="866" r:id="rId18"/>
   </p:sldIdLst>
   <p:sldSz cx="9144000" cy="6858000" type="screen4x3"/>
   <p:notesSz cx="7315200" cy="9601200"/>
@@ -164,11 +178,7 @@
 <file path=ppt/commentAuthors.xml><?xml version="1.0" encoding="utf-8"?>
 <p:cmAuthorLst xmlns:a="http://schemas.openxmlformats.org/drawingml/2006/main" xmlns:r="http://schemas.openxmlformats.org/officeDocument/2006/relationships" xmlns:p="http://schemas.openxmlformats.org/presentationml/2006/main">
   <p:cmAuthor id="1" name="Jae-sun Seo" initials="JS" lastIdx="1" clrIdx="0">
-    <p:extLst>
-      <p:ext uri="{19B8F6BF-5375-455C-9EA6-DF929625EA0E}">
-        <p15:presenceInfo xmlns:p15="http://schemas.microsoft.com/office/powerpoint/2012/main" userId="S-1-5-21-1864253520-1647712531-16515117-244771" providerId="AD"/>
-      </p:ext>
-    </p:extLst>
+    <p:extLst/>
   </p:cmAuthor>
 </p:cmAuthorLst>
 </file>
@@ -256,7 +266,7 @@
             <a:fld id="{44798C35-8A6C-4669-B8EE-A35EDDA7209F}" type="datetimeFigureOut">
               <a:rPr lang="en-US" smtClean="0"/>
               <a:pPr/>
-              <a:t>4/7/2016</a:t>
+              <a:t>4/11/17</a:t>
             </a:fld>
             <a:endParaRPr lang="en-US"/>
           </a:p>
@@ -6922,7 +6932,7 @@
         </p:nvSpPr>
         <p:spPr>
           <a:xfrm>
-            <a:off x="0" y="1577975"/>
+            <a:off x="0" y="498763"/>
             <a:ext cx="9144000" cy="1470025"/>
           </a:xfrm>
           <a:ln>
@@ -6978,14 +6988,24 @@
               </a:rPr>
             </a:br>
             <a:r>
-              <a:rPr lang="en-US" sz="5000" b="0" dirty="0" smtClean="0">
+              <a:rPr lang="en-US" sz="5000" b="0" smtClean="0">
                 <a:solidFill>
                   <a:srgbClr val="C00000"/>
                 </a:solidFill>
                 <a:latin typeface="Calibri"/>
                 <a:cs typeface="Calibri"/>
               </a:rPr>
-              <a:t>Project Title: </a:t>
+              <a:t>Weather </a:t>
+            </a:r>
+            <a:r>
+              <a:rPr lang="en-US" sz="5000" b="0" smtClean="0">
+                <a:solidFill>
+                  <a:srgbClr val="C00000"/>
+                </a:solidFill>
+                <a:latin typeface="Calibri"/>
+                <a:cs typeface="Calibri"/>
+              </a:rPr>
+              <a:t>Forecasting </a:t>
             </a:r>
             <a:endParaRPr lang="en-US" sz="5000" b="0" dirty="0">
               <a:solidFill>
@@ -7009,47 +7029,270 @@
         </p:nvSpPr>
         <p:spPr>
           <a:xfrm>
-            <a:off x="1752100" y="3886200"/>
-            <a:ext cx="5689600" cy="1752600"/>
+            <a:off x="1089796" y="2968066"/>
+            <a:ext cx="6964407" cy="2106209"/>
           </a:xfrm>
         </p:spPr>
         <p:txBody>
           <a:bodyPr/>
           <a:lstStyle/>
           <a:p>
-            <a:pPr algn="ctr"/>
             <a:r>
               <a:rPr lang="en-US" sz="2000" dirty="0" smtClean="0"/>
-              <a:t>Team Members (For each member, list (1) name, (2) </a:t>
-            </a:r>
-            <a:r>
-              <a:rPr lang="en-US" sz="2000" dirty="0" err="1" smtClean="0"/>
-              <a:t>asu</a:t>
-            </a:r>
-            <a:r>
-              <a:rPr lang="en-US" sz="2000" dirty="0" smtClean="0"/>
-              <a:t> id, (3) emails and (4) contribution in </a:t>
-            </a:r>
-            <a:r>
-              <a:rPr lang="en-US" sz="2000" dirty="0" smtClean="0"/>
-              <a:t>terms of </a:t>
-            </a:r>
-            <a:r>
-              <a:rPr lang="en-US" sz="2000" dirty="0" smtClean="0"/>
-              <a:t>percentage</a:t>
-            </a:r>
+              <a:t>Team Members:</a:t>
+            </a:r>
+          </a:p>
+          <a:p>
+            <a:pPr marL="342900" indent="-342900">
+              <a:buFont typeface="+mj-lt"/>
+              <a:buAutoNum type="arabicPeriod"/>
+            </a:pPr>
+            <a:r>
+              <a:rPr lang="hr-HR" sz="1400" dirty="0" err="1"/>
+              <a:t>Balaji</a:t>
+            </a:r>
+            <a:r>
+              <a:rPr lang="hr-HR" sz="1400" dirty="0"/>
+              <a:t> </a:t>
+            </a:r>
+            <a:r>
+              <a:rPr lang="hr-HR" sz="1400" dirty="0" err="1" smtClean="0"/>
+              <a:t>Sankar</a:t>
+            </a:r>
+            <a:r>
+              <a:rPr lang="hr-HR" sz="1400" dirty="0" smtClean="0"/>
+              <a:t> </a:t>
+            </a:r>
+            <a:r>
+              <a:rPr lang="mr-IN" sz="1400" dirty="0" smtClean="0"/>
+              <a:t>–</a:t>
+            </a:r>
+            <a:r>
+              <a:rPr lang="hr-HR" sz="1400" dirty="0" smtClean="0"/>
+              <a:t> 1209346459 </a:t>
+            </a:r>
+            <a:r>
+              <a:rPr lang="en-US" sz="1400" dirty="0"/>
+              <a:t>- </a:t>
+            </a:r>
+            <a:r>
+              <a:rPr lang="en-US" sz="1400" dirty="0" smtClean="0">
+                <a:hlinkClick r:id="rId3"/>
+              </a:rPr>
+              <a:t>bsankar@asu.edu</a:t>
+            </a:r>
+            <a:r>
+              <a:rPr lang="en-US" sz="1400" dirty="0" smtClean="0"/>
+              <a:t> </a:t>
+            </a:r>
+            <a:r>
+              <a:rPr lang="mr-IN" sz="1400" dirty="0"/>
+              <a:t>–</a:t>
+            </a:r>
+            <a:r>
+              <a:rPr lang="en-US" sz="1400" dirty="0"/>
+              <a:t> 20% contribution</a:t>
+            </a:r>
+            <a:endParaRPr lang="hr-HR" sz="1400" dirty="0" smtClean="0"/>
+          </a:p>
+          <a:p>
+            <a:pPr marL="342900" indent="-342900">
+              <a:buFont typeface="+mj-lt"/>
+              <a:buAutoNum type="arabicPeriod"/>
+            </a:pPr>
+            <a:r>
+              <a:rPr lang="en-US" sz="1400" dirty="0" err="1" smtClean="0"/>
+              <a:t>Karthik</a:t>
+            </a:r>
+            <a:r>
+              <a:rPr lang="en-US" sz="1400" dirty="0" smtClean="0"/>
+              <a:t> Subramanian </a:t>
+            </a:r>
+            <a:r>
+              <a:rPr lang="mr-IN" sz="1400" dirty="0" smtClean="0"/>
+              <a:t>–</a:t>
+            </a:r>
+            <a:r>
+              <a:rPr lang="en-US" sz="1400" dirty="0" smtClean="0"/>
+              <a:t> 1209360876 </a:t>
+            </a:r>
+            <a:r>
+              <a:rPr lang="en-US" sz="1400" dirty="0"/>
+              <a:t>- </a:t>
+            </a:r>
+            <a:r>
+              <a:rPr lang="en-US" sz="1400" dirty="0" smtClean="0">
+                <a:hlinkClick r:id="rId4"/>
+              </a:rPr>
+              <a:t>ksubra19@asu.edu</a:t>
+            </a:r>
+            <a:r>
+              <a:rPr lang="en-US" sz="1400" dirty="0" smtClean="0"/>
+              <a:t> </a:t>
+            </a:r>
+            <a:r>
+              <a:rPr lang="mr-IN" sz="1400" dirty="0"/>
+              <a:t>–</a:t>
+            </a:r>
+            <a:r>
+              <a:rPr lang="en-US" sz="1400" dirty="0"/>
+              <a:t> 20% contribution</a:t>
+            </a:r>
+            <a:endParaRPr lang="en-US" sz="1400" dirty="0" smtClean="0"/>
+          </a:p>
+          <a:p>
+            <a:pPr marL="342900" indent="-342900">
+              <a:buFont typeface="+mj-lt"/>
+              <a:buAutoNum type="arabicPeriod"/>
+            </a:pPr>
+            <a:r>
+              <a:rPr lang="en-US" sz="1400" dirty="0" err="1" smtClean="0"/>
+              <a:t>Aarti</a:t>
+            </a:r>
+            <a:r>
+              <a:rPr lang="en-US" sz="1400" dirty="0" smtClean="0"/>
+              <a:t> </a:t>
+            </a:r>
+            <a:r>
+              <a:rPr lang="en-US" sz="1400" dirty="0"/>
+              <a:t>Rao </a:t>
+            </a:r>
+            <a:r>
+              <a:rPr lang="en-US" sz="1400" dirty="0" err="1"/>
+              <a:t>Manjeshwar</a:t>
+            </a:r>
+            <a:r>
+              <a:rPr lang="en-US" sz="1400" dirty="0"/>
+              <a:t> </a:t>
+            </a:r>
+            <a:r>
+              <a:rPr lang="mr-IN" sz="1400" dirty="0" smtClean="0"/>
+              <a:t>–</a:t>
+            </a:r>
+            <a:r>
+              <a:rPr lang="en-US" sz="1400" dirty="0" smtClean="0"/>
+              <a:t> 1209163211 -</a:t>
+            </a:r>
+            <a:r>
+              <a:rPr lang="en-US" sz="1400" dirty="0"/>
+              <a:t> </a:t>
+            </a:r>
+            <a:r>
+              <a:rPr lang="en-US" sz="1400" dirty="0" smtClean="0">
+                <a:hlinkClick r:id="rId5"/>
+              </a:rPr>
+              <a:t>amanjesh@asu.edu</a:t>
+            </a:r>
+            <a:r>
+              <a:rPr lang="en-US" sz="1400" dirty="0" smtClean="0"/>
+              <a:t> </a:t>
+            </a:r>
+            <a:r>
+              <a:rPr lang="mr-IN" sz="1400" dirty="0" smtClean="0"/>
+              <a:t>–</a:t>
+            </a:r>
+            <a:r>
+              <a:rPr lang="en-US" sz="1400" dirty="0" smtClean="0"/>
+              <a:t> </a:t>
+            </a:r>
+            <a:r>
+              <a:rPr lang="en-US" sz="1400" dirty="0"/>
+              <a:t>20% contribution</a:t>
+            </a:r>
+            <a:endParaRPr lang="en-US" sz="1400" dirty="0" smtClean="0"/>
+          </a:p>
+          <a:p>
+            <a:pPr marL="342900" indent="-342900">
+              <a:buFont typeface="+mj-lt"/>
+              <a:buAutoNum type="arabicPeriod"/>
+            </a:pPr>
+            <a:r>
+              <a:rPr lang="en-US" sz="1400" dirty="0" err="1"/>
+              <a:t>Shwetha</a:t>
+            </a:r>
+            <a:r>
+              <a:rPr lang="en-US" sz="1400" dirty="0"/>
+              <a:t> Narayanan </a:t>
+            </a:r>
+            <a:r>
+              <a:rPr lang="mr-IN" sz="1400" dirty="0" smtClean="0"/>
+              <a:t>–</a:t>
+            </a:r>
+            <a:r>
+              <a:rPr lang="en-US" sz="1400" dirty="0" smtClean="0"/>
+              <a:t> 1209166097 </a:t>
+            </a:r>
+            <a:r>
+              <a:rPr lang="en-US" sz="1400" dirty="0"/>
+              <a:t>- </a:t>
+            </a:r>
+            <a:r>
+              <a:rPr lang="en-US" sz="1400" dirty="0" smtClean="0">
+                <a:hlinkClick r:id="rId6"/>
+              </a:rPr>
+              <a:t>snaray36@asu.edu</a:t>
+            </a:r>
+            <a:r>
+              <a:rPr lang="en-US" sz="1400" dirty="0" smtClean="0"/>
+              <a:t> </a:t>
+            </a:r>
+            <a:r>
+              <a:rPr lang="mr-IN" sz="1400" dirty="0" smtClean="0"/>
+              <a:t>–</a:t>
+            </a:r>
+            <a:r>
+              <a:rPr lang="en-US" sz="1400" dirty="0" smtClean="0"/>
+              <a:t> 20% contribution</a:t>
+            </a:r>
+          </a:p>
+          <a:p>
+            <a:pPr marL="342900" indent="-342900">
+              <a:buFont typeface="+mj-lt"/>
+              <a:buAutoNum type="arabicPeriod"/>
+            </a:pPr>
+            <a:r>
+              <a:rPr lang="en-US" sz="1400" dirty="0" smtClean="0"/>
+              <a:t>Ramanathan </a:t>
+            </a:r>
+            <a:r>
+              <a:rPr lang="en-US" sz="1400" dirty="0" smtClean="0"/>
+              <a:t>Nachiappan </a:t>
+            </a:r>
+            <a:r>
+              <a:rPr lang="mr-IN" sz="1400" dirty="0" smtClean="0"/>
+              <a:t>–</a:t>
+            </a:r>
+            <a:r>
+              <a:rPr lang="en-US" sz="1400" dirty="0" smtClean="0"/>
+              <a:t> 1210822532 </a:t>
+            </a:r>
+            <a:r>
+              <a:rPr lang="mr-IN" sz="1400" dirty="0" smtClean="0"/>
+              <a:t>–</a:t>
+            </a:r>
+            <a:r>
+              <a:rPr lang="en-US" sz="1400" dirty="0" smtClean="0"/>
+              <a:t> </a:t>
+            </a:r>
+            <a:r>
+              <a:rPr lang="en-US" sz="1400" dirty="0" smtClean="0">
+                <a:hlinkClick r:id="rId7"/>
+              </a:rPr>
+              <a:t>rnachiap@asu.edu</a:t>
+            </a:r>
+            <a:r>
+              <a:rPr lang="en-US" sz="1400" dirty="0" smtClean="0"/>
+              <a:t> - 20% contribution</a:t>
+            </a:r>
+            <a:endParaRPr lang="en-US" sz="1400" dirty="0" smtClean="0"/>
+          </a:p>
+          <a:p>
             <a:endParaRPr lang="en-US" altLang="zh-CN" sz="1600" dirty="0" smtClean="0"/>
           </a:p>
           <a:p>
-            <a:pPr algn="ctr"/>
             <a:endParaRPr lang="en-US" altLang="zh-CN" sz="1600" dirty="0" smtClean="0"/>
           </a:p>
           <a:p>
-            <a:pPr algn="ctr"/>
-            <a:endParaRPr lang="en-US" altLang="zh-CN" sz="1600" dirty="0" smtClean="0"/>
-          </a:p>
-          <a:p>
-            <a:pPr algn="ctr"/>
             <a:endParaRPr lang="en-US" sz="2000" dirty="0"/>
           </a:p>
         </p:txBody>
@@ -7116,6 +7359,1227 @@
 </p:sld>
 </file>
 
+<file path=ppt/slides/slide10.xml><?xml version="1.0" encoding="utf-8"?>
+<p:sld xmlns:a="http://schemas.openxmlformats.org/drawingml/2006/main" xmlns:r="http://schemas.openxmlformats.org/officeDocument/2006/relationships" xmlns:p="http://schemas.openxmlformats.org/presentationml/2006/main">
+  <p:cSld>
+    <p:spTree>
+      <p:nvGrpSpPr>
+        <p:cNvPr id="1" name=""/>
+        <p:cNvGrpSpPr/>
+        <p:nvPr/>
+      </p:nvGrpSpPr>
+      <p:grpSpPr>
+        <a:xfrm>
+          <a:off x="0" y="0"/>
+          <a:ext cx="0" cy="0"/>
+          <a:chOff x="0" y="0"/>
+          <a:chExt cx="0" cy="0"/>
+        </a:xfrm>
+      </p:grpSpPr>
+      <p:sp>
+        <p:nvSpPr>
+          <p:cNvPr id="2" name="Title 1"/>
+          <p:cNvSpPr>
+            <a:spLocks noGrp="1"/>
+          </p:cNvSpPr>
+          <p:nvPr>
+            <p:ph type="title"/>
+          </p:nvPr>
+        </p:nvSpPr>
+        <p:spPr/>
+        <p:txBody>
+          <a:bodyPr/>
+          <a:lstStyle/>
+          <a:p>
+            <a:r>
+              <a:rPr lang="en-US" dirty="0" smtClean="0"/>
+              <a:t>K-Means Clusterin</a:t>
+            </a:r>
+            <a:r>
+              <a:rPr lang="en-US" dirty="0"/>
+              <a:t>g</a:t>
+            </a:r>
+          </a:p>
+        </p:txBody>
+      </p:sp>
+      <p:sp>
+        <p:nvSpPr>
+          <p:cNvPr id="3" name="Content Placeholder 2"/>
+          <p:cNvSpPr>
+            <a:spLocks noGrp="1"/>
+          </p:cNvSpPr>
+          <p:nvPr>
+            <p:ph idx="1"/>
+          </p:nvPr>
+        </p:nvSpPr>
+        <p:spPr/>
+        <p:txBody>
+          <a:bodyPr/>
+          <a:lstStyle/>
+          <a:p>
+            <a:endParaRPr lang="en-US"/>
+          </a:p>
+        </p:txBody>
+      </p:sp>
+      <p:sp>
+        <p:nvSpPr>
+          <p:cNvPr id="4" name="Slide Number Placeholder 3"/>
+          <p:cNvSpPr>
+            <a:spLocks noGrp="1"/>
+          </p:cNvSpPr>
+          <p:nvPr>
+            <p:ph type="sldNum" sz="quarter" idx="4"/>
+          </p:nvPr>
+        </p:nvSpPr>
+        <p:spPr/>
+        <p:txBody>
+          <a:bodyPr/>
+          <a:lstStyle/>
+          <a:p>
+            <a:pPr>
+              <a:defRPr/>
+            </a:pPr>
+            <a:r>
+              <a:rPr lang="en-US" smtClean="0"/>
+              <a:t>- </a:t>
+            </a:r>
+            <a:fld id="{5702A24C-C4CD-4510-A1DD-CEB556D2535A}" type="slidenum">
+              <a:rPr lang="en-US" smtClean="0"/>
+              <a:pPr>
+                <a:defRPr/>
+              </a:pPr>
+              <a:t>10</a:t>
+            </a:fld>
+            <a:r>
+              <a:rPr lang="en-US" smtClean="0"/>
+              <a:t> -</a:t>
+            </a:r>
+            <a:endParaRPr lang="en-US"/>
+          </a:p>
+        </p:txBody>
+      </p:sp>
+    </p:spTree>
+    <p:extLst>
+      <p:ext uri="{BB962C8B-B14F-4D97-AF65-F5344CB8AC3E}">
+        <p14:creationId xmlns:p14="http://schemas.microsoft.com/office/powerpoint/2010/main" val="1635773753"/>
+      </p:ext>
+    </p:extLst>
+  </p:cSld>
+  <p:clrMapOvr>
+    <a:masterClrMapping/>
+  </p:clrMapOvr>
+</p:sld>
+</file>
+
+<file path=ppt/slides/slide11.xml><?xml version="1.0" encoding="utf-8"?>
+<p:sld xmlns:a="http://schemas.openxmlformats.org/drawingml/2006/main" xmlns:r="http://schemas.openxmlformats.org/officeDocument/2006/relationships" xmlns:p="http://schemas.openxmlformats.org/presentationml/2006/main">
+  <p:cSld>
+    <p:spTree>
+      <p:nvGrpSpPr>
+        <p:cNvPr id="1" name=""/>
+        <p:cNvGrpSpPr/>
+        <p:nvPr/>
+      </p:nvGrpSpPr>
+      <p:grpSpPr>
+        <a:xfrm>
+          <a:off x="0" y="0"/>
+          <a:ext cx="0" cy="0"/>
+          <a:chOff x="0" y="0"/>
+          <a:chExt cx="0" cy="0"/>
+        </a:xfrm>
+      </p:grpSpPr>
+      <p:sp>
+        <p:nvSpPr>
+          <p:cNvPr id="2" name="Title 1"/>
+          <p:cNvSpPr>
+            <a:spLocks noGrp="1"/>
+          </p:cNvSpPr>
+          <p:nvPr>
+            <p:ph type="title"/>
+          </p:nvPr>
+        </p:nvSpPr>
+        <p:spPr/>
+        <p:txBody>
+          <a:bodyPr/>
+          <a:lstStyle/>
+          <a:p>
+            <a:r>
+              <a:rPr lang="en-US" dirty="0" smtClean="0"/>
+              <a:t>Time Series Linear Modeling</a:t>
+            </a:r>
+            <a:endParaRPr lang="en-US" dirty="0"/>
+          </a:p>
+        </p:txBody>
+      </p:sp>
+      <p:sp>
+        <p:nvSpPr>
+          <p:cNvPr id="3" name="Content Placeholder 2"/>
+          <p:cNvSpPr>
+            <a:spLocks noGrp="1"/>
+          </p:cNvSpPr>
+          <p:nvPr>
+            <p:ph idx="1"/>
+          </p:nvPr>
+        </p:nvSpPr>
+        <p:spPr/>
+        <p:txBody>
+          <a:bodyPr/>
+          <a:lstStyle/>
+          <a:p>
+            <a:endParaRPr lang="en-US"/>
+          </a:p>
+        </p:txBody>
+      </p:sp>
+      <p:sp>
+        <p:nvSpPr>
+          <p:cNvPr id="4" name="Slide Number Placeholder 3"/>
+          <p:cNvSpPr>
+            <a:spLocks noGrp="1"/>
+          </p:cNvSpPr>
+          <p:nvPr>
+            <p:ph type="sldNum" sz="quarter" idx="4"/>
+          </p:nvPr>
+        </p:nvSpPr>
+        <p:spPr/>
+        <p:txBody>
+          <a:bodyPr/>
+          <a:lstStyle/>
+          <a:p>
+            <a:pPr>
+              <a:defRPr/>
+            </a:pPr>
+            <a:r>
+              <a:rPr lang="en-US" smtClean="0"/>
+              <a:t>- </a:t>
+            </a:r>
+            <a:fld id="{5702A24C-C4CD-4510-A1DD-CEB556D2535A}" type="slidenum">
+              <a:rPr lang="en-US" smtClean="0"/>
+              <a:pPr>
+                <a:defRPr/>
+              </a:pPr>
+              <a:t>11</a:t>
+            </a:fld>
+            <a:r>
+              <a:rPr lang="en-US" smtClean="0"/>
+              <a:t> -</a:t>
+            </a:r>
+            <a:endParaRPr lang="en-US"/>
+          </a:p>
+        </p:txBody>
+      </p:sp>
+    </p:spTree>
+    <p:extLst>
+      <p:ext uri="{BB962C8B-B14F-4D97-AF65-F5344CB8AC3E}">
+        <p14:creationId xmlns:p14="http://schemas.microsoft.com/office/powerpoint/2010/main" val="411675073"/>
+      </p:ext>
+    </p:extLst>
+  </p:cSld>
+  <p:clrMapOvr>
+    <a:masterClrMapping/>
+  </p:clrMapOvr>
+</p:sld>
+</file>
+
+<file path=ppt/slides/slide12.xml><?xml version="1.0" encoding="utf-8"?>
+<p:sld xmlns:a="http://schemas.openxmlformats.org/drawingml/2006/main" xmlns:r="http://schemas.openxmlformats.org/officeDocument/2006/relationships" xmlns:p="http://schemas.openxmlformats.org/presentationml/2006/main">
+  <p:cSld>
+    <p:spTree>
+      <p:nvGrpSpPr>
+        <p:cNvPr id="1" name=""/>
+        <p:cNvGrpSpPr/>
+        <p:nvPr/>
+      </p:nvGrpSpPr>
+      <p:grpSpPr>
+        <a:xfrm>
+          <a:off x="0" y="0"/>
+          <a:ext cx="0" cy="0"/>
+          <a:chOff x="0" y="0"/>
+          <a:chExt cx="0" cy="0"/>
+        </a:xfrm>
+      </p:grpSpPr>
+      <p:sp>
+        <p:nvSpPr>
+          <p:cNvPr id="2" name="Title 1"/>
+          <p:cNvSpPr>
+            <a:spLocks noGrp="1"/>
+          </p:cNvSpPr>
+          <p:nvPr>
+            <p:ph type="title"/>
+          </p:nvPr>
+        </p:nvSpPr>
+        <p:spPr/>
+        <p:txBody>
+          <a:bodyPr/>
+          <a:lstStyle/>
+          <a:p>
+            <a:r>
+              <a:rPr lang="en-US" dirty="0" smtClean="0"/>
+              <a:t>Experiments</a:t>
+            </a:r>
+            <a:endParaRPr lang="en-US" dirty="0"/>
+          </a:p>
+        </p:txBody>
+      </p:sp>
+      <p:sp>
+        <p:nvSpPr>
+          <p:cNvPr id="3" name="Content Placeholder 2"/>
+          <p:cNvSpPr>
+            <a:spLocks noGrp="1"/>
+          </p:cNvSpPr>
+          <p:nvPr>
+            <p:ph idx="1"/>
+          </p:nvPr>
+        </p:nvSpPr>
+        <p:spPr/>
+        <p:txBody>
+          <a:bodyPr/>
+          <a:lstStyle/>
+          <a:p>
+            <a:endParaRPr lang="en-US"/>
+          </a:p>
+        </p:txBody>
+      </p:sp>
+      <p:sp>
+        <p:nvSpPr>
+          <p:cNvPr id="4" name="Slide Number Placeholder 3"/>
+          <p:cNvSpPr>
+            <a:spLocks noGrp="1"/>
+          </p:cNvSpPr>
+          <p:nvPr>
+            <p:ph type="sldNum" sz="quarter" idx="4"/>
+          </p:nvPr>
+        </p:nvSpPr>
+        <p:spPr/>
+        <p:txBody>
+          <a:bodyPr/>
+          <a:lstStyle/>
+          <a:p>
+            <a:pPr>
+              <a:defRPr/>
+            </a:pPr>
+            <a:r>
+              <a:rPr lang="en-US" smtClean="0"/>
+              <a:t>- </a:t>
+            </a:r>
+            <a:fld id="{5702A24C-C4CD-4510-A1DD-CEB556D2535A}" type="slidenum">
+              <a:rPr lang="en-US" smtClean="0"/>
+              <a:pPr>
+                <a:defRPr/>
+              </a:pPr>
+              <a:t>12</a:t>
+            </a:fld>
+            <a:r>
+              <a:rPr lang="en-US" smtClean="0"/>
+              <a:t> -</a:t>
+            </a:r>
+            <a:endParaRPr lang="en-US"/>
+          </a:p>
+        </p:txBody>
+      </p:sp>
+    </p:spTree>
+    <p:extLst>
+      <p:ext uri="{BB962C8B-B14F-4D97-AF65-F5344CB8AC3E}">
+        <p14:creationId xmlns:p14="http://schemas.microsoft.com/office/powerpoint/2010/main" val="741420163"/>
+      </p:ext>
+    </p:extLst>
+  </p:cSld>
+  <p:clrMapOvr>
+    <a:masterClrMapping/>
+  </p:clrMapOvr>
+</p:sld>
+</file>
+
+<file path=ppt/slides/slide13.xml><?xml version="1.0" encoding="utf-8"?>
+<p:sld xmlns:a="http://schemas.openxmlformats.org/drawingml/2006/main" xmlns:r="http://schemas.openxmlformats.org/officeDocument/2006/relationships" xmlns:p="http://schemas.openxmlformats.org/presentationml/2006/main">
+  <p:cSld>
+    <p:spTree>
+      <p:nvGrpSpPr>
+        <p:cNvPr id="1" name=""/>
+        <p:cNvGrpSpPr/>
+        <p:nvPr/>
+      </p:nvGrpSpPr>
+      <p:grpSpPr>
+        <a:xfrm>
+          <a:off x="0" y="0"/>
+          <a:ext cx="0" cy="0"/>
+          <a:chOff x="0" y="0"/>
+          <a:chExt cx="0" cy="0"/>
+        </a:xfrm>
+      </p:grpSpPr>
+      <p:sp>
+        <p:nvSpPr>
+          <p:cNvPr id="2" name="Title 1"/>
+          <p:cNvSpPr>
+            <a:spLocks noGrp="1"/>
+          </p:cNvSpPr>
+          <p:nvPr>
+            <p:ph type="title"/>
+          </p:nvPr>
+        </p:nvSpPr>
+        <p:spPr/>
+        <p:txBody>
+          <a:bodyPr/>
+          <a:lstStyle/>
+          <a:p>
+            <a:r>
+              <a:rPr lang="en-US" dirty="0" smtClean="0"/>
+              <a:t>Results</a:t>
+            </a:r>
+            <a:endParaRPr lang="en-US" dirty="0"/>
+          </a:p>
+        </p:txBody>
+      </p:sp>
+      <p:sp>
+        <p:nvSpPr>
+          <p:cNvPr id="3" name="Content Placeholder 2"/>
+          <p:cNvSpPr>
+            <a:spLocks noGrp="1"/>
+          </p:cNvSpPr>
+          <p:nvPr>
+            <p:ph idx="1"/>
+          </p:nvPr>
+        </p:nvSpPr>
+        <p:spPr/>
+        <p:txBody>
+          <a:bodyPr/>
+          <a:lstStyle/>
+          <a:p>
+            <a:endParaRPr lang="en-US"/>
+          </a:p>
+        </p:txBody>
+      </p:sp>
+      <p:sp>
+        <p:nvSpPr>
+          <p:cNvPr id="4" name="Slide Number Placeholder 3"/>
+          <p:cNvSpPr>
+            <a:spLocks noGrp="1"/>
+          </p:cNvSpPr>
+          <p:nvPr>
+            <p:ph type="sldNum" sz="quarter" idx="4"/>
+          </p:nvPr>
+        </p:nvSpPr>
+        <p:spPr/>
+        <p:txBody>
+          <a:bodyPr/>
+          <a:lstStyle/>
+          <a:p>
+            <a:pPr>
+              <a:defRPr/>
+            </a:pPr>
+            <a:r>
+              <a:rPr lang="en-US" smtClean="0"/>
+              <a:t>- </a:t>
+            </a:r>
+            <a:fld id="{5702A24C-C4CD-4510-A1DD-CEB556D2535A}" type="slidenum">
+              <a:rPr lang="en-US" smtClean="0"/>
+              <a:pPr>
+                <a:defRPr/>
+              </a:pPr>
+              <a:t>13</a:t>
+            </a:fld>
+            <a:r>
+              <a:rPr lang="en-US" smtClean="0"/>
+              <a:t> -</a:t>
+            </a:r>
+            <a:endParaRPr lang="en-US"/>
+          </a:p>
+        </p:txBody>
+      </p:sp>
+    </p:spTree>
+    <p:extLst>
+      <p:ext uri="{BB962C8B-B14F-4D97-AF65-F5344CB8AC3E}">
+        <p14:creationId xmlns:p14="http://schemas.microsoft.com/office/powerpoint/2010/main" val="635111409"/>
+      </p:ext>
+    </p:extLst>
+  </p:cSld>
+  <p:clrMapOvr>
+    <a:masterClrMapping/>
+  </p:clrMapOvr>
+</p:sld>
+</file>
+
+<file path=ppt/slides/slide14.xml><?xml version="1.0" encoding="utf-8"?>
+<p:sld xmlns:a="http://schemas.openxmlformats.org/drawingml/2006/main" xmlns:r="http://schemas.openxmlformats.org/officeDocument/2006/relationships" xmlns:p="http://schemas.openxmlformats.org/presentationml/2006/main">
+  <p:cSld>
+    <p:spTree>
+      <p:nvGrpSpPr>
+        <p:cNvPr id="1" name=""/>
+        <p:cNvGrpSpPr/>
+        <p:nvPr/>
+      </p:nvGrpSpPr>
+      <p:grpSpPr>
+        <a:xfrm>
+          <a:off x="0" y="0"/>
+          <a:ext cx="0" cy="0"/>
+          <a:chOff x="0" y="0"/>
+          <a:chExt cx="0" cy="0"/>
+        </a:xfrm>
+      </p:grpSpPr>
+      <p:sp>
+        <p:nvSpPr>
+          <p:cNvPr id="2" name="Title 1"/>
+          <p:cNvSpPr>
+            <a:spLocks noGrp="1"/>
+          </p:cNvSpPr>
+          <p:nvPr>
+            <p:ph type="title"/>
+          </p:nvPr>
+        </p:nvSpPr>
+        <p:spPr/>
+        <p:txBody>
+          <a:bodyPr/>
+          <a:lstStyle/>
+          <a:p>
+            <a:r>
+              <a:rPr lang="en-US" dirty="0" smtClean="0"/>
+              <a:t>Future Prospects</a:t>
+            </a:r>
+            <a:endParaRPr lang="en-US" dirty="0"/>
+          </a:p>
+        </p:txBody>
+      </p:sp>
+      <p:sp>
+        <p:nvSpPr>
+          <p:cNvPr id="3" name="Content Placeholder 2"/>
+          <p:cNvSpPr>
+            <a:spLocks noGrp="1"/>
+          </p:cNvSpPr>
+          <p:nvPr>
+            <p:ph idx="1"/>
+          </p:nvPr>
+        </p:nvSpPr>
+        <p:spPr/>
+        <p:txBody>
+          <a:bodyPr/>
+          <a:lstStyle/>
+          <a:p>
+            <a:endParaRPr lang="en-US"/>
+          </a:p>
+        </p:txBody>
+      </p:sp>
+      <p:sp>
+        <p:nvSpPr>
+          <p:cNvPr id="4" name="Slide Number Placeholder 3"/>
+          <p:cNvSpPr>
+            <a:spLocks noGrp="1"/>
+          </p:cNvSpPr>
+          <p:nvPr>
+            <p:ph type="sldNum" sz="quarter" idx="4"/>
+          </p:nvPr>
+        </p:nvSpPr>
+        <p:spPr/>
+        <p:txBody>
+          <a:bodyPr/>
+          <a:lstStyle/>
+          <a:p>
+            <a:pPr>
+              <a:defRPr/>
+            </a:pPr>
+            <a:r>
+              <a:rPr lang="en-US" dirty="0" smtClean="0"/>
+              <a:t>- </a:t>
+            </a:r>
+            <a:fld id="{5702A24C-C4CD-4510-A1DD-CEB556D2535A}" type="slidenum">
+              <a:rPr lang="en-US" smtClean="0"/>
+              <a:pPr>
+                <a:defRPr/>
+              </a:pPr>
+              <a:t>14</a:t>
+            </a:fld>
+            <a:r>
+              <a:rPr lang="en-US" dirty="0" smtClean="0"/>
+              <a:t> -</a:t>
+            </a:r>
+            <a:endParaRPr lang="en-US" dirty="0"/>
+          </a:p>
+        </p:txBody>
+      </p:sp>
+      <p:sp>
+        <p:nvSpPr>
+          <p:cNvPr id="5" name="Rectangle 4"/>
+          <p:cNvSpPr/>
+          <p:nvPr/>
+        </p:nvSpPr>
+        <p:spPr>
+          <a:xfrm>
+            <a:off x="2116808" y="6136769"/>
+            <a:ext cx="7027192" cy="253916"/>
+          </a:xfrm>
+          <a:prstGeom prst="rect">
+            <a:avLst/>
+          </a:prstGeom>
+        </p:spPr>
+        <p:txBody>
+          <a:bodyPr wrap="square">
+            <a:spAutoFit/>
+          </a:bodyPr>
+          <a:lstStyle/>
+          <a:p>
+            <a:r>
+              <a:rPr lang="en-US" sz="1050" smtClean="0">
+                <a:latin typeface="Times" charset="0"/>
+                <a:ea typeface="Times" charset="0"/>
+                <a:cs typeface="Times" charset="0"/>
+              </a:rPr>
+              <a:t>“All </a:t>
+            </a:r>
+            <a:r>
+              <a:rPr lang="en-US" sz="1050" dirty="0">
+                <a:latin typeface="Times" charset="0"/>
+                <a:ea typeface="Times" charset="0"/>
+                <a:cs typeface="Times" charset="0"/>
+              </a:rPr>
+              <a:t>the team members agree on the team members’ contributions in terms of both (a) what s/he did and (b) </a:t>
+            </a:r>
+            <a:r>
+              <a:rPr lang="en-US" sz="1050">
+                <a:latin typeface="Times" charset="0"/>
+                <a:ea typeface="Times" charset="0"/>
+                <a:cs typeface="Times" charset="0"/>
+              </a:rPr>
+              <a:t>the </a:t>
+            </a:r>
+            <a:r>
+              <a:rPr lang="en-US" sz="1050" smtClean="0">
+                <a:latin typeface="Times" charset="0"/>
+                <a:ea typeface="Times" charset="0"/>
+                <a:cs typeface="Times" charset="0"/>
+              </a:rPr>
+              <a:t>percentage”</a:t>
+            </a:r>
+            <a:endParaRPr lang="en-US" sz="1050" dirty="0">
+              <a:effectLst/>
+              <a:latin typeface="Times" charset="0"/>
+              <a:ea typeface="Times" charset="0"/>
+              <a:cs typeface="Times" charset="0"/>
+            </a:endParaRPr>
+          </a:p>
+        </p:txBody>
+      </p:sp>
+    </p:spTree>
+    <p:extLst>
+      <p:ext uri="{BB962C8B-B14F-4D97-AF65-F5344CB8AC3E}">
+        <p14:creationId xmlns:p14="http://schemas.microsoft.com/office/powerpoint/2010/main" val="1689286747"/>
+      </p:ext>
+    </p:extLst>
+  </p:cSld>
+  <p:clrMapOvr>
+    <a:masterClrMapping/>
+  </p:clrMapOvr>
+</p:sld>
+</file>
+
+<file path=ppt/slides/slide15.xml><?xml version="1.0" encoding="utf-8"?>
+<p:sld xmlns:a="http://schemas.openxmlformats.org/drawingml/2006/main" xmlns:r="http://schemas.openxmlformats.org/officeDocument/2006/relationships" xmlns:p="http://schemas.openxmlformats.org/presentationml/2006/main">
+  <p:cSld>
+    <p:spTree>
+      <p:nvGrpSpPr>
+        <p:cNvPr id="1" name=""/>
+        <p:cNvGrpSpPr/>
+        <p:nvPr/>
+      </p:nvGrpSpPr>
+      <p:grpSpPr>
+        <a:xfrm>
+          <a:off x="0" y="0"/>
+          <a:ext cx="0" cy="0"/>
+          <a:chOff x="0" y="0"/>
+          <a:chExt cx="0" cy="0"/>
+        </a:xfrm>
+      </p:grpSpPr>
+      <p:sp>
+        <p:nvSpPr>
+          <p:cNvPr id="2" name="Title 1"/>
+          <p:cNvSpPr>
+            <a:spLocks noGrp="1"/>
+          </p:cNvSpPr>
+          <p:nvPr>
+            <p:ph type="title"/>
+          </p:nvPr>
+        </p:nvSpPr>
+        <p:spPr/>
+        <p:txBody>
+          <a:bodyPr/>
+          <a:lstStyle/>
+          <a:p>
+            <a:r>
+              <a:rPr lang="en-US" dirty="0" smtClean="0"/>
+              <a:t>Team Members</a:t>
+            </a:r>
+            <a:endParaRPr lang="en-US" dirty="0"/>
+          </a:p>
+        </p:txBody>
+      </p:sp>
+      <p:sp>
+        <p:nvSpPr>
+          <p:cNvPr id="3" name="Content Placeholder 2"/>
+          <p:cNvSpPr>
+            <a:spLocks noGrp="1"/>
+          </p:cNvSpPr>
+          <p:nvPr>
+            <p:ph idx="1"/>
+          </p:nvPr>
+        </p:nvSpPr>
+        <p:spPr/>
+        <p:txBody>
+          <a:bodyPr/>
+          <a:lstStyle/>
+          <a:p>
+            <a:pPr>
+              <a:buFont typeface="+mj-lt"/>
+              <a:buAutoNum type="arabicPeriod"/>
+            </a:pPr>
+            <a:r>
+              <a:rPr lang="hr-HR" sz="1600" dirty="0" err="1"/>
+              <a:t>Balaji</a:t>
+            </a:r>
+            <a:r>
+              <a:rPr lang="hr-HR" sz="1600" dirty="0"/>
+              <a:t> </a:t>
+            </a:r>
+            <a:r>
+              <a:rPr lang="hr-HR" sz="1600" dirty="0" err="1"/>
+              <a:t>Sankar</a:t>
+            </a:r>
+            <a:r>
+              <a:rPr lang="hr-HR" sz="1600" dirty="0"/>
+              <a:t> </a:t>
+            </a:r>
+            <a:r>
+              <a:rPr lang="mr-IN" sz="1600" dirty="0"/>
+              <a:t>–</a:t>
+            </a:r>
+            <a:r>
+              <a:rPr lang="hr-HR" sz="1600" dirty="0"/>
+              <a:t> 1209346459 </a:t>
+            </a:r>
+            <a:r>
+              <a:rPr lang="en-US" sz="1600" dirty="0"/>
+              <a:t>- </a:t>
+            </a:r>
+            <a:r>
+              <a:rPr lang="en-US" sz="1600" dirty="0">
+                <a:hlinkClick r:id="rId2"/>
+              </a:rPr>
+              <a:t>bsankar@asu.edu</a:t>
+            </a:r>
+            <a:r>
+              <a:rPr lang="en-US" sz="1600" dirty="0"/>
+              <a:t> </a:t>
+            </a:r>
+            <a:r>
+              <a:rPr lang="mr-IN" sz="1600" dirty="0"/>
+              <a:t>–</a:t>
+            </a:r>
+            <a:r>
+              <a:rPr lang="en-US" sz="1600" dirty="0"/>
+              <a:t> 20% </a:t>
+            </a:r>
+            <a:r>
+              <a:rPr lang="en-US" sz="1600" dirty="0" smtClean="0"/>
+              <a:t>contribution</a:t>
+            </a:r>
+          </a:p>
+          <a:p>
+            <a:pPr lvl="1">
+              <a:buFont typeface="+mj-lt"/>
+              <a:buAutoNum type="arabicPeriod"/>
+            </a:pPr>
+            <a:r>
+              <a:rPr lang="en-US" sz="1200" dirty="0" smtClean="0"/>
+              <a:t>&lt;contribution&gt;</a:t>
+            </a:r>
+            <a:endParaRPr lang="hr-HR" sz="1200" dirty="0"/>
+          </a:p>
+          <a:p>
+            <a:pPr>
+              <a:buFont typeface="+mj-lt"/>
+              <a:buAutoNum type="arabicPeriod"/>
+            </a:pPr>
+            <a:r>
+              <a:rPr lang="en-US" sz="1600" dirty="0" err="1"/>
+              <a:t>Karthik</a:t>
+            </a:r>
+            <a:r>
+              <a:rPr lang="en-US" sz="1600" dirty="0"/>
+              <a:t> Subramanian </a:t>
+            </a:r>
+            <a:r>
+              <a:rPr lang="mr-IN" sz="1600" dirty="0"/>
+              <a:t>–</a:t>
+            </a:r>
+            <a:r>
+              <a:rPr lang="en-US" sz="1600" dirty="0"/>
+              <a:t> 1209360876 - </a:t>
+            </a:r>
+            <a:r>
+              <a:rPr lang="en-US" sz="1600" dirty="0">
+                <a:hlinkClick r:id="rId3"/>
+              </a:rPr>
+              <a:t>ksubra19@asu.edu</a:t>
+            </a:r>
+            <a:r>
+              <a:rPr lang="en-US" sz="1600" dirty="0"/>
+              <a:t> </a:t>
+            </a:r>
+            <a:r>
+              <a:rPr lang="mr-IN" sz="1600" dirty="0"/>
+              <a:t>–</a:t>
+            </a:r>
+            <a:r>
+              <a:rPr lang="en-US" sz="1600" dirty="0"/>
+              <a:t> 20% </a:t>
+            </a:r>
+            <a:r>
+              <a:rPr lang="en-US" sz="1600" dirty="0" smtClean="0"/>
+              <a:t>contribution</a:t>
+            </a:r>
+          </a:p>
+          <a:p>
+            <a:pPr lvl="1">
+              <a:buFont typeface="+mj-lt"/>
+              <a:buAutoNum type="arabicPeriod"/>
+            </a:pPr>
+            <a:r>
+              <a:rPr lang="en-US" sz="1200" dirty="0"/>
+              <a:t>&lt;contribution&gt;</a:t>
+            </a:r>
+          </a:p>
+          <a:p>
+            <a:pPr>
+              <a:buFont typeface="+mj-lt"/>
+              <a:buAutoNum type="arabicPeriod"/>
+            </a:pPr>
+            <a:r>
+              <a:rPr lang="en-US" sz="1600" dirty="0" err="1"/>
+              <a:t>Aarti</a:t>
+            </a:r>
+            <a:r>
+              <a:rPr lang="en-US" sz="1600" dirty="0"/>
+              <a:t> Rao </a:t>
+            </a:r>
+            <a:r>
+              <a:rPr lang="en-US" sz="1600" dirty="0" err="1"/>
+              <a:t>Manjeshwar</a:t>
+            </a:r>
+            <a:r>
+              <a:rPr lang="en-US" sz="1600" dirty="0"/>
+              <a:t> </a:t>
+            </a:r>
+            <a:r>
+              <a:rPr lang="mr-IN" sz="1600" dirty="0"/>
+              <a:t>–</a:t>
+            </a:r>
+            <a:r>
+              <a:rPr lang="en-US" sz="1600" dirty="0"/>
+              <a:t> 1209163211 - </a:t>
+            </a:r>
+            <a:r>
+              <a:rPr lang="en-US" sz="1600" dirty="0">
+                <a:hlinkClick r:id="rId4"/>
+              </a:rPr>
+              <a:t>amanjesh@asu.edu</a:t>
+            </a:r>
+            <a:r>
+              <a:rPr lang="en-US" sz="1600" dirty="0"/>
+              <a:t> </a:t>
+            </a:r>
+            <a:r>
+              <a:rPr lang="mr-IN" sz="1600" dirty="0"/>
+              <a:t>–</a:t>
+            </a:r>
+            <a:r>
+              <a:rPr lang="en-US" sz="1600" dirty="0"/>
+              <a:t> 20% </a:t>
+            </a:r>
+            <a:r>
+              <a:rPr lang="en-US" sz="1600" dirty="0" smtClean="0"/>
+              <a:t>contribution</a:t>
+            </a:r>
+          </a:p>
+          <a:p>
+            <a:pPr lvl="1">
+              <a:buFont typeface="+mj-lt"/>
+              <a:buAutoNum type="arabicPeriod"/>
+            </a:pPr>
+            <a:r>
+              <a:rPr lang="en-US" sz="1200" dirty="0"/>
+              <a:t>&lt;contribution&gt;</a:t>
+            </a:r>
+          </a:p>
+          <a:p>
+            <a:pPr>
+              <a:buFont typeface="+mj-lt"/>
+              <a:buAutoNum type="arabicPeriod"/>
+            </a:pPr>
+            <a:r>
+              <a:rPr lang="en-US" sz="1600" dirty="0" err="1"/>
+              <a:t>Shwetha</a:t>
+            </a:r>
+            <a:r>
+              <a:rPr lang="en-US" sz="1600" dirty="0"/>
+              <a:t> Narayanan </a:t>
+            </a:r>
+            <a:r>
+              <a:rPr lang="mr-IN" sz="1600" dirty="0"/>
+              <a:t>–</a:t>
+            </a:r>
+            <a:r>
+              <a:rPr lang="en-US" sz="1600" dirty="0"/>
+              <a:t> 1209166097 - </a:t>
+            </a:r>
+            <a:r>
+              <a:rPr lang="en-US" sz="1600" dirty="0">
+                <a:hlinkClick r:id="rId5"/>
+              </a:rPr>
+              <a:t>snaray36@asu.edu</a:t>
+            </a:r>
+            <a:r>
+              <a:rPr lang="en-US" sz="1600" dirty="0"/>
+              <a:t> </a:t>
+            </a:r>
+            <a:r>
+              <a:rPr lang="mr-IN" sz="1600" dirty="0"/>
+              <a:t>–</a:t>
+            </a:r>
+            <a:r>
+              <a:rPr lang="en-US" sz="1600" dirty="0"/>
+              <a:t> 20% </a:t>
+            </a:r>
+            <a:r>
+              <a:rPr lang="en-US" sz="1600" dirty="0" smtClean="0"/>
+              <a:t>contribution</a:t>
+            </a:r>
+          </a:p>
+          <a:p>
+            <a:pPr lvl="1">
+              <a:buFont typeface="+mj-lt"/>
+              <a:buAutoNum type="arabicPeriod"/>
+            </a:pPr>
+            <a:r>
+              <a:rPr lang="en-US" sz="1200" dirty="0"/>
+              <a:t>&lt;contribution&gt;</a:t>
+            </a:r>
+          </a:p>
+          <a:p>
+            <a:pPr>
+              <a:buFont typeface="+mj-lt"/>
+              <a:buAutoNum type="arabicPeriod"/>
+            </a:pPr>
+            <a:r>
+              <a:rPr lang="en-US" sz="1600" dirty="0"/>
+              <a:t>Ramanathan Nachiappan </a:t>
+            </a:r>
+            <a:r>
+              <a:rPr lang="mr-IN" sz="1600" dirty="0"/>
+              <a:t>–</a:t>
+            </a:r>
+            <a:r>
+              <a:rPr lang="en-US" sz="1600" dirty="0"/>
+              <a:t> 1210822532 </a:t>
+            </a:r>
+            <a:r>
+              <a:rPr lang="mr-IN" sz="1600" dirty="0"/>
+              <a:t>–</a:t>
+            </a:r>
+            <a:r>
+              <a:rPr lang="en-US" sz="1600" dirty="0"/>
+              <a:t> </a:t>
+            </a:r>
+            <a:r>
+              <a:rPr lang="en-US" sz="1600" dirty="0">
+                <a:hlinkClick r:id="rId6"/>
+              </a:rPr>
+              <a:t>rnachiap@asu.edu</a:t>
+            </a:r>
+            <a:r>
+              <a:rPr lang="en-US" sz="1600" dirty="0"/>
+              <a:t> - 20% </a:t>
+            </a:r>
+            <a:r>
+              <a:rPr lang="en-US" sz="1600" dirty="0" smtClean="0"/>
+              <a:t>contribution</a:t>
+            </a:r>
+          </a:p>
+          <a:p>
+            <a:pPr lvl="1">
+              <a:buFont typeface="+mj-lt"/>
+              <a:buAutoNum type="arabicPeriod"/>
+            </a:pPr>
+            <a:r>
+              <a:rPr lang="en-US" sz="1200" dirty="0"/>
+              <a:t>&lt;contribution&gt;</a:t>
+            </a:r>
+          </a:p>
+          <a:p>
+            <a:pPr marL="0" marR="0" lvl="0" indent="0" defTabSz="914400" eaLnBrk="1" fontAlgn="auto" latinLnBrk="0" hangingPunct="1">
+              <a:lnSpc>
+                <a:spcPct val="100000"/>
+              </a:lnSpc>
+              <a:spcBef>
+                <a:spcPts val="0"/>
+              </a:spcBef>
+              <a:spcAft>
+                <a:spcPts val="0"/>
+              </a:spcAft>
+              <a:buClrTx/>
+              <a:buSzTx/>
+              <a:buFontTx/>
+              <a:buNone/>
+              <a:tabLst/>
+              <a:defRPr/>
+            </a:pPr>
+            <a:endParaRPr lang="en-US" sz="2000" dirty="0"/>
+          </a:p>
+        </p:txBody>
+      </p:sp>
+      <p:sp>
+        <p:nvSpPr>
+          <p:cNvPr id="4" name="Slide Number Placeholder 3"/>
+          <p:cNvSpPr>
+            <a:spLocks noGrp="1"/>
+          </p:cNvSpPr>
+          <p:nvPr>
+            <p:ph type="sldNum" sz="quarter" idx="4"/>
+          </p:nvPr>
+        </p:nvSpPr>
+        <p:spPr/>
+        <p:txBody>
+          <a:bodyPr/>
+          <a:lstStyle/>
+          <a:p>
+            <a:pPr>
+              <a:defRPr/>
+            </a:pPr>
+            <a:r>
+              <a:rPr lang="en-US" smtClean="0"/>
+              <a:t>- </a:t>
+            </a:r>
+            <a:fld id="{5702A24C-C4CD-4510-A1DD-CEB556D2535A}" type="slidenum">
+              <a:rPr lang="en-US" smtClean="0"/>
+              <a:pPr>
+                <a:defRPr/>
+              </a:pPr>
+              <a:t>15</a:t>
+            </a:fld>
+            <a:r>
+              <a:rPr lang="en-US" smtClean="0"/>
+              <a:t> -</a:t>
+            </a:r>
+            <a:endParaRPr lang="en-US"/>
+          </a:p>
+        </p:txBody>
+      </p:sp>
+      <p:sp>
+        <p:nvSpPr>
+          <p:cNvPr id="5" name="Rectangle 4"/>
+          <p:cNvSpPr/>
+          <p:nvPr/>
+        </p:nvSpPr>
+        <p:spPr>
+          <a:xfrm>
+            <a:off x="446088" y="5707132"/>
+            <a:ext cx="8229600" cy="707886"/>
+          </a:xfrm>
+          <a:prstGeom prst="rect">
+            <a:avLst/>
+          </a:prstGeom>
+        </p:spPr>
+        <p:txBody>
+          <a:bodyPr wrap="square">
+            <a:spAutoFit/>
+          </a:bodyPr>
+          <a:lstStyle/>
+          <a:p>
+            <a:r>
+              <a:rPr lang="en-US" sz="2000" dirty="0" smtClean="0">
+                <a:latin typeface="Times" charset="0"/>
+                <a:ea typeface="Times" charset="0"/>
+                <a:cs typeface="Times" charset="0"/>
+              </a:rPr>
+              <a:t>“All </a:t>
+            </a:r>
+            <a:r>
+              <a:rPr lang="en-US" sz="2000" dirty="0">
+                <a:latin typeface="Times" charset="0"/>
+                <a:ea typeface="Times" charset="0"/>
+                <a:cs typeface="Times" charset="0"/>
+              </a:rPr>
+              <a:t>the team members agree on the team members’ contributions in terms of both (a) what s/he did and (b) the </a:t>
+            </a:r>
+            <a:r>
+              <a:rPr lang="en-US" sz="2000" dirty="0" smtClean="0">
+                <a:latin typeface="Times" charset="0"/>
+                <a:ea typeface="Times" charset="0"/>
+                <a:cs typeface="Times" charset="0"/>
+              </a:rPr>
+              <a:t>percentage”</a:t>
+            </a:r>
+            <a:endParaRPr lang="en-US" sz="2000" dirty="0">
+              <a:effectLst/>
+              <a:latin typeface="Times" charset="0"/>
+              <a:ea typeface="Times" charset="0"/>
+              <a:cs typeface="Times" charset="0"/>
+            </a:endParaRPr>
+          </a:p>
+        </p:txBody>
+      </p:sp>
+    </p:spTree>
+    <p:extLst>
+      <p:ext uri="{BB962C8B-B14F-4D97-AF65-F5344CB8AC3E}">
+        <p14:creationId xmlns:p14="http://schemas.microsoft.com/office/powerpoint/2010/main" val="1394230669"/>
+      </p:ext>
+    </p:extLst>
+  </p:cSld>
+  <p:clrMapOvr>
+    <a:masterClrMapping/>
+  </p:clrMapOvr>
+</p:sld>
+</file>
+
+<file path=ppt/slides/slide16.xml><?xml version="1.0" encoding="utf-8"?>
+<p:sld xmlns:a="http://schemas.openxmlformats.org/drawingml/2006/main" xmlns:r="http://schemas.openxmlformats.org/officeDocument/2006/relationships" xmlns:p="http://schemas.openxmlformats.org/presentationml/2006/main">
+  <p:cSld>
+    <p:spTree>
+      <p:nvGrpSpPr>
+        <p:cNvPr id="1" name=""/>
+        <p:cNvGrpSpPr/>
+        <p:nvPr/>
+      </p:nvGrpSpPr>
+      <p:grpSpPr>
+        <a:xfrm>
+          <a:off x="0" y="0"/>
+          <a:ext cx="0" cy="0"/>
+          <a:chOff x="0" y="0"/>
+          <a:chExt cx="0" cy="0"/>
+        </a:xfrm>
+      </p:grpSpPr>
+      <p:sp>
+        <p:nvSpPr>
+          <p:cNvPr id="2" name="Title 1"/>
+          <p:cNvSpPr>
+            <a:spLocks noGrp="1"/>
+          </p:cNvSpPr>
+          <p:nvPr>
+            <p:ph type="title"/>
+          </p:nvPr>
+        </p:nvSpPr>
+        <p:spPr/>
+        <p:txBody>
+          <a:bodyPr/>
+          <a:lstStyle/>
+          <a:p>
+            <a:r>
+              <a:rPr lang="en-US" dirty="0" smtClean="0"/>
+              <a:t>Thank You!</a:t>
+            </a:r>
+            <a:endParaRPr lang="en-US" dirty="0"/>
+          </a:p>
+        </p:txBody>
+      </p:sp>
+      <p:sp>
+        <p:nvSpPr>
+          <p:cNvPr id="4" name="Slide Number Placeholder 3"/>
+          <p:cNvSpPr>
+            <a:spLocks noGrp="1"/>
+          </p:cNvSpPr>
+          <p:nvPr>
+            <p:ph type="sldNum" sz="quarter" idx="4"/>
+          </p:nvPr>
+        </p:nvSpPr>
+        <p:spPr/>
+        <p:txBody>
+          <a:bodyPr/>
+          <a:lstStyle/>
+          <a:p>
+            <a:pPr>
+              <a:defRPr/>
+            </a:pPr>
+            <a:r>
+              <a:rPr lang="en-US" smtClean="0"/>
+              <a:t>- </a:t>
+            </a:r>
+            <a:fld id="{5702A24C-C4CD-4510-A1DD-CEB556D2535A}" type="slidenum">
+              <a:rPr lang="en-US" smtClean="0"/>
+              <a:pPr>
+                <a:defRPr/>
+              </a:pPr>
+              <a:t>16</a:t>
+            </a:fld>
+            <a:r>
+              <a:rPr lang="en-US" smtClean="0"/>
+              <a:t> -</a:t>
+            </a:r>
+            <a:endParaRPr lang="en-US"/>
+          </a:p>
+        </p:txBody>
+      </p:sp>
+      <p:sp>
+        <p:nvSpPr>
+          <p:cNvPr id="6" name="Rectangle 5"/>
+          <p:cNvSpPr/>
+          <p:nvPr/>
+        </p:nvSpPr>
+        <p:spPr>
+          <a:xfrm>
+            <a:off x="684212" y="5649403"/>
+            <a:ext cx="7991475" cy="707886"/>
+          </a:xfrm>
+          <a:prstGeom prst="rect">
+            <a:avLst/>
+          </a:prstGeom>
+        </p:spPr>
+        <p:txBody>
+          <a:bodyPr wrap="square">
+            <a:spAutoFit/>
+          </a:bodyPr>
+          <a:lstStyle/>
+          <a:p>
+            <a:r>
+              <a:rPr lang="en-US" sz="2000" dirty="0" smtClean="0">
+                <a:latin typeface="Times" charset="0"/>
+                <a:ea typeface="Times" charset="0"/>
+                <a:cs typeface="Times" charset="0"/>
+              </a:rPr>
+              <a:t>“All </a:t>
+            </a:r>
+            <a:r>
+              <a:rPr lang="en-US" sz="2000" dirty="0">
+                <a:latin typeface="Times" charset="0"/>
+                <a:ea typeface="Times" charset="0"/>
+                <a:cs typeface="Times" charset="0"/>
+              </a:rPr>
+              <a:t>the team members agree on the team members’ contributions in terms of both (a) what s/he did and (b) the </a:t>
+            </a:r>
+            <a:r>
+              <a:rPr lang="en-US" sz="2000" dirty="0" smtClean="0">
+                <a:latin typeface="Times" charset="0"/>
+                <a:ea typeface="Times" charset="0"/>
+                <a:cs typeface="Times" charset="0"/>
+              </a:rPr>
+              <a:t>percentage”</a:t>
+            </a:r>
+            <a:endParaRPr lang="en-US" sz="2000" dirty="0">
+              <a:effectLst/>
+              <a:latin typeface="Times" charset="0"/>
+              <a:ea typeface="Times" charset="0"/>
+              <a:cs typeface="Times" charset="0"/>
+            </a:endParaRPr>
+          </a:p>
+        </p:txBody>
+      </p:sp>
+    </p:spTree>
+    <p:extLst>
+      <p:ext uri="{BB962C8B-B14F-4D97-AF65-F5344CB8AC3E}">
+        <p14:creationId xmlns:p14="http://schemas.microsoft.com/office/powerpoint/2010/main" val="1672671196"/>
+      </p:ext>
+    </p:extLst>
+  </p:cSld>
+  <p:clrMapOvr>
+    <a:masterClrMapping/>
+  </p:clrMapOvr>
+</p:sld>
+</file>
+
 <file path=ppt/slides/slide2.xml><?xml version="1.0" encoding="utf-8"?>
 <p:sld xmlns:a="http://schemas.openxmlformats.org/drawingml/2006/main" xmlns:r="http://schemas.openxmlformats.org/officeDocument/2006/relationships" xmlns:p="http://schemas.openxmlformats.org/presentationml/2006/main">
   <p:cSld>
@@ -7148,6 +8612,10 @@
           <a:bodyPr/>
           <a:lstStyle/>
           <a:p>
+            <a:r>
+              <a:rPr lang="en-US" dirty="0" smtClean="0"/>
+              <a:t>Overview</a:t>
+            </a:r>
             <a:endParaRPr lang="en-US" dirty="0"/>
           </a:p>
         </p:txBody>
@@ -7167,7 +8635,124 @@
           <a:bodyPr/>
           <a:lstStyle/>
           <a:p>
-            <a:endParaRPr lang="en-US" dirty="0"/>
+            <a:pPr marL="514350" indent="-514350">
+              <a:buFont typeface="+mj-lt"/>
+              <a:buAutoNum type="arabicPeriod"/>
+            </a:pPr>
+            <a:r>
+              <a:rPr lang="en-US" sz="2800" dirty="0" smtClean="0"/>
+              <a:t>Introduction</a:t>
+            </a:r>
+          </a:p>
+          <a:p>
+            <a:pPr marL="914400" lvl="1" indent="-514350">
+              <a:buFont typeface="+mj-lt"/>
+              <a:buAutoNum type="arabicPeriod"/>
+            </a:pPr>
+            <a:r>
+              <a:rPr lang="en-US" sz="1800" dirty="0" smtClean="0"/>
+              <a:t>Time Series Data modelling</a:t>
+            </a:r>
+          </a:p>
+          <a:p>
+            <a:pPr marL="914400" lvl="1" indent="-514350">
+              <a:buFont typeface="+mj-lt"/>
+              <a:buAutoNum type="arabicPeriod"/>
+            </a:pPr>
+            <a:r>
+              <a:rPr lang="en-US" sz="1800" dirty="0" smtClean="0"/>
+              <a:t>Forecasting</a:t>
+            </a:r>
+          </a:p>
+          <a:p>
+            <a:pPr marL="914400" lvl="1" indent="-514350">
+              <a:buFont typeface="+mj-lt"/>
+              <a:buAutoNum type="arabicPeriod"/>
+            </a:pPr>
+            <a:r>
+              <a:rPr lang="en-US" sz="1800" dirty="0" smtClean="0"/>
+              <a:t>Data Sets</a:t>
+            </a:r>
+          </a:p>
+          <a:p>
+            <a:pPr marL="514350" indent="-514350">
+              <a:buFont typeface="+mj-lt"/>
+              <a:buAutoNum type="arabicPeriod"/>
+            </a:pPr>
+            <a:r>
+              <a:rPr lang="en-US" sz="2800" dirty="0" smtClean="0"/>
+              <a:t>Proposed approaches</a:t>
+            </a:r>
+          </a:p>
+          <a:p>
+            <a:pPr marL="914400" lvl="1" indent="-514350">
+              <a:buFont typeface="+mj-lt"/>
+              <a:buAutoNum type="arabicPeriod"/>
+            </a:pPr>
+            <a:r>
+              <a:rPr lang="en-US" sz="1800" dirty="0" smtClean="0"/>
+              <a:t>PCA and Feature Selection</a:t>
+            </a:r>
+          </a:p>
+          <a:p>
+            <a:pPr marL="914400" lvl="1" indent="-514350">
+              <a:buFont typeface="+mj-lt"/>
+              <a:buAutoNum type="arabicPeriod"/>
+            </a:pPr>
+            <a:r>
+              <a:rPr lang="en-US" sz="1800" dirty="0" smtClean="0"/>
+              <a:t>ARIMA Modeling</a:t>
+            </a:r>
+          </a:p>
+          <a:p>
+            <a:pPr marL="914400" lvl="1" indent="-514350">
+              <a:buFont typeface="+mj-lt"/>
+              <a:buAutoNum type="arabicPeriod"/>
+            </a:pPr>
+            <a:r>
+              <a:rPr lang="en-US" sz="1800" dirty="0" smtClean="0"/>
+              <a:t>Nearest </a:t>
+            </a:r>
+            <a:r>
+              <a:rPr lang="en-US" sz="1800" dirty="0" err="1" smtClean="0"/>
+              <a:t>Neighbour</a:t>
+            </a:r>
+            <a:r>
+              <a:rPr lang="en-US" sz="1800" dirty="0" smtClean="0"/>
+              <a:t> Modeling</a:t>
+            </a:r>
+          </a:p>
+          <a:p>
+            <a:pPr marL="914400" lvl="1" indent="-514350">
+              <a:buFont typeface="+mj-lt"/>
+              <a:buAutoNum type="arabicPeriod"/>
+            </a:pPr>
+            <a:r>
+              <a:rPr lang="en-US" sz="1800" dirty="0" smtClean="0"/>
+              <a:t>Time Series Linear Modeling</a:t>
+            </a:r>
+            <a:endParaRPr lang="en-US" dirty="0" smtClean="0"/>
+          </a:p>
+          <a:p>
+            <a:pPr marL="514350" indent="-514350">
+              <a:buFont typeface="+mj-lt"/>
+              <a:buAutoNum type="arabicPeriod"/>
+            </a:pPr>
+            <a:r>
+              <a:rPr lang="en-US" sz="2800" dirty="0" smtClean="0"/>
+              <a:t>Experiment and Results</a:t>
+            </a:r>
+          </a:p>
+          <a:p>
+            <a:pPr marL="514350" indent="-514350">
+              <a:buFont typeface="+mj-lt"/>
+              <a:buAutoNum type="arabicPeriod"/>
+            </a:pPr>
+            <a:r>
+              <a:rPr lang="en-US" sz="2800" dirty="0" smtClean="0"/>
+              <a:t>Future Prospects</a:t>
+            </a:r>
+            <a:endParaRPr lang="en-US" sz="2800" dirty="0"/>
           </a:p>
         </p:txBody>
       </p:sp>
@@ -7212,6 +8797,1017 @@
     <p:extLst>
       <p:ext uri="{BB962C8B-B14F-4D97-AF65-F5344CB8AC3E}">
         <p14:creationId xmlns:p14="http://schemas.microsoft.com/office/powerpoint/2010/main" val="523303358"/>
+      </p:ext>
+    </p:extLst>
+  </p:cSld>
+  <p:clrMapOvr>
+    <a:masterClrMapping/>
+  </p:clrMapOvr>
+</p:sld>
+</file>
+
+<file path=ppt/slides/slide3.xml><?xml version="1.0" encoding="utf-8"?>
+<p:sld xmlns:a="http://schemas.openxmlformats.org/drawingml/2006/main" xmlns:r="http://schemas.openxmlformats.org/officeDocument/2006/relationships" xmlns:p="http://schemas.openxmlformats.org/presentationml/2006/main">
+  <p:cSld>
+    <p:spTree>
+      <p:nvGrpSpPr>
+        <p:cNvPr id="1" name=""/>
+        <p:cNvGrpSpPr/>
+        <p:nvPr/>
+      </p:nvGrpSpPr>
+      <p:grpSpPr>
+        <a:xfrm>
+          <a:off x="0" y="0"/>
+          <a:ext cx="0" cy="0"/>
+          <a:chOff x="0" y="0"/>
+          <a:chExt cx="0" cy="0"/>
+        </a:xfrm>
+      </p:grpSpPr>
+      <p:sp>
+        <p:nvSpPr>
+          <p:cNvPr id="2" name="Title 1"/>
+          <p:cNvSpPr>
+            <a:spLocks noGrp="1"/>
+          </p:cNvSpPr>
+          <p:nvPr>
+            <p:ph type="title"/>
+          </p:nvPr>
+        </p:nvSpPr>
+        <p:spPr/>
+        <p:txBody>
+          <a:bodyPr/>
+          <a:lstStyle/>
+          <a:p>
+            <a:r>
+              <a:rPr lang="en-US" dirty="0" smtClean="0"/>
+              <a:t>Time Series Data Modeling</a:t>
+            </a:r>
+            <a:endParaRPr lang="en-US" dirty="0"/>
+          </a:p>
+        </p:txBody>
+      </p:sp>
+      <p:sp>
+        <p:nvSpPr>
+          <p:cNvPr id="3" name="Content Placeholder 2"/>
+          <p:cNvSpPr>
+            <a:spLocks noGrp="1"/>
+          </p:cNvSpPr>
+          <p:nvPr>
+            <p:ph idx="1"/>
+          </p:nvPr>
+        </p:nvSpPr>
+        <p:spPr/>
+        <p:txBody>
+          <a:bodyPr/>
+          <a:lstStyle/>
+          <a:p>
+            <a:r>
+              <a:rPr lang="en-US" sz="2000" dirty="0" smtClean="0"/>
+              <a:t>Time Series Data is a series of data points </a:t>
+            </a:r>
+            <a:r>
+              <a:rPr lang="en-US" sz="2000" u="sng" dirty="0" smtClean="0"/>
+              <a:t>equally</a:t>
+            </a:r>
+            <a:r>
+              <a:rPr lang="en-US" sz="2000" dirty="0" smtClean="0"/>
+              <a:t> spaced in time</a:t>
+            </a:r>
+          </a:p>
+          <a:p>
+            <a:r>
+              <a:rPr lang="en-US" sz="2000" dirty="0" smtClean="0"/>
+              <a:t>Modeling time series data often used in </a:t>
+            </a:r>
+          </a:p>
+          <a:p>
+            <a:pPr lvl="1"/>
+            <a:r>
+              <a:rPr lang="en-US" sz="1600" dirty="0" smtClean="0"/>
+              <a:t>Signal processing</a:t>
+            </a:r>
+          </a:p>
+          <a:p>
+            <a:pPr lvl="1"/>
+            <a:r>
+              <a:rPr lang="en-US" sz="1600" dirty="0" smtClean="0"/>
+              <a:t>Pattern recognition </a:t>
+            </a:r>
+          </a:p>
+          <a:p>
+            <a:pPr lvl="1"/>
+            <a:r>
+              <a:rPr lang="en-US" sz="1600" u="sng" dirty="0" smtClean="0"/>
+              <a:t>Weather forecasting</a:t>
+            </a:r>
+          </a:p>
+          <a:p>
+            <a:pPr lvl="1"/>
+            <a:r>
+              <a:rPr lang="en-US" sz="1600" dirty="0" smtClean="0"/>
+              <a:t>Mathematical finance</a:t>
+            </a:r>
+          </a:p>
+          <a:p>
+            <a:r>
+              <a:rPr lang="en-US" sz="2000" dirty="0" smtClean="0"/>
+              <a:t>Core Concept of Time Series Analysis involves </a:t>
+            </a:r>
+          </a:p>
+          <a:p>
+            <a:pPr lvl="1"/>
+            <a:r>
+              <a:rPr lang="en-US" sz="1600" dirty="0" smtClean="0"/>
+              <a:t>Extracting statistics</a:t>
+            </a:r>
+          </a:p>
+          <a:p>
+            <a:pPr lvl="1"/>
+            <a:r>
+              <a:rPr lang="en-US" sz="1600" dirty="0" smtClean="0"/>
+              <a:t>Extracting characteristics</a:t>
+            </a:r>
+          </a:p>
+          <a:p>
+            <a:r>
+              <a:rPr lang="en-US" sz="2000" dirty="0" smtClean="0"/>
+              <a:t>Core Concept of Time Series Forecasting involves</a:t>
+            </a:r>
+          </a:p>
+          <a:p>
+            <a:pPr lvl="1"/>
+            <a:r>
+              <a:rPr lang="en-US" sz="1600" dirty="0" smtClean="0"/>
+              <a:t> predicting future values based on the previously observed values</a:t>
+            </a:r>
+          </a:p>
+          <a:p>
+            <a:r>
+              <a:rPr lang="en-US" sz="2000" dirty="0" smtClean="0"/>
+              <a:t>Data Types applicable</a:t>
+            </a:r>
+          </a:p>
+          <a:p>
+            <a:pPr lvl="1"/>
+            <a:r>
+              <a:rPr lang="en-US" sz="1600" dirty="0" smtClean="0"/>
+              <a:t>Real valued, continuous data, </a:t>
+            </a:r>
+            <a:r>
+              <a:rPr lang="en-US" sz="1600" u="sng" dirty="0" smtClean="0"/>
+              <a:t>discrete numeric data</a:t>
+            </a:r>
+            <a:r>
+              <a:rPr lang="en-US" sz="1600" dirty="0" smtClean="0"/>
+              <a:t> or discrete symbolic data</a:t>
+            </a:r>
+          </a:p>
+          <a:p>
+            <a:pPr lvl="1"/>
+            <a:endParaRPr lang="en-US" sz="1600" dirty="0"/>
+          </a:p>
+        </p:txBody>
+      </p:sp>
+      <p:sp>
+        <p:nvSpPr>
+          <p:cNvPr id="4" name="Slide Number Placeholder 3"/>
+          <p:cNvSpPr>
+            <a:spLocks noGrp="1"/>
+          </p:cNvSpPr>
+          <p:nvPr>
+            <p:ph type="sldNum" sz="quarter" idx="4"/>
+          </p:nvPr>
+        </p:nvSpPr>
+        <p:spPr/>
+        <p:txBody>
+          <a:bodyPr/>
+          <a:lstStyle/>
+          <a:p>
+            <a:pPr>
+              <a:defRPr/>
+            </a:pPr>
+            <a:r>
+              <a:rPr lang="en-US" smtClean="0"/>
+              <a:t>- </a:t>
+            </a:r>
+            <a:fld id="{5702A24C-C4CD-4510-A1DD-CEB556D2535A}" type="slidenum">
+              <a:rPr lang="en-US" smtClean="0"/>
+              <a:pPr>
+                <a:defRPr/>
+              </a:pPr>
+              <a:t>3</a:t>
+            </a:fld>
+            <a:r>
+              <a:rPr lang="en-US" smtClean="0"/>
+              <a:t> -</a:t>
+            </a:r>
+            <a:endParaRPr lang="en-US"/>
+          </a:p>
+        </p:txBody>
+      </p:sp>
+    </p:spTree>
+    <p:extLst>
+      <p:ext uri="{BB962C8B-B14F-4D97-AF65-F5344CB8AC3E}">
+        <p14:creationId xmlns:p14="http://schemas.microsoft.com/office/powerpoint/2010/main" val="1538296251"/>
+      </p:ext>
+    </p:extLst>
+  </p:cSld>
+  <p:clrMapOvr>
+    <a:masterClrMapping/>
+  </p:clrMapOvr>
+</p:sld>
+</file>
+
+<file path=ppt/slides/slide4.xml><?xml version="1.0" encoding="utf-8"?>
+<p:sld xmlns:a="http://schemas.openxmlformats.org/drawingml/2006/main" xmlns:r="http://schemas.openxmlformats.org/officeDocument/2006/relationships" xmlns:p="http://schemas.openxmlformats.org/presentationml/2006/main">
+  <p:cSld>
+    <p:spTree>
+      <p:nvGrpSpPr>
+        <p:cNvPr id="1" name=""/>
+        <p:cNvGrpSpPr/>
+        <p:nvPr/>
+      </p:nvGrpSpPr>
+      <p:grpSpPr>
+        <a:xfrm>
+          <a:off x="0" y="0"/>
+          <a:ext cx="0" cy="0"/>
+          <a:chOff x="0" y="0"/>
+          <a:chExt cx="0" cy="0"/>
+        </a:xfrm>
+      </p:grpSpPr>
+      <p:sp>
+        <p:nvSpPr>
+          <p:cNvPr id="2" name="Title 1"/>
+          <p:cNvSpPr>
+            <a:spLocks noGrp="1"/>
+          </p:cNvSpPr>
+          <p:nvPr>
+            <p:ph type="title"/>
+          </p:nvPr>
+        </p:nvSpPr>
+        <p:spPr/>
+        <p:txBody>
+          <a:bodyPr/>
+          <a:lstStyle/>
+          <a:p>
+            <a:r>
+              <a:rPr lang="en-US" dirty="0" smtClean="0"/>
+              <a:t>Forecasting</a:t>
+            </a:r>
+            <a:endParaRPr lang="en-US" dirty="0"/>
+          </a:p>
+        </p:txBody>
+      </p:sp>
+      <p:sp>
+        <p:nvSpPr>
+          <p:cNvPr id="3" name="Content Placeholder 2"/>
+          <p:cNvSpPr>
+            <a:spLocks noGrp="1"/>
+          </p:cNvSpPr>
+          <p:nvPr>
+            <p:ph idx="1"/>
+          </p:nvPr>
+        </p:nvSpPr>
+        <p:spPr/>
+        <p:txBody>
+          <a:bodyPr/>
+          <a:lstStyle/>
+          <a:p>
+            <a:r>
+              <a:rPr lang="en-US" sz="2000" dirty="0" smtClean="0"/>
+              <a:t>Forecasting: Process of predicting a future event from the current model (data mapped against time points)</a:t>
+            </a:r>
+          </a:p>
+          <a:p>
+            <a:r>
+              <a:rPr lang="en-US" sz="2000" dirty="0"/>
+              <a:t>I</a:t>
+            </a:r>
+            <a:r>
+              <a:rPr lang="en-US" sz="2000" dirty="0" smtClean="0"/>
+              <a:t>n the realm of Machine Learning, forecasting finds its applications in analyzing trend and seasonality for future predictions</a:t>
+            </a:r>
+          </a:p>
+          <a:p>
+            <a:r>
+              <a:rPr lang="en-US" sz="2000" dirty="0" smtClean="0"/>
+              <a:t>Weather Forecasting </a:t>
+            </a:r>
+          </a:p>
+          <a:p>
+            <a:pPr lvl="1"/>
+            <a:r>
+              <a:rPr lang="en-US" sz="1600" dirty="0" smtClean="0"/>
+              <a:t>Seasonal forecasting using quantitative methods </a:t>
+            </a:r>
+          </a:p>
+          <a:p>
+            <a:r>
+              <a:rPr lang="en-US" sz="2000" dirty="0" smtClean="0"/>
+              <a:t>Quantitative Method ?</a:t>
+            </a:r>
+          </a:p>
+          <a:p>
+            <a:pPr lvl="1"/>
+            <a:r>
+              <a:rPr lang="en-US" sz="1600" dirty="0" smtClean="0"/>
+              <a:t>Stable historical data</a:t>
+            </a:r>
+          </a:p>
+          <a:p>
+            <a:pPr lvl="1"/>
+            <a:r>
+              <a:rPr lang="en-US" sz="1600" dirty="0" smtClean="0"/>
+              <a:t>Involves mathematical techniques</a:t>
+            </a:r>
+          </a:p>
+          <a:p>
+            <a:pPr lvl="1"/>
+            <a:endParaRPr lang="en-US" sz="1600" dirty="0"/>
+          </a:p>
+        </p:txBody>
+      </p:sp>
+      <p:sp>
+        <p:nvSpPr>
+          <p:cNvPr id="4" name="Slide Number Placeholder 3"/>
+          <p:cNvSpPr>
+            <a:spLocks noGrp="1"/>
+          </p:cNvSpPr>
+          <p:nvPr>
+            <p:ph type="sldNum" sz="quarter" idx="4"/>
+          </p:nvPr>
+        </p:nvSpPr>
+        <p:spPr/>
+        <p:txBody>
+          <a:bodyPr/>
+          <a:lstStyle/>
+          <a:p>
+            <a:pPr>
+              <a:defRPr/>
+            </a:pPr>
+            <a:r>
+              <a:rPr lang="en-US" smtClean="0"/>
+              <a:t>- </a:t>
+            </a:r>
+            <a:fld id="{5702A24C-C4CD-4510-A1DD-CEB556D2535A}" type="slidenum">
+              <a:rPr lang="en-US" smtClean="0"/>
+              <a:pPr>
+                <a:defRPr/>
+              </a:pPr>
+              <a:t>4</a:t>
+            </a:fld>
+            <a:r>
+              <a:rPr lang="en-US" smtClean="0"/>
+              <a:t> -</a:t>
+            </a:r>
+            <a:endParaRPr lang="en-US"/>
+          </a:p>
+        </p:txBody>
+      </p:sp>
+    </p:spTree>
+    <p:extLst>
+      <p:ext uri="{BB962C8B-B14F-4D97-AF65-F5344CB8AC3E}">
+        <p14:creationId xmlns:p14="http://schemas.microsoft.com/office/powerpoint/2010/main" val="1630876354"/>
+      </p:ext>
+    </p:extLst>
+  </p:cSld>
+  <p:clrMapOvr>
+    <a:masterClrMapping/>
+  </p:clrMapOvr>
+</p:sld>
+</file>
+
+<file path=ppt/slides/slide5.xml><?xml version="1.0" encoding="utf-8"?>
+<p:sld xmlns:a="http://schemas.openxmlformats.org/drawingml/2006/main" xmlns:r="http://schemas.openxmlformats.org/officeDocument/2006/relationships" xmlns:p="http://schemas.openxmlformats.org/presentationml/2006/main">
+  <p:cSld>
+    <p:spTree>
+      <p:nvGrpSpPr>
+        <p:cNvPr id="1" name=""/>
+        <p:cNvGrpSpPr/>
+        <p:nvPr/>
+      </p:nvGrpSpPr>
+      <p:grpSpPr>
+        <a:xfrm>
+          <a:off x="0" y="0"/>
+          <a:ext cx="0" cy="0"/>
+          <a:chOff x="0" y="0"/>
+          <a:chExt cx="0" cy="0"/>
+        </a:xfrm>
+      </p:grpSpPr>
+      <p:sp>
+        <p:nvSpPr>
+          <p:cNvPr id="2" name="Title 1"/>
+          <p:cNvSpPr>
+            <a:spLocks noGrp="1"/>
+          </p:cNvSpPr>
+          <p:nvPr>
+            <p:ph type="title"/>
+          </p:nvPr>
+        </p:nvSpPr>
+        <p:spPr/>
+        <p:txBody>
+          <a:bodyPr/>
+          <a:lstStyle/>
+          <a:p>
+            <a:r>
+              <a:rPr lang="en-US" dirty="0" smtClean="0"/>
+              <a:t>Data Sets</a:t>
+            </a:r>
+            <a:endParaRPr lang="en-US" dirty="0"/>
+          </a:p>
+        </p:txBody>
+      </p:sp>
+      <p:sp>
+        <p:nvSpPr>
+          <p:cNvPr id="3" name="Content Placeholder 2"/>
+          <p:cNvSpPr>
+            <a:spLocks noGrp="1"/>
+          </p:cNvSpPr>
+          <p:nvPr>
+            <p:ph idx="1"/>
+          </p:nvPr>
+        </p:nvSpPr>
+        <p:spPr/>
+        <p:txBody>
+          <a:bodyPr/>
+          <a:lstStyle/>
+          <a:p>
+            <a:r>
+              <a:rPr lang="en-US" sz="2000" dirty="0" smtClean="0"/>
+              <a:t>Source:</a:t>
+            </a:r>
+          </a:p>
+          <a:p>
+            <a:r>
+              <a:rPr lang="en-US" sz="2000" dirty="0" smtClean="0"/>
+              <a:t>Data Set Sample:</a:t>
+            </a:r>
+          </a:p>
+          <a:p>
+            <a:pPr lvl="1"/>
+            <a:r>
+              <a:rPr lang="en-US" sz="1600" dirty="0" smtClean="0"/>
+              <a:t>Seattle Weather data</a:t>
+            </a:r>
+          </a:p>
+          <a:p>
+            <a:pPr lvl="1"/>
+            <a:r>
+              <a:rPr lang="en-US" sz="1600" dirty="0" smtClean="0"/>
+              <a:t>Parameters </a:t>
+            </a:r>
+            <a:r>
+              <a:rPr lang="mr-IN" sz="1600" dirty="0" smtClean="0"/>
+              <a:t>–</a:t>
+            </a:r>
+            <a:r>
+              <a:rPr lang="en-US" sz="1600" dirty="0" smtClean="0"/>
+              <a:t> Station, elevation, </a:t>
+            </a:r>
+            <a:r>
+              <a:rPr lang="en-US" sz="1600" dirty="0" err="1" smtClean="0"/>
+              <a:t>Sunrisem</a:t>
+            </a:r>
+            <a:r>
+              <a:rPr lang="en-US" sz="1600" dirty="0" smtClean="0"/>
+              <a:t> sunset, wind speed, Pressure change, sky conditions </a:t>
+            </a:r>
+            <a:r>
+              <a:rPr lang="en-US" sz="1600" dirty="0" err="1" smtClean="0"/>
+              <a:t>etc</a:t>
+            </a:r>
+            <a:r>
+              <a:rPr lang="en-US" sz="1600" dirty="0" smtClean="0"/>
+              <a:t> (92 features)</a:t>
+            </a:r>
+          </a:p>
+          <a:p>
+            <a:pPr lvl="1"/>
+            <a:endParaRPr lang="en-US" sz="1600" dirty="0"/>
+          </a:p>
+        </p:txBody>
+      </p:sp>
+      <p:sp>
+        <p:nvSpPr>
+          <p:cNvPr id="4" name="Slide Number Placeholder 3"/>
+          <p:cNvSpPr>
+            <a:spLocks noGrp="1"/>
+          </p:cNvSpPr>
+          <p:nvPr>
+            <p:ph type="sldNum" sz="quarter" idx="4"/>
+          </p:nvPr>
+        </p:nvSpPr>
+        <p:spPr/>
+        <p:txBody>
+          <a:bodyPr/>
+          <a:lstStyle/>
+          <a:p>
+            <a:pPr>
+              <a:defRPr/>
+            </a:pPr>
+            <a:r>
+              <a:rPr lang="en-US" smtClean="0"/>
+              <a:t>- </a:t>
+            </a:r>
+            <a:fld id="{5702A24C-C4CD-4510-A1DD-CEB556D2535A}" type="slidenum">
+              <a:rPr lang="en-US" smtClean="0"/>
+              <a:pPr>
+                <a:defRPr/>
+              </a:pPr>
+              <a:t>5</a:t>
+            </a:fld>
+            <a:r>
+              <a:rPr lang="en-US" smtClean="0"/>
+              <a:t> -</a:t>
+            </a:r>
+            <a:endParaRPr lang="en-US"/>
+          </a:p>
+        </p:txBody>
+      </p:sp>
+    </p:spTree>
+    <p:extLst>
+      <p:ext uri="{BB962C8B-B14F-4D97-AF65-F5344CB8AC3E}">
+        <p14:creationId xmlns:p14="http://schemas.microsoft.com/office/powerpoint/2010/main" val="1794099963"/>
+      </p:ext>
+    </p:extLst>
+  </p:cSld>
+  <p:clrMapOvr>
+    <a:masterClrMapping/>
+  </p:clrMapOvr>
+</p:sld>
+</file>
+
+<file path=ppt/slides/slide6.xml><?xml version="1.0" encoding="utf-8"?>
+<p:sld xmlns:a="http://schemas.openxmlformats.org/drawingml/2006/main" xmlns:r="http://schemas.openxmlformats.org/officeDocument/2006/relationships" xmlns:p="http://schemas.openxmlformats.org/presentationml/2006/main">
+  <p:cSld>
+    <p:spTree>
+      <p:nvGrpSpPr>
+        <p:cNvPr id="1" name=""/>
+        <p:cNvGrpSpPr/>
+        <p:nvPr/>
+      </p:nvGrpSpPr>
+      <p:grpSpPr>
+        <a:xfrm>
+          <a:off x="0" y="0"/>
+          <a:ext cx="0" cy="0"/>
+          <a:chOff x="0" y="0"/>
+          <a:chExt cx="0" cy="0"/>
+        </a:xfrm>
+      </p:grpSpPr>
+      <p:sp>
+        <p:nvSpPr>
+          <p:cNvPr id="2" name="Title 1"/>
+          <p:cNvSpPr>
+            <a:spLocks noGrp="1"/>
+          </p:cNvSpPr>
+          <p:nvPr>
+            <p:ph type="title"/>
+          </p:nvPr>
+        </p:nvSpPr>
+        <p:spPr/>
+        <p:txBody>
+          <a:bodyPr/>
+          <a:lstStyle/>
+          <a:p>
+            <a:r>
+              <a:rPr lang="en-US" dirty="0" smtClean="0"/>
+              <a:t>Proposed Approaches</a:t>
+            </a:r>
+            <a:endParaRPr lang="en-US" dirty="0"/>
+          </a:p>
+        </p:txBody>
+      </p:sp>
+      <p:sp>
+        <p:nvSpPr>
+          <p:cNvPr id="3" name="Content Placeholder 2"/>
+          <p:cNvSpPr>
+            <a:spLocks noGrp="1"/>
+          </p:cNvSpPr>
+          <p:nvPr>
+            <p:ph idx="1"/>
+          </p:nvPr>
+        </p:nvSpPr>
+        <p:spPr/>
+        <p:txBody>
+          <a:bodyPr/>
+          <a:lstStyle/>
+          <a:p>
+            <a:r>
+              <a:rPr lang="en-US" sz="2000" dirty="0" smtClean="0"/>
+              <a:t>Data Set Feature Reduction using PCA</a:t>
+            </a:r>
+          </a:p>
+          <a:p>
+            <a:r>
+              <a:rPr lang="en-US" sz="2000" dirty="0" smtClean="0"/>
+              <a:t>ARIMA Modeling</a:t>
+            </a:r>
+          </a:p>
+          <a:p>
+            <a:r>
+              <a:rPr lang="en-US" sz="2000" dirty="0" smtClean="0"/>
+              <a:t>Nearest Neighbor Modeling</a:t>
+            </a:r>
+          </a:p>
+          <a:p>
+            <a:r>
+              <a:rPr lang="en-US" sz="2000" dirty="0" smtClean="0"/>
+              <a:t>K Means Clustering (if we accomplish)</a:t>
+            </a:r>
+          </a:p>
+          <a:p>
+            <a:r>
+              <a:rPr lang="en-US" sz="2000" dirty="0" smtClean="0"/>
+              <a:t>Time Series Linear Modeling</a:t>
+            </a:r>
+          </a:p>
+          <a:p>
+            <a:endParaRPr lang="en-US" sz="2000" dirty="0" smtClean="0"/>
+          </a:p>
+          <a:p>
+            <a:endParaRPr lang="en-US" sz="2000" dirty="0" smtClean="0"/>
+          </a:p>
+          <a:p>
+            <a:endParaRPr lang="en-US" sz="2000" dirty="0"/>
+          </a:p>
+        </p:txBody>
+      </p:sp>
+      <p:sp>
+        <p:nvSpPr>
+          <p:cNvPr id="4" name="Slide Number Placeholder 3"/>
+          <p:cNvSpPr>
+            <a:spLocks noGrp="1"/>
+          </p:cNvSpPr>
+          <p:nvPr>
+            <p:ph type="sldNum" sz="quarter" idx="4"/>
+          </p:nvPr>
+        </p:nvSpPr>
+        <p:spPr/>
+        <p:txBody>
+          <a:bodyPr/>
+          <a:lstStyle/>
+          <a:p>
+            <a:pPr>
+              <a:defRPr/>
+            </a:pPr>
+            <a:r>
+              <a:rPr lang="en-US" smtClean="0"/>
+              <a:t>- </a:t>
+            </a:r>
+            <a:fld id="{5702A24C-C4CD-4510-A1DD-CEB556D2535A}" type="slidenum">
+              <a:rPr lang="en-US" smtClean="0"/>
+              <a:pPr>
+                <a:defRPr/>
+              </a:pPr>
+              <a:t>6</a:t>
+            </a:fld>
+            <a:r>
+              <a:rPr lang="en-US" smtClean="0"/>
+              <a:t> -</a:t>
+            </a:r>
+            <a:endParaRPr lang="en-US"/>
+          </a:p>
+        </p:txBody>
+      </p:sp>
+    </p:spTree>
+    <p:extLst>
+      <p:ext uri="{BB962C8B-B14F-4D97-AF65-F5344CB8AC3E}">
+        <p14:creationId xmlns:p14="http://schemas.microsoft.com/office/powerpoint/2010/main" val="1020171959"/>
+      </p:ext>
+    </p:extLst>
+  </p:cSld>
+  <p:clrMapOvr>
+    <a:masterClrMapping/>
+  </p:clrMapOvr>
+</p:sld>
+</file>
+
+<file path=ppt/slides/slide7.xml><?xml version="1.0" encoding="utf-8"?>
+<p:sld xmlns:a="http://schemas.openxmlformats.org/drawingml/2006/main" xmlns:r="http://schemas.openxmlformats.org/officeDocument/2006/relationships" xmlns:p="http://schemas.openxmlformats.org/presentationml/2006/main">
+  <p:cSld>
+    <p:spTree>
+      <p:nvGrpSpPr>
+        <p:cNvPr id="1" name=""/>
+        <p:cNvGrpSpPr/>
+        <p:nvPr/>
+      </p:nvGrpSpPr>
+      <p:grpSpPr>
+        <a:xfrm>
+          <a:off x="0" y="0"/>
+          <a:ext cx="0" cy="0"/>
+          <a:chOff x="0" y="0"/>
+          <a:chExt cx="0" cy="0"/>
+        </a:xfrm>
+      </p:grpSpPr>
+      <p:sp>
+        <p:nvSpPr>
+          <p:cNvPr id="2" name="Title 1"/>
+          <p:cNvSpPr>
+            <a:spLocks noGrp="1"/>
+          </p:cNvSpPr>
+          <p:nvPr>
+            <p:ph type="title"/>
+          </p:nvPr>
+        </p:nvSpPr>
+        <p:spPr/>
+        <p:txBody>
+          <a:bodyPr/>
+          <a:lstStyle/>
+          <a:p>
+            <a:r>
+              <a:rPr lang="en-US" dirty="0" smtClean="0"/>
+              <a:t>Feature Selection using PCA</a:t>
+            </a:r>
+            <a:endParaRPr lang="en-US" dirty="0"/>
+          </a:p>
+        </p:txBody>
+      </p:sp>
+      <p:sp>
+        <p:nvSpPr>
+          <p:cNvPr id="3" name="Content Placeholder 2"/>
+          <p:cNvSpPr>
+            <a:spLocks noGrp="1"/>
+          </p:cNvSpPr>
+          <p:nvPr>
+            <p:ph idx="1"/>
+          </p:nvPr>
+        </p:nvSpPr>
+        <p:spPr/>
+        <p:txBody>
+          <a:bodyPr/>
+          <a:lstStyle/>
+          <a:p>
+            <a:endParaRPr lang="en-US"/>
+          </a:p>
+        </p:txBody>
+      </p:sp>
+      <p:sp>
+        <p:nvSpPr>
+          <p:cNvPr id="4" name="Slide Number Placeholder 3"/>
+          <p:cNvSpPr>
+            <a:spLocks noGrp="1"/>
+          </p:cNvSpPr>
+          <p:nvPr>
+            <p:ph type="sldNum" sz="quarter" idx="4"/>
+          </p:nvPr>
+        </p:nvSpPr>
+        <p:spPr/>
+        <p:txBody>
+          <a:bodyPr/>
+          <a:lstStyle/>
+          <a:p>
+            <a:pPr>
+              <a:defRPr/>
+            </a:pPr>
+            <a:r>
+              <a:rPr lang="en-US" smtClean="0"/>
+              <a:t>- </a:t>
+            </a:r>
+            <a:fld id="{5702A24C-C4CD-4510-A1DD-CEB556D2535A}" type="slidenum">
+              <a:rPr lang="en-US" smtClean="0"/>
+              <a:pPr>
+                <a:defRPr/>
+              </a:pPr>
+              <a:t>7</a:t>
+            </a:fld>
+            <a:r>
+              <a:rPr lang="en-US" smtClean="0"/>
+              <a:t> -</a:t>
+            </a:r>
+            <a:endParaRPr lang="en-US"/>
+          </a:p>
+        </p:txBody>
+      </p:sp>
+    </p:spTree>
+    <p:extLst>
+      <p:ext uri="{BB962C8B-B14F-4D97-AF65-F5344CB8AC3E}">
+        <p14:creationId xmlns:p14="http://schemas.microsoft.com/office/powerpoint/2010/main" val="1723904967"/>
+      </p:ext>
+    </p:extLst>
+  </p:cSld>
+  <p:clrMapOvr>
+    <a:masterClrMapping/>
+  </p:clrMapOvr>
+</p:sld>
+</file>
+
+<file path=ppt/slides/slide8.xml><?xml version="1.0" encoding="utf-8"?>
+<p:sld xmlns:a="http://schemas.openxmlformats.org/drawingml/2006/main" xmlns:r="http://schemas.openxmlformats.org/officeDocument/2006/relationships" xmlns:p="http://schemas.openxmlformats.org/presentationml/2006/main">
+  <p:cSld>
+    <p:spTree>
+      <p:nvGrpSpPr>
+        <p:cNvPr id="1" name=""/>
+        <p:cNvGrpSpPr/>
+        <p:nvPr/>
+      </p:nvGrpSpPr>
+      <p:grpSpPr>
+        <a:xfrm>
+          <a:off x="0" y="0"/>
+          <a:ext cx="0" cy="0"/>
+          <a:chOff x="0" y="0"/>
+          <a:chExt cx="0" cy="0"/>
+        </a:xfrm>
+      </p:grpSpPr>
+      <p:sp>
+        <p:nvSpPr>
+          <p:cNvPr id="2" name="Title 1"/>
+          <p:cNvSpPr>
+            <a:spLocks noGrp="1"/>
+          </p:cNvSpPr>
+          <p:nvPr>
+            <p:ph type="title"/>
+          </p:nvPr>
+        </p:nvSpPr>
+        <p:spPr/>
+        <p:txBody>
+          <a:bodyPr/>
+          <a:lstStyle/>
+          <a:p>
+            <a:r>
+              <a:rPr lang="en-US" dirty="0" smtClean="0"/>
+              <a:t>ARIMA Modeling</a:t>
+            </a:r>
+            <a:endParaRPr lang="en-US" dirty="0"/>
+          </a:p>
+        </p:txBody>
+      </p:sp>
+      <p:sp>
+        <p:nvSpPr>
+          <p:cNvPr id="3" name="Content Placeholder 2"/>
+          <p:cNvSpPr>
+            <a:spLocks noGrp="1"/>
+          </p:cNvSpPr>
+          <p:nvPr>
+            <p:ph idx="1"/>
+          </p:nvPr>
+        </p:nvSpPr>
+        <p:spPr/>
+        <p:txBody>
+          <a:bodyPr/>
+          <a:lstStyle/>
+          <a:p>
+            <a:endParaRPr lang="en-US"/>
+          </a:p>
+        </p:txBody>
+      </p:sp>
+      <p:sp>
+        <p:nvSpPr>
+          <p:cNvPr id="4" name="Slide Number Placeholder 3"/>
+          <p:cNvSpPr>
+            <a:spLocks noGrp="1"/>
+          </p:cNvSpPr>
+          <p:nvPr>
+            <p:ph type="sldNum" sz="quarter" idx="4"/>
+          </p:nvPr>
+        </p:nvSpPr>
+        <p:spPr/>
+        <p:txBody>
+          <a:bodyPr/>
+          <a:lstStyle/>
+          <a:p>
+            <a:pPr>
+              <a:defRPr/>
+            </a:pPr>
+            <a:r>
+              <a:rPr lang="en-US" smtClean="0"/>
+              <a:t>- </a:t>
+            </a:r>
+            <a:fld id="{5702A24C-C4CD-4510-A1DD-CEB556D2535A}" type="slidenum">
+              <a:rPr lang="en-US" smtClean="0"/>
+              <a:pPr>
+                <a:defRPr/>
+              </a:pPr>
+              <a:t>8</a:t>
+            </a:fld>
+            <a:r>
+              <a:rPr lang="en-US" smtClean="0"/>
+              <a:t> -</a:t>
+            </a:r>
+            <a:endParaRPr lang="en-US"/>
+          </a:p>
+        </p:txBody>
+      </p:sp>
+    </p:spTree>
+    <p:extLst>
+      <p:ext uri="{BB962C8B-B14F-4D97-AF65-F5344CB8AC3E}">
+        <p14:creationId xmlns:p14="http://schemas.microsoft.com/office/powerpoint/2010/main" val="1256808137"/>
+      </p:ext>
+    </p:extLst>
+  </p:cSld>
+  <p:clrMapOvr>
+    <a:masterClrMapping/>
+  </p:clrMapOvr>
+</p:sld>
+</file>
+
+<file path=ppt/slides/slide9.xml><?xml version="1.0" encoding="utf-8"?>
+<p:sld xmlns:a="http://schemas.openxmlformats.org/drawingml/2006/main" xmlns:r="http://schemas.openxmlformats.org/officeDocument/2006/relationships" xmlns:p="http://schemas.openxmlformats.org/presentationml/2006/main">
+  <p:cSld>
+    <p:spTree>
+      <p:nvGrpSpPr>
+        <p:cNvPr id="1" name=""/>
+        <p:cNvGrpSpPr/>
+        <p:nvPr/>
+      </p:nvGrpSpPr>
+      <p:grpSpPr>
+        <a:xfrm>
+          <a:off x="0" y="0"/>
+          <a:ext cx="0" cy="0"/>
+          <a:chOff x="0" y="0"/>
+          <a:chExt cx="0" cy="0"/>
+        </a:xfrm>
+      </p:grpSpPr>
+      <p:sp>
+        <p:nvSpPr>
+          <p:cNvPr id="2" name="Title 1"/>
+          <p:cNvSpPr>
+            <a:spLocks noGrp="1"/>
+          </p:cNvSpPr>
+          <p:nvPr>
+            <p:ph type="title"/>
+          </p:nvPr>
+        </p:nvSpPr>
+        <p:spPr/>
+        <p:txBody>
+          <a:bodyPr/>
+          <a:lstStyle/>
+          <a:p>
+            <a:r>
+              <a:rPr lang="en-US" dirty="0" smtClean="0"/>
+              <a:t>Nearest </a:t>
+            </a:r>
+            <a:r>
+              <a:rPr lang="en-US" dirty="0" err="1" smtClean="0"/>
+              <a:t>Neighbour</a:t>
+            </a:r>
+            <a:r>
+              <a:rPr lang="en-US" dirty="0" smtClean="0"/>
+              <a:t> Modeling</a:t>
+            </a:r>
+            <a:endParaRPr lang="en-US" dirty="0"/>
+          </a:p>
+        </p:txBody>
+      </p:sp>
+      <p:sp>
+        <p:nvSpPr>
+          <p:cNvPr id="3" name="Content Placeholder 2"/>
+          <p:cNvSpPr>
+            <a:spLocks noGrp="1"/>
+          </p:cNvSpPr>
+          <p:nvPr>
+            <p:ph idx="1"/>
+          </p:nvPr>
+        </p:nvSpPr>
+        <p:spPr/>
+        <p:txBody>
+          <a:bodyPr/>
+          <a:lstStyle/>
+          <a:p>
+            <a:endParaRPr lang="en-US"/>
+          </a:p>
+        </p:txBody>
+      </p:sp>
+      <p:sp>
+        <p:nvSpPr>
+          <p:cNvPr id="4" name="Slide Number Placeholder 3"/>
+          <p:cNvSpPr>
+            <a:spLocks noGrp="1"/>
+          </p:cNvSpPr>
+          <p:nvPr>
+            <p:ph type="sldNum" sz="quarter" idx="4"/>
+          </p:nvPr>
+        </p:nvSpPr>
+        <p:spPr/>
+        <p:txBody>
+          <a:bodyPr/>
+          <a:lstStyle/>
+          <a:p>
+            <a:pPr>
+              <a:defRPr/>
+            </a:pPr>
+            <a:r>
+              <a:rPr lang="en-US" smtClean="0"/>
+              <a:t>- </a:t>
+            </a:r>
+            <a:fld id="{5702A24C-C4CD-4510-A1DD-CEB556D2535A}" type="slidenum">
+              <a:rPr lang="en-US" smtClean="0"/>
+              <a:pPr>
+                <a:defRPr/>
+              </a:pPr>
+              <a:t>9</a:t>
+            </a:fld>
+            <a:r>
+              <a:rPr lang="en-US" smtClean="0"/>
+              <a:t> -</a:t>
+            </a:r>
+            <a:endParaRPr lang="en-US"/>
+          </a:p>
+        </p:txBody>
+      </p:sp>
+    </p:spTree>
+    <p:extLst>
+      <p:ext uri="{BB962C8B-B14F-4D97-AF65-F5344CB8AC3E}">
+        <p14:creationId xmlns:p14="http://schemas.microsoft.com/office/powerpoint/2010/main" val="2021391220"/>
       </p:ext>
     </p:extLst>
   </p:cSld>

</xml_diff>

<commit_message>
Renamed Baseline predictions and minor changes to presentation
</commit_message>
<xml_diff>
--- a/Presentation/575-ClassProject-Template.pptx
+++ b/Presentation/575-ClassProject-Template.pptx
@@ -8711,15 +8711,7 @@
             </a:pPr>
             <a:r>
               <a:rPr lang="en-US" sz="1800" dirty="0" smtClean="0"/>
-              <a:t>Nearest </a:t>
-            </a:r>
-            <a:r>
-              <a:rPr lang="en-US" sz="1800" dirty="0" err="1" smtClean="0"/>
-              <a:t>Neighbour</a:t>
-            </a:r>
-            <a:r>
-              <a:rPr lang="en-US" sz="1800" dirty="0" smtClean="0"/>
-              <a:t> Modeling</a:t>
+              <a:t>Nearest Neighbor Modeling</a:t>
             </a:r>
           </a:p>
           <a:p>
@@ -9233,8 +9225,28 @@
           <a:lstStyle/>
           <a:p>
             <a:r>
-              <a:rPr lang="en-US" sz="2000" dirty="0" smtClean="0"/>
-              <a:t>Source:</a:t>
+              <a:rPr lang="en-US" sz="2000" dirty="0"/>
+              <a:t>Source: </a:t>
+            </a:r>
+            <a:r>
+              <a:rPr lang="en-US" sz="2000" dirty="0">
+                <a:hlinkClick r:id="rId2"/>
+              </a:rPr>
+              <a:t>http://www.noaa.gov</a:t>
+            </a:r>
+            <a:r>
+              <a:rPr lang="en-US" sz="2000" dirty="0" smtClean="0">
+                <a:hlinkClick r:id="rId2"/>
+              </a:rPr>
+              <a:t>/</a:t>
+            </a:r>
+            <a:endParaRPr lang="en-US" sz="2000" dirty="0" smtClean="0"/>
+          </a:p>
+          <a:p>
+            <a:pPr lvl="1"/>
+            <a:r>
+              <a:rPr lang="en-US" sz="1600" dirty="0" smtClean="0"/>
+              <a:t>National Oceanic and Atmospheric Administration by the U.S Department of Commerce</a:t>
             </a:r>
           </a:p>
           <a:p>
@@ -9262,23 +9274,15 @@
             </a:r>
             <a:r>
               <a:rPr lang="en-US" sz="1600" dirty="0" smtClean="0"/>
-              <a:t> Station, elevation, </a:t>
-            </a:r>
-            <a:r>
-              <a:rPr lang="en-US" sz="1600" dirty="0" err="1" smtClean="0"/>
-              <a:t>Sunrisem</a:t>
+              <a:t> Station, elevation, Sunrise, sunset, wind speed, Pressure change, sky </a:t>
+            </a:r>
+            <a:r>
+              <a:rPr lang="en-US" sz="1600" smtClean="0"/>
+              <a:t>conditions etc. </a:t>
             </a:r>
             <a:r>
               <a:rPr lang="en-US" sz="1600" dirty="0" smtClean="0"/>
-              <a:t> sunset, wind speed, Pressure change, sky conditions </a:t>
-            </a:r>
-            <a:r>
-              <a:rPr lang="en-US" sz="1600" dirty="0" err="1" smtClean="0"/>
-              <a:t>etc</a:t>
-            </a:r>
-            <a:r>
-              <a:rPr lang="en-US" sz="1600" dirty="0" smtClean="0"/>
-              <a:t> (92 features)</a:t>
+              <a:t>(92 features)</a:t>
             </a:r>
           </a:p>
           <a:p>

</xml_diff>

<commit_message>
Images and Resutls of ARIMA model for DAL and SEA, updated presentation
</commit_message>
<xml_diff>
--- a/Presentation/575-ClassProject-Template.pptx
+++ b/Presentation/575-ClassProject-Template.pptx
@@ -6,10 +6,10 @@
     <p:sldMasterId id="2147483662" r:id="rId2"/>
   </p:sldMasterIdLst>
   <p:notesMasterIdLst>
-    <p:notesMasterId r:id="rId19"/>
+    <p:notesMasterId r:id="rId20"/>
   </p:notesMasterIdLst>
   <p:handoutMasterIdLst>
-    <p:handoutMasterId r:id="rId20"/>
+    <p:handoutMasterId r:id="rId21"/>
   </p:handoutMasterIdLst>
   <p:sldIdLst>
     <p:sldId id="853" r:id="rId3"/>
@@ -18,16 +18,17 @@
     <p:sldId id="855" r:id="rId6"/>
     <p:sldId id="856" r:id="rId7"/>
     <p:sldId id="857" r:id="rId8"/>
-    <p:sldId id="858" r:id="rId9"/>
-    <p:sldId id="859" r:id="rId10"/>
-    <p:sldId id="860" r:id="rId11"/>
-    <p:sldId id="861" r:id="rId12"/>
-    <p:sldId id="862" r:id="rId13"/>
-    <p:sldId id="863" r:id="rId14"/>
-    <p:sldId id="864" r:id="rId15"/>
-    <p:sldId id="865" r:id="rId16"/>
-    <p:sldId id="867" r:id="rId17"/>
-    <p:sldId id="866" r:id="rId18"/>
+    <p:sldId id="868" r:id="rId9"/>
+    <p:sldId id="858" r:id="rId10"/>
+    <p:sldId id="859" r:id="rId11"/>
+    <p:sldId id="860" r:id="rId12"/>
+    <p:sldId id="861" r:id="rId13"/>
+    <p:sldId id="862" r:id="rId14"/>
+    <p:sldId id="863" r:id="rId15"/>
+    <p:sldId id="864" r:id="rId16"/>
+    <p:sldId id="865" r:id="rId17"/>
+    <p:sldId id="867" r:id="rId18"/>
+    <p:sldId id="866" r:id="rId19"/>
   </p:sldIdLst>
   <p:sldSz cx="9144000" cy="6858000" type="screen4x3"/>
   <p:notesSz cx="7315200" cy="9601200"/>
@@ -7393,12 +7394,17 @@
           <a:p>
             <a:r>
               <a:rPr lang="en-US" dirty="0" smtClean="0"/>
-              <a:t>K-Means Clusterin</a:t>
-            </a:r>
-            <a:r>
-              <a:rPr lang="en-US" dirty="0"/>
-              <a:t>g</a:t>
-            </a:r>
+              <a:t>Nearest </a:t>
+            </a:r>
+            <a:r>
+              <a:rPr lang="en-US" dirty="0" err="1" smtClean="0"/>
+              <a:t>Neighbour</a:t>
+            </a:r>
+            <a:r>
+              <a:rPr lang="en-US" dirty="0" smtClean="0"/>
+              <a:t> Modeling</a:t>
+            </a:r>
+            <a:endParaRPr lang="en-US" dirty="0"/>
           </a:p>
         </p:txBody>
       </p:sp>
@@ -7461,7 +7467,7 @@
     </p:spTree>
     <p:extLst>
       <p:ext uri="{BB962C8B-B14F-4D97-AF65-F5344CB8AC3E}">
-        <p14:creationId xmlns:p14="http://schemas.microsoft.com/office/powerpoint/2010/main" val="1635773753"/>
+        <p14:creationId xmlns:p14="http://schemas.microsoft.com/office/powerpoint/2010/main" val="2021391220"/>
       </p:ext>
     </p:extLst>
   </p:cSld>
@@ -7505,9 +7511,12 @@
           <a:p>
             <a:r>
               <a:rPr lang="en-US" dirty="0" smtClean="0"/>
-              <a:t>Time Series Linear Modeling</a:t>
-            </a:r>
-            <a:endParaRPr lang="en-US" dirty="0"/>
+              <a:t>K-Means Clusterin</a:t>
+            </a:r>
+            <a:r>
+              <a:rPr lang="en-US" dirty="0"/>
+              <a:t>g</a:t>
+            </a:r>
           </a:p>
         </p:txBody>
       </p:sp>
@@ -7570,7 +7579,7 @@
     </p:spTree>
     <p:extLst>
       <p:ext uri="{BB962C8B-B14F-4D97-AF65-F5344CB8AC3E}">
-        <p14:creationId xmlns:p14="http://schemas.microsoft.com/office/powerpoint/2010/main" val="411675073"/>
+        <p14:creationId xmlns:p14="http://schemas.microsoft.com/office/powerpoint/2010/main" val="1635773753"/>
       </p:ext>
     </p:extLst>
   </p:cSld>
@@ -7614,7 +7623,7 @@
           <a:p>
             <a:r>
               <a:rPr lang="en-US" dirty="0" smtClean="0"/>
-              <a:t>Experiments</a:t>
+              <a:t>Time Series Linear Modeling</a:t>
             </a:r>
             <a:endParaRPr lang="en-US" dirty="0"/>
           </a:p>
@@ -7679,7 +7688,7 @@
     </p:spTree>
     <p:extLst>
       <p:ext uri="{BB962C8B-B14F-4D97-AF65-F5344CB8AC3E}">
-        <p14:creationId xmlns:p14="http://schemas.microsoft.com/office/powerpoint/2010/main" val="741420163"/>
+        <p14:creationId xmlns:p14="http://schemas.microsoft.com/office/powerpoint/2010/main" val="411675073"/>
       </p:ext>
     </p:extLst>
   </p:cSld>
@@ -7723,7 +7732,7 @@
           <a:p>
             <a:r>
               <a:rPr lang="en-US" dirty="0" smtClean="0"/>
-              <a:t>Results</a:t>
+              <a:t>Experiments</a:t>
             </a:r>
             <a:endParaRPr lang="en-US" dirty="0"/>
           </a:p>
@@ -7788,7 +7797,7 @@
     </p:spTree>
     <p:extLst>
       <p:ext uri="{BB962C8B-B14F-4D97-AF65-F5344CB8AC3E}">
-        <p14:creationId xmlns:p14="http://schemas.microsoft.com/office/powerpoint/2010/main" val="635111409"/>
+        <p14:creationId xmlns:p14="http://schemas.microsoft.com/office/powerpoint/2010/main" val="741420163"/>
       </p:ext>
     </p:extLst>
   </p:cSld>
@@ -7832,7 +7841,7 @@
           <a:p>
             <a:r>
               <a:rPr lang="en-US" dirty="0" smtClean="0"/>
-              <a:t>Future Prospects</a:t>
+              <a:t>Results</a:t>
             </a:r>
             <a:endParaRPr lang="en-US" dirty="0"/>
           </a:p>
@@ -7876,7 +7885,7 @@
               <a:defRPr/>
             </a:pPr>
             <a:r>
-              <a:rPr lang="en-US" dirty="0" smtClean="0"/>
+              <a:rPr lang="en-US" smtClean="0"/>
               <a:t>- </a:t>
             </a:r>
             <a:fld id="{5702A24C-C4CD-4510-A1DD-CEB556D2535A}" type="slidenum">
@@ -7887,79 +7896,17 @@
               <a:t>14</a:t>
             </a:fld>
             <a:r>
-              <a:rPr lang="en-US" dirty="0" smtClean="0"/>
+              <a:rPr lang="en-US" smtClean="0"/>
               <a:t> -</a:t>
             </a:r>
-            <a:endParaRPr lang="en-US" dirty="0"/>
-          </a:p>
-        </p:txBody>
-      </p:sp>
-      <p:sp>
-        <p:nvSpPr>
-          <p:cNvPr id="5" name="Rectangle 4"/>
-          <p:cNvSpPr/>
-          <p:nvPr/>
-        </p:nvSpPr>
-        <p:spPr>
-          <a:xfrm>
-            <a:off x="2116808" y="6136769"/>
-            <a:ext cx="7027192" cy="253916"/>
-          </a:xfrm>
-          <a:prstGeom prst="rect">
-            <a:avLst/>
-          </a:prstGeom>
-        </p:spPr>
-        <p:txBody>
-          <a:bodyPr wrap="square">
-            <a:spAutoFit/>
-          </a:bodyPr>
-          <a:lstStyle/>
-          <a:p>
-            <a:r>
-              <a:rPr lang="en-US" sz="1050" smtClean="0">
-                <a:latin typeface="Times" charset="0"/>
-                <a:ea typeface="Times" charset="0"/>
-                <a:cs typeface="Times" charset="0"/>
-              </a:rPr>
-              <a:t>“All </a:t>
-            </a:r>
-            <a:r>
-              <a:rPr lang="en-US" sz="1050" dirty="0">
-                <a:latin typeface="Times" charset="0"/>
-                <a:ea typeface="Times" charset="0"/>
-                <a:cs typeface="Times" charset="0"/>
-              </a:rPr>
-              <a:t>the team members agree on the team members’ contributions in terms of both (a) what s/he did and (b) </a:t>
-            </a:r>
-            <a:r>
-              <a:rPr lang="en-US" sz="1050">
-                <a:latin typeface="Times" charset="0"/>
-                <a:ea typeface="Times" charset="0"/>
-                <a:cs typeface="Times" charset="0"/>
-              </a:rPr>
-              <a:t>the </a:t>
-            </a:r>
-            <a:r>
-              <a:rPr lang="en-US" sz="1050" smtClean="0">
-                <a:latin typeface="Times" charset="0"/>
-                <a:ea typeface="Times" charset="0"/>
-                <a:cs typeface="Times" charset="0"/>
-              </a:rPr>
-              <a:t>percentage”</a:t>
-            </a:r>
-            <a:endParaRPr lang="en-US" sz="1050" dirty="0">
-              <a:effectLst/>
-              <a:latin typeface="Times" charset="0"/>
-              <a:ea typeface="Times" charset="0"/>
-              <a:cs typeface="Times" charset="0"/>
-            </a:endParaRPr>
+            <a:endParaRPr lang="en-US"/>
           </a:p>
         </p:txBody>
       </p:sp>
     </p:spTree>
     <p:extLst>
       <p:ext uri="{BB962C8B-B14F-4D97-AF65-F5344CB8AC3E}">
-        <p14:creationId xmlns:p14="http://schemas.microsoft.com/office/powerpoint/2010/main" val="1689286747"/>
+        <p14:creationId xmlns:p14="http://schemas.microsoft.com/office/powerpoint/2010/main" val="635111409"/>
       </p:ext>
     </p:extLst>
   </p:cSld>
@@ -8003,7 +7950,7 @@
           <a:p>
             <a:r>
               <a:rPr lang="en-US" dirty="0" smtClean="0"/>
-              <a:t>Team Members</a:t>
+              <a:t>Future Prospects</a:t>
             </a:r>
             <a:endParaRPr lang="en-US" dirty="0"/>
           </a:p>
@@ -8024,311 +7971,7 @@
           <a:bodyPr/>
           <a:lstStyle/>
           <a:p>
-            <a:pPr>
-              <a:buFont typeface="+mj-lt"/>
-              <a:buAutoNum type="arabicPeriod"/>
-            </a:pPr>
-            <a:r>
-              <a:rPr lang="hr-HR" sz="1600" dirty="0" err="1"/>
-              <a:t>Balaji</a:t>
-            </a:r>
-            <a:r>
-              <a:rPr lang="hr-HR" sz="1600" dirty="0"/>
-              <a:t> </a:t>
-            </a:r>
-            <a:r>
-              <a:rPr lang="hr-HR" sz="1600" dirty="0" err="1"/>
-              <a:t>Sankar</a:t>
-            </a:r>
-            <a:r>
-              <a:rPr lang="hr-HR" sz="1600" dirty="0"/>
-              <a:t> </a:t>
-            </a:r>
-            <a:r>
-              <a:rPr lang="mr-IN" sz="1600" dirty="0"/>
-              <a:t>–</a:t>
-            </a:r>
-            <a:r>
-              <a:rPr lang="hr-HR" sz="1600" dirty="0"/>
-              <a:t> 1209346459 </a:t>
-            </a:r>
-            <a:r>
-              <a:rPr lang="en-US" sz="1600" dirty="0"/>
-              <a:t>- </a:t>
-            </a:r>
-            <a:r>
-              <a:rPr lang="en-US" sz="1600" dirty="0">
-                <a:hlinkClick r:id="rId2"/>
-              </a:rPr>
-              <a:t>bsankar@asu.edu</a:t>
-            </a:r>
-            <a:r>
-              <a:rPr lang="en-US" sz="1600" dirty="0"/>
-              <a:t> </a:t>
-            </a:r>
-            <a:r>
-              <a:rPr lang="mr-IN" sz="1600" dirty="0"/>
-              <a:t>–</a:t>
-            </a:r>
-            <a:r>
-              <a:rPr lang="en-US" sz="1600" dirty="0"/>
-              <a:t> 20% </a:t>
-            </a:r>
-            <a:r>
-              <a:rPr lang="en-US" sz="1600" dirty="0" smtClean="0"/>
-              <a:t>contribution</a:t>
-            </a:r>
-          </a:p>
-          <a:p>
-            <a:pPr lvl="1">
-              <a:buFont typeface="+mj-lt"/>
-              <a:buAutoNum type="arabicPeriod"/>
-            </a:pPr>
-            <a:r>
-              <a:rPr lang="en-US" sz="1200" dirty="0" smtClean="0"/>
-              <a:t>&lt;contribution&gt;</a:t>
-            </a:r>
-            <a:endParaRPr lang="hr-HR" sz="1200" dirty="0"/>
-          </a:p>
-          <a:p>
-            <a:pPr>
-              <a:buFont typeface="+mj-lt"/>
-              <a:buAutoNum type="arabicPeriod"/>
-            </a:pPr>
-            <a:r>
-              <a:rPr lang="en-US" sz="1600" dirty="0" err="1"/>
-              <a:t>Karthik</a:t>
-            </a:r>
-            <a:r>
-              <a:rPr lang="en-US" sz="1600" dirty="0"/>
-              <a:t> Subramanian </a:t>
-            </a:r>
-            <a:r>
-              <a:rPr lang="mr-IN" sz="1600" dirty="0"/>
-              <a:t>–</a:t>
-            </a:r>
-            <a:r>
-              <a:rPr lang="en-US" sz="1600" dirty="0"/>
-              <a:t> 1209360876 - </a:t>
-            </a:r>
-            <a:r>
-              <a:rPr lang="en-US" sz="1600" dirty="0">
-                <a:hlinkClick r:id="rId3"/>
-              </a:rPr>
-              <a:t>ksubra19@asu.edu</a:t>
-            </a:r>
-            <a:r>
-              <a:rPr lang="en-US" sz="1600" dirty="0"/>
-              <a:t> </a:t>
-            </a:r>
-            <a:r>
-              <a:rPr lang="mr-IN" sz="1600" dirty="0"/>
-              <a:t>–</a:t>
-            </a:r>
-            <a:r>
-              <a:rPr lang="en-US" sz="1600" dirty="0"/>
-              <a:t> 20% </a:t>
-            </a:r>
-            <a:r>
-              <a:rPr lang="en-US" sz="1600" dirty="0" smtClean="0"/>
-              <a:t>contribution</a:t>
-            </a:r>
-          </a:p>
-          <a:p>
-            <a:pPr lvl="1">
-              <a:buFont typeface="+mj-lt"/>
-              <a:buAutoNum type="arabicPeriod"/>
-            </a:pPr>
-            <a:r>
-              <a:rPr lang="en-US" sz="1200" dirty="0"/>
-              <a:t>&lt;contribution&gt;</a:t>
-            </a:r>
-          </a:p>
-          <a:p>
-            <a:pPr>
-              <a:buFont typeface="+mj-lt"/>
-              <a:buAutoNum type="arabicPeriod"/>
-            </a:pPr>
-            <a:r>
-              <a:rPr lang="en-US" sz="1600" dirty="0" err="1"/>
-              <a:t>Aarti</a:t>
-            </a:r>
-            <a:r>
-              <a:rPr lang="en-US" sz="1600" dirty="0"/>
-              <a:t> Rao </a:t>
-            </a:r>
-            <a:r>
-              <a:rPr lang="en-US" sz="1600" dirty="0" err="1"/>
-              <a:t>Manjeshwar</a:t>
-            </a:r>
-            <a:r>
-              <a:rPr lang="en-US" sz="1600" dirty="0"/>
-              <a:t> </a:t>
-            </a:r>
-            <a:r>
-              <a:rPr lang="mr-IN" sz="1600" dirty="0"/>
-              <a:t>–</a:t>
-            </a:r>
-            <a:r>
-              <a:rPr lang="en-US" sz="1600" dirty="0"/>
-              <a:t> 1209163211 - </a:t>
-            </a:r>
-            <a:r>
-              <a:rPr lang="en-US" sz="1600" dirty="0">
-                <a:hlinkClick r:id="rId4"/>
-              </a:rPr>
-              <a:t>amanjesh@asu.edu</a:t>
-            </a:r>
-            <a:r>
-              <a:rPr lang="en-US" sz="1600" dirty="0"/>
-              <a:t> </a:t>
-            </a:r>
-            <a:r>
-              <a:rPr lang="mr-IN" sz="1600" dirty="0"/>
-              <a:t>–</a:t>
-            </a:r>
-            <a:r>
-              <a:rPr lang="en-US" sz="1600" dirty="0"/>
-              <a:t> 20% </a:t>
-            </a:r>
-            <a:r>
-              <a:rPr lang="en-US" sz="1600" dirty="0" smtClean="0"/>
-              <a:t>contribution</a:t>
-            </a:r>
-          </a:p>
-          <a:p>
-            <a:pPr lvl="1">
-              <a:buFont typeface="+mj-lt"/>
-              <a:buAutoNum type="arabicPeriod"/>
-            </a:pPr>
-            <a:r>
-              <a:rPr lang="en-US" sz="1200" dirty="0"/>
-              <a:t>&lt;contribution&gt;</a:t>
-            </a:r>
-          </a:p>
-          <a:p>
-            <a:pPr>
-              <a:buFont typeface="+mj-lt"/>
-              <a:buAutoNum type="arabicPeriod"/>
-            </a:pPr>
-            <a:r>
-              <a:rPr lang="en-US" sz="1600" dirty="0" err="1"/>
-              <a:t>Shwetha</a:t>
-            </a:r>
-            <a:r>
-              <a:rPr lang="en-US" sz="1600" dirty="0"/>
-              <a:t> Narayanan </a:t>
-            </a:r>
-            <a:r>
-              <a:rPr lang="mr-IN" sz="1600" dirty="0"/>
-              <a:t>–</a:t>
-            </a:r>
-            <a:r>
-              <a:rPr lang="en-US" sz="1600" dirty="0"/>
-              <a:t> 1209166097 - </a:t>
-            </a:r>
-            <a:r>
-              <a:rPr lang="en-US" sz="1600" dirty="0">
-                <a:hlinkClick r:id="rId5"/>
-              </a:rPr>
-              <a:t>snaray36@asu.edu</a:t>
-            </a:r>
-            <a:r>
-              <a:rPr lang="en-US" sz="1600" dirty="0"/>
-              <a:t> </a:t>
-            </a:r>
-            <a:r>
-              <a:rPr lang="mr-IN" sz="1600" dirty="0"/>
-              <a:t>–</a:t>
-            </a:r>
-            <a:r>
-              <a:rPr lang="en-US" sz="1600" dirty="0"/>
-              <a:t> 20% </a:t>
-            </a:r>
-            <a:r>
-              <a:rPr lang="en-US" sz="1600" dirty="0" smtClean="0"/>
-              <a:t>contribution</a:t>
-            </a:r>
-          </a:p>
-          <a:p>
-            <a:pPr lvl="1">
-              <a:buFont typeface="+mj-lt"/>
-              <a:buAutoNum type="arabicPeriod"/>
-            </a:pPr>
-            <a:r>
-              <a:rPr lang="en-US" sz="1200" dirty="0"/>
-              <a:t>&lt;contribution&gt;</a:t>
-            </a:r>
-          </a:p>
-          <a:p>
-            <a:pPr>
-              <a:buFont typeface="+mj-lt"/>
-              <a:buAutoNum type="arabicPeriod"/>
-            </a:pPr>
-            <a:r>
-              <a:rPr lang="en-US" sz="1600" dirty="0"/>
-              <a:t>Ramanathan Nachiappan </a:t>
-            </a:r>
-            <a:r>
-              <a:rPr lang="mr-IN" sz="1600" dirty="0"/>
-              <a:t>–</a:t>
-            </a:r>
-            <a:r>
-              <a:rPr lang="en-US" sz="1600" dirty="0"/>
-              <a:t> 1210822532 </a:t>
-            </a:r>
-            <a:r>
-              <a:rPr lang="mr-IN" sz="1600" dirty="0"/>
-              <a:t>–</a:t>
-            </a:r>
-            <a:r>
-              <a:rPr lang="en-US" sz="1600" dirty="0"/>
-              <a:t> </a:t>
-            </a:r>
-            <a:r>
-              <a:rPr lang="en-US" sz="1600" dirty="0">
-                <a:hlinkClick r:id="rId6"/>
-              </a:rPr>
-              <a:t>rnachiap@asu.edu</a:t>
-            </a:r>
-            <a:r>
-              <a:rPr lang="en-US" sz="1600" dirty="0"/>
-              <a:t> - 20% </a:t>
-            </a:r>
-            <a:r>
-              <a:rPr lang="en-US" sz="1600" dirty="0" smtClean="0"/>
-              <a:t>contribution</a:t>
-            </a:r>
-          </a:p>
-          <a:p>
-            <a:pPr lvl="1">
-              <a:buFont typeface="+mj-lt"/>
-              <a:buAutoNum type="arabicPeriod"/>
-            </a:pPr>
-            <a:r>
-              <a:rPr lang="en-US" sz="1200" dirty="0"/>
-              <a:t>&lt;contribution&gt;</a:t>
-            </a:r>
-          </a:p>
-          <a:p>
-            <a:pPr marL="0" marR="0" lvl="0" indent="0" defTabSz="914400" eaLnBrk="1" fontAlgn="auto" latinLnBrk="0" hangingPunct="1">
-              <a:lnSpc>
-                <a:spcPct val="100000"/>
-              </a:lnSpc>
-              <a:spcBef>
-                <a:spcPts val="0"/>
-              </a:spcBef>
-              <a:spcAft>
-                <a:spcPts val="0"/>
-              </a:spcAft>
-              <a:buClrTx/>
-              <a:buSzTx/>
-              <a:buFontTx/>
-              <a:buNone/>
-              <a:tabLst/>
-              <a:defRPr/>
-            </a:pPr>
-            <a:endParaRPr lang="en-US" sz="2000" dirty="0"/>
+            <a:endParaRPr lang="en-US"/>
           </a:p>
         </p:txBody>
       </p:sp>
@@ -8351,7 +7994,7 @@
               <a:defRPr/>
             </a:pPr>
             <a:r>
-              <a:rPr lang="en-US" smtClean="0"/>
+              <a:rPr lang="en-US" dirty="0" smtClean="0"/>
               <a:t>- </a:t>
             </a:r>
             <a:fld id="{5702A24C-C4CD-4510-A1DD-CEB556D2535A}" type="slidenum">
@@ -8362,10 +8005,10 @@
               <a:t>15</a:t>
             </a:fld>
             <a:r>
-              <a:rPr lang="en-US" smtClean="0"/>
+              <a:rPr lang="en-US" dirty="0" smtClean="0"/>
               <a:t> -</a:t>
             </a:r>
-            <a:endParaRPr lang="en-US"/>
+            <a:endParaRPr lang="en-US" dirty="0"/>
           </a:p>
         </p:txBody>
       </p:sp>
@@ -8377,8 +8020,8 @@
         </p:nvSpPr>
         <p:spPr>
           <a:xfrm>
-            <a:off x="446088" y="5707132"/>
-            <a:ext cx="8229600" cy="707886"/>
+            <a:off x="2116808" y="6136769"/>
+            <a:ext cx="7027192" cy="253916"/>
           </a:xfrm>
           <a:prstGeom prst="rect">
             <a:avLst/>
@@ -8391,7 +8034,7 @@
           <a:lstStyle/>
           <a:p>
             <a:r>
-              <a:rPr lang="en-US" sz="2000" dirty="0" smtClean="0">
+              <a:rPr lang="en-US" sz="1050" smtClean="0">
                 <a:latin typeface="Times" charset="0"/>
                 <a:ea typeface="Times" charset="0"/>
                 <a:cs typeface="Times" charset="0"/>
@@ -8399,22 +8042,30 @@
               <a:t>“All </a:t>
             </a:r>
             <a:r>
-              <a:rPr lang="en-US" sz="2000" dirty="0">
+              <a:rPr lang="en-US" sz="1050" dirty="0">
                 <a:latin typeface="Times" charset="0"/>
                 <a:ea typeface="Times" charset="0"/>
                 <a:cs typeface="Times" charset="0"/>
               </a:rPr>
-              <a:t>the team members agree on the team members’ contributions in terms of both (a) what s/he did and (b) the </a:t>
-            </a:r>
-            <a:r>
-              <a:rPr lang="en-US" sz="2000" dirty="0" smtClean="0">
+              <a:t>the team members agree on the team members’ contributions in terms of both (a) what s/he did and (b) </a:t>
+            </a:r>
+            <a:r>
+              <a:rPr lang="en-US" sz="1050">
+                <a:latin typeface="Times" charset="0"/>
+                <a:ea typeface="Times" charset="0"/>
+                <a:cs typeface="Times" charset="0"/>
+              </a:rPr>
+              <a:t>the </a:t>
+            </a:r>
+            <a:r>
+              <a:rPr lang="en-US" sz="1050" smtClean="0">
                 <a:latin typeface="Times" charset="0"/>
                 <a:ea typeface="Times" charset="0"/>
                 <a:cs typeface="Times" charset="0"/>
               </a:rPr>
               <a:t>percentage”</a:t>
             </a:r>
-            <a:endParaRPr lang="en-US" sz="2000" dirty="0">
+            <a:endParaRPr lang="en-US" sz="1050" dirty="0">
               <a:effectLst/>
               <a:latin typeface="Times" charset="0"/>
               <a:ea typeface="Times" charset="0"/>
@@ -8426,7 +8077,7 @@
     </p:spTree>
     <p:extLst>
       <p:ext uri="{BB962C8B-B14F-4D97-AF65-F5344CB8AC3E}">
-        <p14:creationId xmlns:p14="http://schemas.microsoft.com/office/powerpoint/2010/main" val="1394230669"/>
+        <p14:creationId xmlns:p14="http://schemas.microsoft.com/office/powerpoint/2010/main" val="1689286747"/>
       </p:ext>
     </p:extLst>
   </p:cSld>
@@ -8470,9 +8121,332 @@
           <a:p>
             <a:r>
               <a:rPr lang="en-US" dirty="0" smtClean="0"/>
-              <a:t>Thank You!</a:t>
+              <a:t>Team Members</a:t>
             </a:r>
             <a:endParaRPr lang="en-US" dirty="0"/>
+          </a:p>
+        </p:txBody>
+      </p:sp>
+      <p:sp>
+        <p:nvSpPr>
+          <p:cNvPr id="3" name="Content Placeholder 2"/>
+          <p:cNvSpPr>
+            <a:spLocks noGrp="1"/>
+          </p:cNvSpPr>
+          <p:nvPr>
+            <p:ph idx="1"/>
+          </p:nvPr>
+        </p:nvSpPr>
+        <p:spPr/>
+        <p:txBody>
+          <a:bodyPr/>
+          <a:lstStyle/>
+          <a:p>
+            <a:pPr>
+              <a:buFont typeface="+mj-lt"/>
+              <a:buAutoNum type="arabicPeriod"/>
+            </a:pPr>
+            <a:r>
+              <a:rPr lang="hr-HR" sz="1600" dirty="0" err="1"/>
+              <a:t>Balaji</a:t>
+            </a:r>
+            <a:r>
+              <a:rPr lang="hr-HR" sz="1600" dirty="0"/>
+              <a:t> </a:t>
+            </a:r>
+            <a:r>
+              <a:rPr lang="hr-HR" sz="1600" dirty="0" err="1"/>
+              <a:t>Sankar</a:t>
+            </a:r>
+            <a:r>
+              <a:rPr lang="hr-HR" sz="1600" dirty="0"/>
+              <a:t> </a:t>
+            </a:r>
+            <a:r>
+              <a:rPr lang="mr-IN" sz="1600" dirty="0"/>
+              <a:t>–</a:t>
+            </a:r>
+            <a:r>
+              <a:rPr lang="hr-HR" sz="1600" dirty="0"/>
+              <a:t> 1209346459 </a:t>
+            </a:r>
+            <a:r>
+              <a:rPr lang="en-US" sz="1600" dirty="0"/>
+              <a:t>- </a:t>
+            </a:r>
+            <a:r>
+              <a:rPr lang="en-US" sz="1600" dirty="0">
+                <a:hlinkClick r:id="rId2"/>
+              </a:rPr>
+              <a:t>bsankar@asu.edu</a:t>
+            </a:r>
+            <a:r>
+              <a:rPr lang="en-US" sz="1600" dirty="0"/>
+              <a:t> </a:t>
+            </a:r>
+            <a:r>
+              <a:rPr lang="mr-IN" sz="1600" dirty="0"/>
+              <a:t>–</a:t>
+            </a:r>
+            <a:r>
+              <a:rPr lang="en-US" sz="1600" dirty="0"/>
+              <a:t> 20% </a:t>
+            </a:r>
+            <a:r>
+              <a:rPr lang="en-US" sz="1600" dirty="0" smtClean="0"/>
+              <a:t>contribution</a:t>
+            </a:r>
+          </a:p>
+          <a:p>
+            <a:pPr lvl="1">
+              <a:buFont typeface="+mj-lt"/>
+              <a:buAutoNum type="arabicPeriod"/>
+            </a:pPr>
+            <a:r>
+              <a:rPr lang="en-US" sz="1200" dirty="0" smtClean="0"/>
+              <a:t>&lt;contribution&gt;</a:t>
+            </a:r>
+            <a:endParaRPr lang="hr-HR" sz="1200" dirty="0"/>
+          </a:p>
+          <a:p>
+            <a:pPr>
+              <a:buFont typeface="+mj-lt"/>
+              <a:buAutoNum type="arabicPeriod"/>
+            </a:pPr>
+            <a:r>
+              <a:rPr lang="en-US" sz="1600" dirty="0" err="1"/>
+              <a:t>Karthik</a:t>
+            </a:r>
+            <a:r>
+              <a:rPr lang="en-US" sz="1600" dirty="0"/>
+              <a:t> Subramanian </a:t>
+            </a:r>
+            <a:r>
+              <a:rPr lang="mr-IN" sz="1600" dirty="0"/>
+              <a:t>–</a:t>
+            </a:r>
+            <a:r>
+              <a:rPr lang="en-US" sz="1600" dirty="0"/>
+              <a:t> 1209360876 - </a:t>
+            </a:r>
+            <a:r>
+              <a:rPr lang="en-US" sz="1600" dirty="0">
+                <a:hlinkClick r:id="rId3"/>
+              </a:rPr>
+              <a:t>ksubra19@asu.edu</a:t>
+            </a:r>
+            <a:r>
+              <a:rPr lang="en-US" sz="1600" dirty="0"/>
+              <a:t> </a:t>
+            </a:r>
+            <a:r>
+              <a:rPr lang="mr-IN" sz="1600" dirty="0"/>
+              <a:t>–</a:t>
+            </a:r>
+            <a:r>
+              <a:rPr lang="en-US" sz="1600" dirty="0"/>
+              <a:t> 20% </a:t>
+            </a:r>
+            <a:r>
+              <a:rPr lang="en-US" sz="1600" dirty="0" smtClean="0"/>
+              <a:t>contribution</a:t>
+            </a:r>
+          </a:p>
+          <a:p>
+            <a:pPr lvl="1">
+              <a:buFont typeface="+mj-lt"/>
+              <a:buAutoNum type="arabicPeriod"/>
+            </a:pPr>
+            <a:r>
+              <a:rPr lang="en-US" sz="1200" dirty="0"/>
+              <a:t>&lt;contribution&gt;</a:t>
+            </a:r>
+          </a:p>
+          <a:p>
+            <a:pPr>
+              <a:buFont typeface="+mj-lt"/>
+              <a:buAutoNum type="arabicPeriod"/>
+            </a:pPr>
+            <a:r>
+              <a:rPr lang="en-US" sz="1600" dirty="0" err="1"/>
+              <a:t>Aarti</a:t>
+            </a:r>
+            <a:r>
+              <a:rPr lang="en-US" sz="1600" dirty="0"/>
+              <a:t> Rao </a:t>
+            </a:r>
+            <a:r>
+              <a:rPr lang="en-US" sz="1600" dirty="0" err="1"/>
+              <a:t>Manjeshwar</a:t>
+            </a:r>
+            <a:r>
+              <a:rPr lang="en-US" sz="1600" dirty="0"/>
+              <a:t> </a:t>
+            </a:r>
+            <a:r>
+              <a:rPr lang="mr-IN" sz="1600" dirty="0"/>
+              <a:t>–</a:t>
+            </a:r>
+            <a:r>
+              <a:rPr lang="en-US" sz="1600" dirty="0"/>
+              <a:t> 1209163211 - </a:t>
+            </a:r>
+            <a:r>
+              <a:rPr lang="en-US" sz="1600" dirty="0">
+                <a:hlinkClick r:id="rId4"/>
+              </a:rPr>
+              <a:t>amanjesh@asu.edu</a:t>
+            </a:r>
+            <a:r>
+              <a:rPr lang="en-US" sz="1600" dirty="0"/>
+              <a:t> </a:t>
+            </a:r>
+            <a:r>
+              <a:rPr lang="mr-IN" sz="1600" dirty="0"/>
+              <a:t>–</a:t>
+            </a:r>
+            <a:r>
+              <a:rPr lang="en-US" sz="1600" dirty="0"/>
+              <a:t> 20% </a:t>
+            </a:r>
+            <a:r>
+              <a:rPr lang="en-US" sz="1600" dirty="0" smtClean="0"/>
+              <a:t>contribution</a:t>
+            </a:r>
+          </a:p>
+          <a:p>
+            <a:pPr lvl="1">
+              <a:buFont typeface="+mj-lt"/>
+              <a:buAutoNum type="arabicPeriod"/>
+            </a:pPr>
+            <a:r>
+              <a:rPr lang="en-US" sz="1200" dirty="0"/>
+              <a:t>&lt;contribution&gt;</a:t>
+            </a:r>
+          </a:p>
+          <a:p>
+            <a:pPr>
+              <a:buFont typeface="+mj-lt"/>
+              <a:buAutoNum type="arabicPeriod"/>
+            </a:pPr>
+            <a:r>
+              <a:rPr lang="en-US" sz="1600" dirty="0" err="1"/>
+              <a:t>Shwetha</a:t>
+            </a:r>
+            <a:r>
+              <a:rPr lang="en-US" sz="1600" dirty="0"/>
+              <a:t> Narayanan </a:t>
+            </a:r>
+            <a:r>
+              <a:rPr lang="mr-IN" sz="1600" dirty="0"/>
+              <a:t>–</a:t>
+            </a:r>
+            <a:r>
+              <a:rPr lang="en-US" sz="1600" dirty="0"/>
+              <a:t> 1209166097 - </a:t>
+            </a:r>
+            <a:r>
+              <a:rPr lang="en-US" sz="1600" dirty="0">
+                <a:hlinkClick r:id="rId5"/>
+              </a:rPr>
+              <a:t>snaray36@asu.edu</a:t>
+            </a:r>
+            <a:r>
+              <a:rPr lang="en-US" sz="1600" dirty="0"/>
+              <a:t> </a:t>
+            </a:r>
+            <a:r>
+              <a:rPr lang="mr-IN" sz="1600" dirty="0"/>
+              <a:t>–</a:t>
+            </a:r>
+            <a:r>
+              <a:rPr lang="en-US" sz="1600" dirty="0"/>
+              <a:t> 20% </a:t>
+            </a:r>
+            <a:r>
+              <a:rPr lang="en-US" sz="1600" dirty="0" smtClean="0"/>
+              <a:t>contribution</a:t>
+            </a:r>
+          </a:p>
+          <a:p>
+            <a:pPr lvl="1">
+              <a:buFont typeface="+mj-lt"/>
+              <a:buAutoNum type="arabicPeriod"/>
+            </a:pPr>
+            <a:r>
+              <a:rPr lang="en-US" sz="1200" dirty="0"/>
+              <a:t>&lt;contribution&gt;</a:t>
+            </a:r>
+          </a:p>
+          <a:p>
+            <a:pPr>
+              <a:buFont typeface="+mj-lt"/>
+              <a:buAutoNum type="arabicPeriod"/>
+            </a:pPr>
+            <a:r>
+              <a:rPr lang="en-US" sz="1600" dirty="0"/>
+              <a:t>Ramanathan Nachiappan </a:t>
+            </a:r>
+            <a:r>
+              <a:rPr lang="mr-IN" sz="1600" dirty="0"/>
+              <a:t>–</a:t>
+            </a:r>
+            <a:r>
+              <a:rPr lang="en-US" sz="1600" dirty="0"/>
+              <a:t> 1210822532 </a:t>
+            </a:r>
+            <a:r>
+              <a:rPr lang="mr-IN" sz="1600" dirty="0"/>
+              <a:t>–</a:t>
+            </a:r>
+            <a:r>
+              <a:rPr lang="en-US" sz="1600" dirty="0"/>
+              <a:t> </a:t>
+            </a:r>
+            <a:r>
+              <a:rPr lang="en-US" sz="1600" dirty="0">
+                <a:hlinkClick r:id="rId6"/>
+              </a:rPr>
+              <a:t>rnachiap@asu.edu</a:t>
+            </a:r>
+            <a:r>
+              <a:rPr lang="en-US" sz="1600" dirty="0"/>
+              <a:t> - 20% </a:t>
+            </a:r>
+            <a:r>
+              <a:rPr lang="en-US" sz="1600" dirty="0" smtClean="0"/>
+              <a:t>contribution</a:t>
+            </a:r>
+          </a:p>
+          <a:p>
+            <a:pPr lvl="1">
+              <a:buFont typeface="+mj-lt"/>
+              <a:buAutoNum type="arabicPeriod"/>
+            </a:pPr>
+            <a:r>
+              <a:rPr lang="en-US" sz="1200" dirty="0"/>
+              <a:t>&lt;contribution&gt;</a:t>
+            </a:r>
+          </a:p>
+          <a:p>
+            <a:pPr marL="0" marR="0" lvl="0" indent="0" defTabSz="914400" eaLnBrk="1" fontAlgn="auto" latinLnBrk="0" hangingPunct="1">
+              <a:lnSpc>
+                <a:spcPct val="100000"/>
+              </a:lnSpc>
+              <a:spcBef>
+                <a:spcPts val="0"/>
+              </a:spcBef>
+              <a:spcAft>
+                <a:spcPts val="0"/>
+              </a:spcAft>
+              <a:buClrTx/>
+              <a:buSzTx/>
+              <a:buFontTx/>
+              <a:buNone/>
+              <a:tabLst/>
+              <a:defRPr/>
+            </a:pPr>
+            <a:endParaRPr lang="en-US" sz="2000" dirty="0"/>
           </a:p>
         </p:txBody>
       </p:sp>
@@ -8504,6 +8478,150 @@
                 <a:defRPr/>
               </a:pPr>
               <a:t>16</a:t>
+            </a:fld>
+            <a:r>
+              <a:rPr lang="en-US" smtClean="0"/>
+              <a:t> -</a:t>
+            </a:r>
+            <a:endParaRPr lang="en-US"/>
+          </a:p>
+        </p:txBody>
+      </p:sp>
+      <p:sp>
+        <p:nvSpPr>
+          <p:cNvPr id="5" name="Rectangle 4"/>
+          <p:cNvSpPr/>
+          <p:nvPr/>
+        </p:nvSpPr>
+        <p:spPr>
+          <a:xfrm>
+            <a:off x="446088" y="5707132"/>
+            <a:ext cx="8229600" cy="707886"/>
+          </a:xfrm>
+          <a:prstGeom prst="rect">
+            <a:avLst/>
+          </a:prstGeom>
+        </p:spPr>
+        <p:txBody>
+          <a:bodyPr wrap="square">
+            <a:spAutoFit/>
+          </a:bodyPr>
+          <a:lstStyle/>
+          <a:p>
+            <a:r>
+              <a:rPr lang="en-US" sz="2000" dirty="0" smtClean="0">
+                <a:latin typeface="Times" charset="0"/>
+                <a:ea typeface="Times" charset="0"/>
+                <a:cs typeface="Times" charset="0"/>
+              </a:rPr>
+              <a:t>“All </a:t>
+            </a:r>
+            <a:r>
+              <a:rPr lang="en-US" sz="2000" dirty="0">
+                <a:latin typeface="Times" charset="0"/>
+                <a:ea typeface="Times" charset="0"/>
+                <a:cs typeface="Times" charset="0"/>
+              </a:rPr>
+              <a:t>the team members agree on the team members’ contributions in terms of both (a) what s/he did and (b) the </a:t>
+            </a:r>
+            <a:r>
+              <a:rPr lang="en-US" sz="2000" dirty="0" smtClean="0">
+                <a:latin typeface="Times" charset="0"/>
+                <a:ea typeface="Times" charset="0"/>
+                <a:cs typeface="Times" charset="0"/>
+              </a:rPr>
+              <a:t>percentage”</a:t>
+            </a:r>
+            <a:endParaRPr lang="en-US" sz="2000" dirty="0">
+              <a:effectLst/>
+              <a:latin typeface="Times" charset="0"/>
+              <a:ea typeface="Times" charset="0"/>
+              <a:cs typeface="Times" charset="0"/>
+            </a:endParaRPr>
+          </a:p>
+        </p:txBody>
+      </p:sp>
+    </p:spTree>
+    <p:extLst>
+      <p:ext uri="{BB962C8B-B14F-4D97-AF65-F5344CB8AC3E}">
+        <p14:creationId xmlns:p14="http://schemas.microsoft.com/office/powerpoint/2010/main" val="1394230669"/>
+      </p:ext>
+    </p:extLst>
+  </p:cSld>
+  <p:clrMapOvr>
+    <a:masterClrMapping/>
+  </p:clrMapOvr>
+</p:sld>
+</file>
+
+<file path=ppt/slides/slide17.xml><?xml version="1.0" encoding="utf-8"?>
+<p:sld xmlns:a="http://schemas.openxmlformats.org/drawingml/2006/main" xmlns:r="http://schemas.openxmlformats.org/officeDocument/2006/relationships" xmlns:p="http://schemas.openxmlformats.org/presentationml/2006/main">
+  <p:cSld>
+    <p:spTree>
+      <p:nvGrpSpPr>
+        <p:cNvPr id="1" name=""/>
+        <p:cNvGrpSpPr/>
+        <p:nvPr/>
+      </p:nvGrpSpPr>
+      <p:grpSpPr>
+        <a:xfrm>
+          <a:off x="0" y="0"/>
+          <a:ext cx="0" cy="0"/>
+          <a:chOff x="0" y="0"/>
+          <a:chExt cx="0" cy="0"/>
+        </a:xfrm>
+      </p:grpSpPr>
+      <p:sp>
+        <p:nvSpPr>
+          <p:cNvPr id="2" name="Title 1"/>
+          <p:cNvSpPr>
+            <a:spLocks noGrp="1"/>
+          </p:cNvSpPr>
+          <p:nvPr>
+            <p:ph type="title"/>
+          </p:nvPr>
+        </p:nvSpPr>
+        <p:spPr/>
+        <p:txBody>
+          <a:bodyPr/>
+          <a:lstStyle/>
+          <a:p>
+            <a:r>
+              <a:rPr lang="en-US" dirty="0" smtClean="0"/>
+              <a:t>Thank You!</a:t>
+            </a:r>
+            <a:endParaRPr lang="en-US" dirty="0"/>
+          </a:p>
+        </p:txBody>
+      </p:sp>
+      <p:sp>
+        <p:nvSpPr>
+          <p:cNvPr id="4" name="Slide Number Placeholder 3"/>
+          <p:cNvSpPr>
+            <a:spLocks noGrp="1"/>
+          </p:cNvSpPr>
+          <p:nvPr>
+            <p:ph type="sldNum" sz="quarter" idx="4"/>
+          </p:nvPr>
+        </p:nvSpPr>
+        <p:spPr/>
+        <p:txBody>
+          <a:bodyPr/>
+          <a:lstStyle/>
+          <a:p>
+            <a:pPr>
+              <a:defRPr/>
+            </a:pPr>
+            <a:r>
+              <a:rPr lang="en-US" smtClean="0"/>
+              <a:t>- </a:t>
+            </a:r>
+            <a:fld id="{5702A24C-C4CD-4510-A1DD-CEB556D2535A}" type="slidenum">
+              <a:rPr lang="en-US" smtClean="0"/>
+              <a:pPr>
+                <a:defRPr/>
+              </a:pPr>
+              <a:t>17</a:t>
             </a:fld>
             <a:r>
               <a:rPr lang="en-US" smtClean="0"/>
@@ -8795,6 +8913,13 @@
   <p:clrMapOvr>
     <a:masterClrMapping/>
   </p:clrMapOvr>
+  <p:timing>
+    <p:tnLst>
+      <p:par>
+        <p:cTn id="1" dur="indefinite" restart="never" nodeType="tmRoot"/>
+      </p:par>
+    </p:tnLst>
+  </p:timing>
 </p:sld>
 </file>
 
@@ -8951,7 +9076,7 @@
             </a:r>
             <a:r>
               <a:rPr lang="en-US" sz="1600" dirty="0" smtClean="0"/>
-              <a:t> or discrete symbolic data</a:t>
+              <a:t> or discrete data</a:t>
             </a:r>
           </a:p>
           <a:p>
@@ -9274,15 +9399,7 @@
             </a:r>
             <a:r>
               <a:rPr lang="en-US" sz="1600" dirty="0" smtClean="0"/>
-              <a:t> Station, elevation, Sunrise, sunset, wind speed, Pressure change, sky </a:t>
-            </a:r>
-            <a:r>
-              <a:rPr lang="en-US" sz="1600" smtClean="0"/>
-              <a:t>conditions etc. </a:t>
-            </a:r>
-            <a:r>
-              <a:rPr lang="en-US" sz="1600" dirty="0" smtClean="0"/>
-              <a:t>(92 features)</a:t>
+              <a:t> Station, elevation, Sunrise, sunset, wind speed, Pressure change, sky conditions etc. (92 features)</a:t>
             </a:r>
           </a:p>
           <a:p>
@@ -9520,7 +9637,7 @@
           <a:p>
             <a:r>
               <a:rPr lang="en-US" dirty="0" smtClean="0"/>
-              <a:t>Feature Selection using PCA</a:t>
+              <a:t>Preprocessing</a:t>
             </a:r>
             <a:endParaRPr lang="en-US" dirty="0"/>
           </a:p>
@@ -9541,7 +9658,37 @@
           <a:bodyPr/>
           <a:lstStyle/>
           <a:p>
-            <a:endParaRPr lang="en-US"/>
+            <a:r>
+              <a:rPr lang="en-US" sz="2000" dirty="0"/>
+              <a:t>Original number of features: 50</a:t>
+            </a:r>
+          </a:p>
+          <a:p>
+            <a:r>
+              <a:rPr lang="en-US" sz="2000" dirty="0"/>
+              <a:t>Cleaned the data and reduced the number of features to 19</a:t>
+            </a:r>
+          </a:p>
+          <a:p>
+            <a:r>
+              <a:rPr lang="en-US" sz="2000" dirty="0"/>
+              <a:t>Aggregated the data and collapsed it to hourly time series </a:t>
+            </a:r>
+            <a:r>
+              <a:rPr lang="en-US" sz="2000" dirty="0" smtClean="0"/>
+              <a:t>data</a:t>
+            </a:r>
+          </a:p>
+          <a:p>
+            <a:r>
+              <a:rPr lang="en-US" sz="2000" dirty="0" smtClean="0"/>
+              <a:t>We mapped each unique sky conditions to a corresponding integer and since a particular hour might have multiple sky conditions, we took a voting and assigned </a:t>
+            </a:r>
+            <a:r>
+              <a:rPr lang="en-US" sz="2000" smtClean="0"/>
+              <a:t>the maximum</a:t>
+            </a:r>
+            <a:endParaRPr lang="en-US" sz="2000" dirty="0"/>
           </a:p>
         </p:txBody>
       </p:sp>
@@ -9585,7 +9732,7 @@
     </p:spTree>
     <p:extLst>
       <p:ext uri="{BB962C8B-B14F-4D97-AF65-F5344CB8AC3E}">
-        <p14:creationId xmlns:p14="http://schemas.microsoft.com/office/powerpoint/2010/main" val="1723904967"/>
+        <p14:creationId xmlns:p14="http://schemas.microsoft.com/office/powerpoint/2010/main" val="1970274118"/>
       </p:ext>
     </p:extLst>
   </p:cSld>
@@ -9629,7 +9776,7 @@
           <a:p>
             <a:r>
               <a:rPr lang="en-US" dirty="0" smtClean="0"/>
-              <a:t>ARIMA Modeling</a:t>
+              <a:t>Feature Selection using PCA</a:t>
             </a:r>
             <a:endParaRPr lang="en-US" dirty="0"/>
           </a:p>
@@ -9650,7 +9797,7 @@
           <a:bodyPr/>
           <a:lstStyle/>
           <a:p>
-            <a:endParaRPr lang="en-US"/>
+            <a:endParaRPr lang="en-US" sz="2000" dirty="0" smtClean="0"/>
           </a:p>
         </p:txBody>
       </p:sp>
@@ -9694,7 +9841,7 @@
     </p:spTree>
     <p:extLst>
       <p:ext uri="{BB962C8B-B14F-4D97-AF65-F5344CB8AC3E}">
-        <p14:creationId xmlns:p14="http://schemas.microsoft.com/office/powerpoint/2010/main" val="1256808137"/>
+        <p14:creationId xmlns:p14="http://schemas.microsoft.com/office/powerpoint/2010/main" val="1723904967"/>
       </p:ext>
     </p:extLst>
   </p:cSld>
@@ -9738,15 +9885,7 @@
           <a:p>
             <a:r>
               <a:rPr lang="en-US" dirty="0" smtClean="0"/>
-              <a:t>Nearest </a:t>
-            </a:r>
-            <a:r>
-              <a:rPr lang="en-US" dirty="0" err="1" smtClean="0"/>
-              <a:t>Neighbour</a:t>
-            </a:r>
-            <a:r>
-              <a:rPr lang="en-US" dirty="0" smtClean="0"/>
-              <a:t> Modeling</a:t>
+              <a:t>AR Modeling</a:t>
             </a:r>
             <a:endParaRPr lang="en-US" dirty="0"/>
           </a:p>
@@ -9767,7 +9906,7 @@
           <a:bodyPr/>
           <a:lstStyle/>
           <a:p>
-            <a:endParaRPr lang="en-US"/>
+            <a:endParaRPr lang="en-US" sz="2000" dirty="0"/>
           </a:p>
         </p:txBody>
       </p:sp>
@@ -9811,7 +9950,7 @@
     </p:spTree>
     <p:extLst>
       <p:ext uri="{BB962C8B-B14F-4D97-AF65-F5344CB8AC3E}">
-        <p14:creationId xmlns:p14="http://schemas.microsoft.com/office/powerpoint/2010/main" val="2021391220"/>
+        <p14:creationId xmlns:p14="http://schemas.microsoft.com/office/powerpoint/2010/main" val="1256808137"/>
       </p:ext>
     </p:extLst>
   </p:cSld>

</xml_diff>

<commit_message>
Content for naive forecast model in ppt
</commit_message>
<xml_diff>
--- a/Presentation/575-ClassProject-Template.pptx
+++ b/Presentation/575-ClassProject-Template.pptx
@@ -6,10 +6,10 @@
     <p:sldMasterId id="2147483662" r:id="rId2"/>
   </p:sldMasterIdLst>
   <p:notesMasterIdLst>
-    <p:notesMasterId r:id="rId20"/>
+    <p:notesMasterId r:id="rId22"/>
   </p:notesMasterIdLst>
   <p:handoutMasterIdLst>
-    <p:handoutMasterId r:id="rId21"/>
+    <p:handoutMasterId r:id="rId23"/>
   </p:handoutMasterIdLst>
   <p:sldIdLst>
     <p:sldId id="853" r:id="rId3"/>
@@ -20,15 +20,17 @@
     <p:sldId id="857" r:id="rId8"/>
     <p:sldId id="868" r:id="rId9"/>
     <p:sldId id="858" r:id="rId10"/>
-    <p:sldId id="859" r:id="rId11"/>
-    <p:sldId id="860" r:id="rId12"/>
-    <p:sldId id="861" r:id="rId13"/>
-    <p:sldId id="862" r:id="rId14"/>
-    <p:sldId id="863" r:id="rId15"/>
-    <p:sldId id="864" r:id="rId16"/>
-    <p:sldId id="865" r:id="rId17"/>
-    <p:sldId id="867" r:id="rId18"/>
-    <p:sldId id="866" r:id="rId19"/>
+    <p:sldId id="869" r:id="rId11"/>
+    <p:sldId id="870" r:id="rId12"/>
+    <p:sldId id="859" r:id="rId13"/>
+    <p:sldId id="860" r:id="rId14"/>
+    <p:sldId id="861" r:id="rId15"/>
+    <p:sldId id="862" r:id="rId16"/>
+    <p:sldId id="863" r:id="rId17"/>
+    <p:sldId id="864" r:id="rId18"/>
+    <p:sldId id="865" r:id="rId19"/>
+    <p:sldId id="867" r:id="rId20"/>
+    <p:sldId id="866" r:id="rId21"/>
   </p:sldIdLst>
   <p:sldSz cx="9144000" cy="6858000" type="screen4x3"/>
   <p:notesSz cx="7315200" cy="9601200"/>
@@ -267,7 +269,7 @@
             <a:fld id="{44798C35-8A6C-4669-B8EE-A35EDDA7209F}" type="datetimeFigureOut">
               <a:rPr lang="en-US" smtClean="0"/>
               <a:pPr/>
-              <a:t>4/11/17</a:t>
+              <a:t>4/13/17</a:t>
             </a:fld>
             <a:endParaRPr lang="en-US"/>
           </a:p>
@@ -1102,14 +1104,14 @@
           </a:ln>
           <a:extLst>
             <a:ext uri="{909E8E84-426E-40dd-AFC4-6F175D3DCCD1}">
-              <a14:hiddenFill xmlns="" xmlns:a14="http://schemas.microsoft.com/office/drawing/2010/main">
+              <a14:hiddenFill xmlns:a14="http://schemas.microsoft.com/office/drawing/2010/main" xmlns="">
                 <a:solidFill>
                   <a:srgbClr val="FFFFFF"/>
                 </a:solidFill>
               </a14:hiddenFill>
             </a:ext>
             <a:ext uri="{91240B29-F687-4f45-9708-019B960494DF}">
-              <a14:hiddenLine xmlns="" xmlns:a14="http://schemas.microsoft.com/office/drawing/2010/main" w="9525">
+              <a14:hiddenLine xmlns:a14="http://schemas.microsoft.com/office/drawing/2010/main" xmlns="" w="9525">
                 <a:solidFill>
                   <a:srgbClr val="000000"/>
                 </a:solidFill>
@@ -1148,7 +1150,7 @@
           </a:ln>
           <a:extLst>
             <a:ext uri="{909E8E84-426E-40dd-AFC4-6F175D3DCCD1}">
-              <a14:hiddenFill xmlns="" xmlns:a14="http://schemas.microsoft.com/office/drawing/2010/main">
+              <a14:hiddenFill xmlns:a14="http://schemas.microsoft.com/office/drawing/2010/main" xmlns="">
                 <a:noFill/>
               </a14:hiddenFill>
             </a:ext>
@@ -1252,14 +1254,14 @@
           </a:ln>
           <a:extLst>
             <a:ext uri="{909E8E84-426E-40dd-AFC4-6F175D3DCCD1}">
-              <a14:hiddenFill xmlns="" xmlns:a14="http://schemas.microsoft.com/office/drawing/2010/main">
+              <a14:hiddenFill xmlns:a14="http://schemas.microsoft.com/office/drawing/2010/main" xmlns="">
                 <a:solidFill>
                   <a:srgbClr val="FFFFFF"/>
                 </a:solidFill>
               </a14:hiddenFill>
             </a:ext>
             <a:ext uri="{91240B29-F687-4f45-9708-019B960494DF}">
-              <a14:hiddenLine xmlns="" xmlns:a14="http://schemas.microsoft.com/office/drawing/2010/main" w="9525">
+              <a14:hiddenLine xmlns:a14="http://schemas.microsoft.com/office/drawing/2010/main" xmlns="" w="9525">
                 <a:solidFill>
                   <a:srgbClr val="000000"/>
                 </a:solidFill>
@@ -6085,14 +6087,14 @@
           </a:ln>
           <a:extLst>
             <a:ext uri="{909E8E84-426E-40dd-AFC4-6F175D3DCCD1}">
-              <a14:hiddenFill xmlns="" xmlns:a14="http://schemas.microsoft.com/office/drawing/2010/main">
+              <a14:hiddenFill xmlns:a14="http://schemas.microsoft.com/office/drawing/2010/main" xmlns="">
                 <a:solidFill>
                   <a:srgbClr val="FFFFFF"/>
                 </a:solidFill>
               </a14:hiddenFill>
             </a:ext>
             <a:ext uri="{91240B29-F687-4f45-9708-019B960494DF}">
-              <a14:hiddenLine xmlns="" xmlns:a14="http://schemas.microsoft.com/office/drawing/2010/main" w="9525">
+              <a14:hiddenLine xmlns:a14="http://schemas.microsoft.com/office/drawing/2010/main" xmlns="" w="9525">
                 <a:solidFill>
                   <a:srgbClr val="000000"/>
                 </a:solidFill>
@@ -6253,7 +6255,7 @@
           </a:ln>
           <a:extLst>
             <a:ext uri="{909E8E84-426E-40dd-AFC4-6F175D3DCCD1}">
-              <a14:hiddenFill xmlns="" xmlns:a14="http://schemas.microsoft.com/office/drawing/2010/main">
+              <a14:hiddenFill xmlns:a14="http://schemas.microsoft.com/office/drawing/2010/main" xmlns="">
                 <a:noFill/>
               </a14:hiddenFill>
             </a:ext>
@@ -6357,14 +6359,14 @@
           </a:ln>
           <a:extLst>
             <a:ext uri="{909E8E84-426E-40dd-AFC4-6F175D3DCCD1}">
-              <a14:hiddenFill xmlns="" xmlns:a14="http://schemas.microsoft.com/office/drawing/2010/main">
+              <a14:hiddenFill xmlns:a14="http://schemas.microsoft.com/office/drawing/2010/main" xmlns="">
                 <a:solidFill>
                   <a:srgbClr val="FFFFFF"/>
                 </a:solidFill>
               </a14:hiddenFill>
             </a:ext>
             <a:ext uri="{91240B29-F687-4f45-9708-019B960494DF}">
-              <a14:hiddenLine xmlns="" xmlns:a14="http://schemas.microsoft.com/office/drawing/2010/main" w="9525">
+              <a14:hiddenLine xmlns:a14="http://schemas.microsoft.com/office/drawing/2010/main" xmlns="" w="9525">
                 <a:solidFill>
                   <a:srgbClr val="000000"/>
                 </a:solidFill>
@@ -6996,17 +6998,7 @@
                 <a:latin typeface="Calibri"/>
                 <a:cs typeface="Calibri"/>
               </a:rPr>
-              <a:t>Weather </a:t>
-            </a:r>
-            <a:r>
-              <a:rPr lang="en-US" sz="5000" b="0" smtClean="0">
-                <a:solidFill>
-                  <a:srgbClr val="C00000"/>
-                </a:solidFill>
-                <a:latin typeface="Calibri"/>
-                <a:cs typeface="Calibri"/>
-              </a:rPr>
-              <a:t>Forecasting </a:t>
+              <a:t>Weather Forecasting </a:t>
             </a:r>
             <a:endParaRPr lang="en-US" sz="5000" b="0" dirty="0">
               <a:solidFill>
@@ -7253,11 +7245,7 @@
             </a:pPr>
             <a:r>
               <a:rPr lang="en-US" sz="1400" dirty="0" smtClean="0"/>
-              <a:t>Ramanathan </a:t>
-            </a:r>
-            <a:r>
-              <a:rPr lang="en-US" sz="1400" dirty="0" smtClean="0"/>
-              <a:t>Nachiappan </a:t>
+              <a:t>Ramanathan Nachiappan </a:t>
             </a:r>
             <a:r>
               <a:rPr lang="mr-IN" sz="1400" dirty="0" smtClean="0"/>
@@ -7285,7 +7273,6 @@
               <a:rPr lang="en-US" sz="1400" dirty="0" smtClean="0"/>
               <a:t> - 20% contribution</a:t>
             </a:r>
-            <a:endParaRPr lang="en-US" sz="1400" dirty="0" smtClean="0"/>
           </a:p>
           <a:p>
             <a:endParaRPr lang="en-US" altLang="zh-CN" sz="1600" dirty="0" smtClean="0"/>
@@ -7393,16 +7380,8 @@
           <a:lstStyle/>
           <a:p>
             <a:r>
-              <a:rPr lang="en-US" dirty="0" smtClean="0"/>
-              <a:t>Nearest </a:t>
-            </a:r>
-            <a:r>
-              <a:rPr lang="en-US" dirty="0" err="1" smtClean="0"/>
-              <a:t>Neighbour</a:t>
-            </a:r>
-            <a:r>
-              <a:rPr lang="en-US" dirty="0" smtClean="0"/>
-              <a:t> Modeling</a:t>
+              <a:rPr lang="en-US" sz="3200" dirty="0" smtClean="0"/>
+              <a:t>Results</a:t>
             </a:r>
             <a:endParaRPr lang="en-US" dirty="0"/>
           </a:p>
@@ -7423,7 +7402,11 @@
           <a:bodyPr/>
           <a:lstStyle/>
           <a:p>
-            <a:endParaRPr lang="en-US"/>
+            <a:r>
+              <a:rPr lang="en-US" sz="2000" dirty="0" smtClean="0"/>
+              <a:t>&lt;MSE for SEA, DAL, CIN along with the graph and a zoomed version&gt;</a:t>
+            </a:r>
+            <a:endParaRPr lang="en-US" sz="2000" dirty="0"/>
           </a:p>
         </p:txBody>
       </p:sp>
@@ -7467,7 +7450,7 @@
     </p:spTree>
     <p:extLst>
       <p:ext uri="{BB962C8B-B14F-4D97-AF65-F5344CB8AC3E}">
-        <p14:creationId xmlns:p14="http://schemas.microsoft.com/office/powerpoint/2010/main" val="2021391220"/>
+        <p14:creationId xmlns:p14="http://schemas.microsoft.com/office/powerpoint/2010/main" val="1571999454"/>
       </p:ext>
     </p:extLst>
   </p:cSld>
@@ -7511,12 +7494,9 @@
           <a:p>
             <a:r>
               <a:rPr lang="en-US" dirty="0" smtClean="0"/>
-              <a:t>K-Means Clusterin</a:t>
-            </a:r>
-            <a:r>
-              <a:rPr lang="en-US" dirty="0"/>
-              <a:t>g</a:t>
-            </a:r>
+              <a:t>AR Modeling</a:t>
+            </a:r>
+            <a:endParaRPr lang="en-US" dirty="0"/>
           </a:p>
         </p:txBody>
       </p:sp>
@@ -7535,7 +7515,7 @@
           <a:bodyPr/>
           <a:lstStyle/>
           <a:p>
-            <a:endParaRPr lang="en-US"/>
+            <a:endParaRPr lang="en-US" sz="2000" dirty="0"/>
           </a:p>
         </p:txBody>
       </p:sp>
@@ -7579,7 +7559,7 @@
     </p:spTree>
     <p:extLst>
       <p:ext uri="{BB962C8B-B14F-4D97-AF65-F5344CB8AC3E}">
-        <p14:creationId xmlns:p14="http://schemas.microsoft.com/office/powerpoint/2010/main" val="1635773753"/>
+        <p14:creationId xmlns:p14="http://schemas.microsoft.com/office/powerpoint/2010/main" val="1256808137"/>
       </p:ext>
     </p:extLst>
   </p:cSld>
@@ -7623,7 +7603,15 @@
           <a:p>
             <a:r>
               <a:rPr lang="en-US" dirty="0" smtClean="0"/>
-              <a:t>Time Series Linear Modeling</a:t>
+              <a:t>Nearest </a:t>
+            </a:r>
+            <a:r>
+              <a:rPr lang="en-US" dirty="0" err="1" smtClean="0"/>
+              <a:t>Neighbour</a:t>
+            </a:r>
+            <a:r>
+              <a:rPr lang="en-US" dirty="0" smtClean="0"/>
+              <a:t> Modeling</a:t>
             </a:r>
             <a:endParaRPr lang="en-US" dirty="0"/>
           </a:p>
@@ -7688,7 +7676,7 @@
     </p:spTree>
     <p:extLst>
       <p:ext uri="{BB962C8B-B14F-4D97-AF65-F5344CB8AC3E}">
-        <p14:creationId xmlns:p14="http://schemas.microsoft.com/office/powerpoint/2010/main" val="411675073"/>
+        <p14:creationId xmlns:p14="http://schemas.microsoft.com/office/powerpoint/2010/main" val="2021391220"/>
       </p:ext>
     </p:extLst>
   </p:cSld>
@@ -7732,9 +7720,12 @@
           <a:p>
             <a:r>
               <a:rPr lang="en-US" dirty="0" smtClean="0"/>
-              <a:t>Experiments</a:t>
-            </a:r>
-            <a:endParaRPr lang="en-US" dirty="0"/>
+              <a:t>K-Means Clusterin</a:t>
+            </a:r>
+            <a:r>
+              <a:rPr lang="en-US" dirty="0"/>
+              <a:t>g</a:t>
+            </a:r>
           </a:p>
         </p:txBody>
       </p:sp>
@@ -7797,7 +7788,7 @@
     </p:spTree>
     <p:extLst>
       <p:ext uri="{BB962C8B-B14F-4D97-AF65-F5344CB8AC3E}">
-        <p14:creationId xmlns:p14="http://schemas.microsoft.com/office/powerpoint/2010/main" val="741420163"/>
+        <p14:creationId xmlns:p14="http://schemas.microsoft.com/office/powerpoint/2010/main" val="1635773753"/>
       </p:ext>
     </p:extLst>
   </p:cSld>
@@ -7841,7 +7832,7 @@
           <a:p>
             <a:r>
               <a:rPr lang="en-US" dirty="0" smtClean="0"/>
-              <a:t>Results</a:t>
+              <a:t>Time Series Linear Modeling</a:t>
             </a:r>
             <a:endParaRPr lang="en-US" dirty="0"/>
           </a:p>
@@ -7906,7 +7897,7 @@
     </p:spTree>
     <p:extLst>
       <p:ext uri="{BB962C8B-B14F-4D97-AF65-F5344CB8AC3E}">
-        <p14:creationId xmlns:p14="http://schemas.microsoft.com/office/powerpoint/2010/main" val="635111409"/>
+        <p14:creationId xmlns:p14="http://schemas.microsoft.com/office/powerpoint/2010/main" val="411675073"/>
       </p:ext>
     </p:extLst>
   </p:cSld>
@@ -7950,7 +7941,7 @@
           <a:p>
             <a:r>
               <a:rPr lang="en-US" dirty="0" smtClean="0"/>
-              <a:t>Future Prospects</a:t>
+              <a:t>Experiments</a:t>
             </a:r>
             <a:endParaRPr lang="en-US" dirty="0"/>
           </a:p>
@@ -7994,7 +7985,7 @@
               <a:defRPr/>
             </a:pPr>
             <a:r>
-              <a:rPr lang="en-US" dirty="0" smtClean="0"/>
+              <a:rPr lang="en-US" smtClean="0"/>
               <a:t>- </a:t>
             </a:r>
             <a:fld id="{5702A24C-C4CD-4510-A1DD-CEB556D2535A}" type="slidenum">
@@ -8005,79 +7996,17 @@
               <a:t>15</a:t>
             </a:fld>
             <a:r>
-              <a:rPr lang="en-US" dirty="0" smtClean="0"/>
+              <a:rPr lang="en-US" smtClean="0"/>
               <a:t> -</a:t>
             </a:r>
-            <a:endParaRPr lang="en-US" dirty="0"/>
-          </a:p>
-        </p:txBody>
-      </p:sp>
-      <p:sp>
-        <p:nvSpPr>
-          <p:cNvPr id="5" name="Rectangle 4"/>
-          <p:cNvSpPr/>
-          <p:nvPr/>
-        </p:nvSpPr>
-        <p:spPr>
-          <a:xfrm>
-            <a:off x="2116808" y="6136769"/>
-            <a:ext cx="7027192" cy="253916"/>
-          </a:xfrm>
-          <a:prstGeom prst="rect">
-            <a:avLst/>
-          </a:prstGeom>
-        </p:spPr>
-        <p:txBody>
-          <a:bodyPr wrap="square">
-            <a:spAutoFit/>
-          </a:bodyPr>
-          <a:lstStyle/>
-          <a:p>
-            <a:r>
-              <a:rPr lang="en-US" sz="1050" smtClean="0">
-                <a:latin typeface="Times" charset="0"/>
-                <a:ea typeface="Times" charset="0"/>
-                <a:cs typeface="Times" charset="0"/>
-              </a:rPr>
-              <a:t>“All </a:t>
-            </a:r>
-            <a:r>
-              <a:rPr lang="en-US" sz="1050" dirty="0">
-                <a:latin typeface="Times" charset="0"/>
-                <a:ea typeface="Times" charset="0"/>
-                <a:cs typeface="Times" charset="0"/>
-              </a:rPr>
-              <a:t>the team members agree on the team members’ contributions in terms of both (a) what s/he did and (b) </a:t>
-            </a:r>
-            <a:r>
-              <a:rPr lang="en-US" sz="1050">
-                <a:latin typeface="Times" charset="0"/>
-                <a:ea typeface="Times" charset="0"/>
-                <a:cs typeface="Times" charset="0"/>
-              </a:rPr>
-              <a:t>the </a:t>
-            </a:r>
-            <a:r>
-              <a:rPr lang="en-US" sz="1050" smtClean="0">
-                <a:latin typeface="Times" charset="0"/>
-                <a:ea typeface="Times" charset="0"/>
-                <a:cs typeface="Times" charset="0"/>
-              </a:rPr>
-              <a:t>percentage”</a:t>
-            </a:r>
-            <a:endParaRPr lang="en-US" sz="1050" dirty="0">
-              <a:effectLst/>
-              <a:latin typeface="Times" charset="0"/>
-              <a:ea typeface="Times" charset="0"/>
-              <a:cs typeface="Times" charset="0"/>
-            </a:endParaRPr>
+            <a:endParaRPr lang="en-US"/>
           </a:p>
         </p:txBody>
       </p:sp>
     </p:spTree>
     <p:extLst>
       <p:ext uri="{BB962C8B-B14F-4D97-AF65-F5344CB8AC3E}">
-        <p14:creationId xmlns:p14="http://schemas.microsoft.com/office/powerpoint/2010/main" val="1689286747"/>
+        <p14:creationId xmlns:p14="http://schemas.microsoft.com/office/powerpoint/2010/main" val="741420163"/>
       </p:ext>
     </p:extLst>
   </p:cSld>
@@ -8121,7 +8050,7 @@
           <a:p>
             <a:r>
               <a:rPr lang="en-US" dirty="0" smtClean="0"/>
-              <a:t>Team Members</a:t>
+              <a:t>Results</a:t>
             </a:r>
             <a:endParaRPr lang="en-US" dirty="0"/>
           </a:p>
@@ -8142,311 +8071,7 @@
           <a:bodyPr/>
           <a:lstStyle/>
           <a:p>
-            <a:pPr>
-              <a:buFont typeface="+mj-lt"/>
-              <a:buAutoNum type="arabicPeriod"/>
-            </a:pPr>
-            <a:r>
-              <a:rPr lang="hr-HR" sz="1600" dirty="0" err="1"/>
-              <a:t>Balaji</a:t>
-            </a:r>
-            <a:r>
-              <a:rPr lang="hr-HR" sz="1600" dirty="0"/>
-              <a:t> </a:t>
-            </a:r>
-            <a:r>
-              <a:rPr lang="hr-HR" sz="1600" dirty="0" err="1"/>
-              <a:t>Sankar</a:t>
-            </a:r>
-            <a:r>
-              <a:rPr lang="hr-HR" sz="1600" dirty="0"/>
-              <a:t> </a:t>
-            </a:r>
-            <a:r>
-              <a:rPr lang="mr-IN" sz="1600" dirty="0"/>
-              <a:t>–</a:t>
-            </a:r>
-            <a:r>
-              <a:rPr lang="hr-HR" sz="1600" dirty="0"/>
-              <a:t> 1209346459 </a:t>
-            </a:r>
-            <a:r>
-              <a:rPr lang="en-US" sz="1600" dirty="0"/>
-              <a:t>- </a:t>
-            </a:r>
-            <a:r>
-              <a:rPr lang="en-US" sz="1600" dirty="0">
-                <a:hlinkClick r:id="rId2"/>
-              </a:rPr>
-              <a:t>bsankar@asu.edu</a:t>
-            </a:r>
-            <a:r>
-              <a:rPr lang="en-US" sz="1600" dirty="0"/>
-              <a:t> </a:t>
-            </a:r>
-            <a:r>
-              <a:rPr lang="mr-IN" sz="1600" dirty="0"/>
-              <a:t>–</a:t>
-            </a:r>
-            <a:r>
-              <a:rPr lang="en-US" sz="1600" dirty="0"/>
-              <a:t> 20% </a:t>
-            </a:r>
-            <a:r>
-              <a:rPr lang="en-US" sz="1600" dirty="0" smtClean="0"/>
-              <a:t>contribution</a:t>
-            </a:r>
-          </a:p>
-          <a:p>
-            <a:pPr lvl="1">
-              <a:buFont typeface="+mj-lt"/>
-              <a:buAutoNum type="arabicPeriod"/>
-            </a:pPr>
-            <a:r>
-              <a:rPr lang="en-US" sz="1200" dirty="0" smtClean="0"/>
-              <a:t>&lt;contribution&gt;</a:t>
-            </a:r>
-            <a:endParaRPr lang="hr-HR" sz="1200" dirty="0"/>
-          </a:p>
-          <a:p>
-            <a:pPr>
-              <a:buFont typeface="+mj-lt"/>
-              <a:buAutoNum type="arabicPeriod"/>
-            </a:pPr>
-            <a:r>
-              <a:rPr lang="en-US" sz="1600" dirty="0" err="1"/>
-              <a:t>Karthik</a:t>
-            </a:r>
-            <a:r>
-              <a:rPr lang="en-US" sz="1600" dirty="0"/>
-              <a:t> Subramanian </a:t>
-            </a:r>
-            <a:r>
-              <a:rPr lang="mr-IN" sz="1600" dirty="0"/>
-              <a:t>–</a:t>
-            </a:r>
-            <a:r>
-              <a:rPr lang="en-US" sz="1600" dirty="0"/>
-              <a:t> 1209360876 - </a:t>
-            </a:r>
-            <a:r>
-              <a:rPr lang="en-US" sz="1600" dirty="0">
-                <a:hlinkClick r:id="rId3"/>
-              </a:rPr>
-              <a:t>ksubra19@asu.edu</a:t>
-            </a:r>
-            <a:r>
-              <a:rPr lang="en-US" sz="1600" dirty="0"/>
-              <a:t> </a:t>
-            </a:r>
-            <a:r>
-              <a:rPr lang="mr-IN" sz="1600" dirty="0"/>
-              <a:t>–</a:t>
-            </a:r>
-            <a:r>
-              <a:rPr lang="en-US" sz="1600" dirty="0"/>
-              <a:t> 20% </a:t>
-            </a:r>
-            <a:r>
-              <a:rPr lang="en-US" sz="1600" dirty="0" smtClean="0"/>
-              <a:t>contribution</a:t>
-            </a:r>
-          </a:p>
-          <a:p>
-            <a:pPr lvl="1">
-              <a:buFont typeface="+mj-lt"/>
-              <a:buAutoNum type="arabicPeriod"/>
-            </a:pPr>
-            <a:r>
-              <a:rPr lang="en-US" sz="1200" dirty="0"/>
-              <a:t>&lt;contribution&gt;</a:t>
-            </a:r>
-          </a:p>
-          <a:p>
-            <a:pPr>
-              <a:buFont typeface="+mj-lt"/>
-              <a:buAutoNum type="arabicPeriod"/>
-            </a:pPr>
-            <a:r>
-              <a:rPr lang="en-US" sz="1600" dirty="0" err="1"/>
-              <a:t>Aarti</a:t>
-            </a:r>
-            <a:r>
-              <a:rPr lang="en-US" sz="1600" dirty="0"/>
-              <a:t> Rao </a:t>
-            </a:r>
-            <a:r>
-              <a:rPr lang="en-US" sz="1600" dirty="0" err="1"/>
-              <a:t>Manjeshwar</a:t>
-            </a:r>
-            <a:r>
-              <a:rPr lang="en-US" sz="1600" dirty="0"/>
-              <a:t> </a:t>
-            </a:r>
-            <a:r>
-              <a:rPr lang="mr-IN" sz="1600" dirty="0"/>
-              <a:t>–</a:t>
-            </a:r>
-            <a:r>
-              <a:rPr lang="en-US" sz="1600" dirty="0"/>
-              <a:t> 1209163211 - </a:t>
-            </a:r>
-            <a:r>
-              <a:rPr lang="en-US" sz="1600" dirty="0">
-                <a:hlinkClick r:id="rId4"/>
-              </a:rPr>
-              <a:t>amanjesh@asu.edu</a:t>
-            </a:r>
-            <a:r>
-              <a:rPr lang="en-US" sz="1600" dirty="0"/>
-              <a:t> </a:t>
-            </a:r>
-            <a:r>
-              <a:rPr lang="mr-IN" sz="1600" dirty="0"/>
-              <a:t>–</a:t>
-            </a:r>
-            <a:r>
-              <a:rPr lang="en-US" sz="1600" dirty="0"/>
-              <a:t> 20% </a:t>
-            </a:r>
-            <a:r>
-              <a:rPr lang="en-US" sz="1600" dirty="0" smtClean="0"/>
-              <a:t>contribution</a:t>
-            </a:r>
-          </a:p>
-          <a:p>
-            <a:pPr lvl="1">
-              <a:buFont typeface="+mj-lt"/>
-              <a:buAutoNum type="arabicPeriod"/>
-            </a:pPr>
-            <a:r>
-              <a:rPr lang="en-US" sz="1200" dirty="0"/>
-              <a:t>&lt;contribution&gt;</a:t>
-            </a:r>
-          </a:p>
-          <a:p>
-            <a:pPr>
-              <a:buFont typeface="+mj-lt"/>
-              <a:buAutoNum type="arabicPeriod"/>
-            </a:pPr>
-            <a:r>
-              <a:rPr lang="en-US" sz="1600" dirty="0" err="1"/>
-              <a:t>Shwetha</a:t>
-            </a:r>
-            <a:r>
-              <a:rPr lang="en-US" sz="1600" dirty="0"/>
-              <a:t> Narayanan </a:t>
-            </a:r>
-            <a:r>
-              <a:rPr lang="mr-IN" sz="1600" dirty="0"/>
-              <a:t>–</a:t>
-            </a:r>
-            <a:r>
-              <a:rPr lang="en-US" sz="1600" dirty="0"/>
-              <a:t> 1209166097 - </a:t>
-            </a:r>
-            <a:r>
-              <a:rPr lang="en-US" sz="1600" dirty="0">
-                <a:hlinkClick r:id="rId5"/>
-              </a:rPr>
-              <a:t>snaray36@asu.edu</a:t>
-            </a:r>
-            <a:r>
-              <a:rPr lang="en-US" sz="1600" dirty="0"/>
-              <a:t> </a:t>
-            </a:r>
-            <a:r>
-              <a:rPr lang="mr-IN" sz="1600" dirty="0"/>
-              <a:t>–</a:t>
-            </a:r>
-            <a:r>
-              <a:rPr lang="en-US" sz="1600" dirty="0"/>
-              <a:t> 20% </a:t>
-            </a:r>
-            <a:r>
-              <a:rPr lang="en-US" sz="1600" dirty="0" smtClean="0"/>
-              <a:t>contribution</a:t>
-            </a:r>
-          </a:p>
-          <a:p>
-            <a:pPr lvl="1">
-              <a:buFont typeface="+mj-lt"/>
-              <a:buAutoNum type="arabicPeriod"/>
-            </a:pPr>
-            <a:r>
-              <a:rPr lang="en-US" sz="1200" dirty="0"/>
-              <a:t>&lt;contribution&gt;</a:t>
-            </a:r>
-          </a:p>
-          <a:p>
-            <a:pPr>
-              <a:buFont typeface="+mj-lt"/>
-              <a:buAutoNum type="arabicPeriod"/>
-            </a:pPr>
-            <a:r>
-              <a:rPr lang="en-US" sz="1600" dirty="0"/>
-              <a:t>Ramanathan Nachiappan </a:t>
-            </a:r>
-            <a:r>
-              <a:rPr lang="mr-IN" sz="1600" dirty="0"/>
-              <a:t>–</a:t>
-            </a:r>
-            <a:r>
-              <a:rPr lang="en-US" sz="1600" dirty="0"/>
-              <a:t> 1210822532 </a:t>
-            </a:r>
-            <a:r>
-              <a:rPr lang="mr-IN" sz="1600" dirty="0"/>
-              <a:t>–</a:t>
-            </a:r>
-            <a:r>
-              <a:rPr lang="en-US" sz="1600" dirty="0"/>
-              <a:t> </a:t>
-            </a:r>
-            <a:r>
-              <a:rPr lang="en-US" sz="1600" dirty="0">
-                <a:hlinkClick r:id="rId6"/>
-              </a:rPr>
-              <a:t>rnachiap@asu.edu</a:t>
-            </a:r>
-            <a:r>
-              <a:rPr lang="en-US" sz="1600" dirty="0"/>
-              <a:t> - 20% </a:t>
-            </a:r>
-            <a:r>
-              <a:rPr lang="en-US" sz="1600" dirty="0" smtClean="0"/>
-              <a:t>contribution</a:t>
-            </a:r>
-          </a:p>
-          <a:p>
-            <a:pPr lvl="1">
-              <a:buFont typeface="+mj-lt"/>
-              <a:buAutoNum type="arabicPeriod"/>
-            </a:pPr>
-            <a:r>
-              <a:rPr lang="en-US" sz="1200" dirty="0"/>
-              <a:t>&lt;contribution&gt;</a:t>
-            </a:r>
-          </a:p>
-          <a:p>
-            <a:pPr marL="0" marR="0" lvl="0" indent="0" defTabSz="914400" eaLnBrk="1" fontAlgn="auto" latinLnBrk="0" hangingPunct="1">
-              <a:lnSpc>
-                <a:spcPct val="100000"/>
-              </a:lnSpc>
-              <a:spcBef>
-                <a:spcPts val="0"/>
-              </a:spcBef>
-              <a:spcAft>
-                <a:spcPts val="0"/>
-              </a:spcAft>
-              <a:buClrTx/>
-              <a:buSzTx/>
-              <a:buFontTx/>
-              <a:buNone/>
-              <a:tabLst/>
-              <a:defRPr/>
-            </a:pPr>
-            <a:endParaRPr lang="en-US" sz="2000" dirty="0"/>
+            <a:endParaRPr lang="en-US"/>
           </a:p>
         </p:txBody>
       </p:sp>
@@ -8487,64 +8112,10 @@
           </a:p>
         </p:txBody>
       </p:sp>
-      <p:sp>
-        <p:nvSpPr>
-          <p:cNvPr id="5" name="Rectangle 4"/>
-          <p:cNvSpPr/>
-          <p:nvPr/>
-        </p:nvSpPr>
-        <p:spPr>
-          <a:xfrm>
-            <a:off x="446088" y="5707132"/>
-            <a:ext cx="8229600" cy="707886"/>
-          </a:xfrm>
-          <a:prstGeom prst="rect">
-            <a:avLst/>
-          </a:prstGeom>
-        </p:spPr>
-        <p:txBody>
-          <a:bodyPr wrap="square">
-            <a:spAutoFit/>
-          </a:bodyPr>
-          <a:lstStyle/>
-          <a:p>
-            <a:r>
-              <a:rPr lang="en-US" sz="2000" dirty="0" smtClean="0">
-                <a:latin typeface="Times" charset="0"/>
-                <a:ea typeface="Times" charset="0"/>
-                <a:cs typeface="Times" charset="0"/>
-              </a:rPr>
-              <a:t>“All </a:t>
-            </a:r>
-            <a:r>
-              <a:rPr lang="en-US" sz="2000" dirty="0">
-                <a:latin typeface="Times" charset="0"/>
-                <a:ea typeface="Times" charset="0"/>
-                <a:cs typeface="Times" charset="0"/>
-              </a:rPr>
-              <a:t>the team members agree on the team members’ contributions in terms of both (a) what s/he did and (b) the </a:t>
-            </a:r>
-            <a:r>
-              <a:rPr lang="en-US" sz="2000" dirty="0" smtClean="0">
-                <a:latin typeface="Times" charset="0"/>
-                <a:ea typeface="Times" charset="0"/>
-                <a:cs typeface="Times" charset="0"/>
-              </a:rPr>
-              <a:t>percentage”</a:t>
-            </a:r>
-            <a:endParaRPr lang="en-US" sz="2000" dirty="0">
-              <a:effectLst/>
-              <a:latin typeface="Times" charset="0"/>
-              <a:ea typeface="Times" charset="0"/>
-              <a:cs typeface="Times" charset="0"/>
-            </a:endParaRPr>
-          </a:p>
-        </p:txBody>
-      </p:sp>
     </p:spTree>
     <p:extLst>
       <p:ext uri="{BB962C8B-B14F-4D97-AF65-F5344CB8AC3E}">
-        <p14:creationId xmlns:p14="http://schemas.microsoft.com/office/powerpoint/2010/main" val="1394230669"/>
+        <p14:creationId xmlns:p14="http://schemas.microsoft.com/office/powerpoint/2010/main" val="635111409"/>
       </p:ext>
     </p:extLst>
   </p:cSld>
@@ -8588,9 +8159,28 @@
           <a:p>
             <a:r>
               <a:rPr lang="en-US" dirty="0" smtClean="0"/>
-              <a:t>Thank You!</a:t>
+              <a:t>Future Prospects</a:t>
             </a:r>
             <a:endParaRPr lang="en-US" dirty="0"/>
+          </a:p>
+        </p:txBody>
+      </p:sp>
+      <p:sp>
+        <p:nvSpPr>
+          <p:cNvPr id="3" name="Content Placeholder 2"/>
+          <p:cNvSpPr>
+            <a:spLocks noGrp="1"/>
+          </p:cNvSpPr>
+          <p:nvPr>
+            <p:ph idx="1"/>
+          </p:nvPr>
+        </p:nvSpPr>
+        <p:spPr/>
+        <p:txBody>
+          <a:bodyPr/>
+          <a:lstStyle/>
+          <a:p>
+            <a:endParaRPr lang="en-US"/>
           </a:p>
         </p:txBody>
       </p:sp>
@@ -8613,7 +8203,7 @@
               <a:defRPr/>
             </a:pPr>
             <a:r>
-              <a:rPr lang="en-US" smtClean="0"/>
+              <a:rPr lang="en-US" dirty="0" smtClean="0"/>
               <a:t>- </a:t>
             </a:r>
             <a:fld id="{5702A24C-C4CD-4510-A1DD-CEB556D2535A}" type="slidenum">
@@ -8622,6 +8212,625 @@
                 <a:defRPr/>
               </a:pPr>
               <a:t>17</a:t>
+            </a:fld>
+            <a:r>
+              <a:rPr lang="en-US" dirty="0" smtClean="0"/>
+              <a:t> -</a:t>
+            </a:r>
+            <a:endParaRPr lang="en-US" dirty="0"/>
+          </a:p>
+        </p:txBody>
+      </p:sp>
+      <p:sp>
+        <p:nvSpPr>
+          <p:cNvPr id="5" name="Rectangle 4"/>
+          <p:cNvSpPr/>
+          <p:nvPr/>
+        </p:nvSpPr>
+        <p:spPr>
+          <a:xfrm>
+            <a:off x="2116808" y="6136769"/>
+            <a:ext cx="7027192" cy="253916"/>
+          </a:xfrm>
+          <a:prstGeom prst="rect">
+            <a:avLst/>
+          </a:prstGeom>
+        </p:spPr>
+        <p:txBody>
+          <a:bodyPr wrap="square">
+            <a:spAutoFit/>
+          </a:bodyPr>
+          <a:lstStyle/>
+          <a:p>
+            <a:r>
+              <a:rPr lang="en-US" sz="1050" smtClean="0">
+                <a:latin typeface="Times" charset="0"/>
+                <a:ea typeface="Times" charset="0"/>
+                <a:cs typeface="Times" charset="0"/>
+              </a:rPr>
+              <a:t>“All </a:t>
+            </a:r>
+            <a:r>
+              <a:rPr lang="en-US" sz="1050" dirty="0">
+                <a:latin typeface="Times" charset="0"/>
+                <a:ea typeface="Times" charset="0"/>
+                <a:cs typeface="Times" charset="0"/>
+              </a:rPr>
+              <a:t>the team members agree on the team members’ contributions in terms of both (a) what s/he did and (b) </a:t>
+            </a:r>
+            <a:r>
+              <a:rPr lang="en-US" sz="1050">
+                <a:latin typeface="Times" charset="0"/>
+                <a:ea typeface="Times" charset="0"/>
+                <a:cs typeface="Times" charset="0"/>
+              </a:rPr>
+              <a:t>the </a:t>
+            </a:r>
+            <a:r>
+              <a:rPr lang="en-US" sz="1050" smtClean="0">
+                <a:latin typeface="Times" charset="0"/>
+                <a:ea typeface="Times" charset="0"/>
+                <a:cs typeface="Times" charset="0"/>
+              </a:rPr>
+              <a:t>percentage”</a:t>
+            </a:r>
+            <a:endParaRPr lang="en-US" sz="1050" dirty="0">
+              <a:effectLst/>
+              <a:latin typeface="Times" charset="0"/>
+              <a:ea typeface="Times" charset="0"/>
+              <a:cs typeface="Times" charset="0"/>
+            </a:endParaRPr>
+          </a:p>
+        </p:txBody>
+      </p:sp>
+    </p:spTree>
+    <p:extLst>
+      <p:ext uri="{BB962C8B-B14F-4D97-AF65-F5344CB8AC3E}">
+        <p14:creationId xmlns:p14="http://schemas.microsoft.com/office/powerpoint/2010/main" val="1689286747"/>
+      </p:ext>
+    </p:extLst>
+  </p:cSld>
+  <p:clrMapOvr>
+    <a:masterClrMapping/>
+  </p:clrMapOvr>
+</p:sld>
+</file>
+
+<file path=ppt/slides/slide18.xml><?xml version="1.0" encoding="utf-8"?>
+<p:sld xmlns:a="http://schemas.openxmlformats.org/drawingml/2006/main" xmlns:r="http://schemas.openxmlformats.org/officeDocument/2006/relationships" xmlns:p="http://schemas.openxmlformats.org/presentationml/2006/main">
+  <p:cSld>
+    <p:spTree>
+      <p:nvGrpSpPr>
+        <p:cNvPr id="1" name=""/>
+        <p:cNvGrpSpPr/>
+        <p:nvPr/>
+      </p:nvGrpSpPr>
+      <p:grpSpPr>
+        <a:xfrm>
+          <a:off x="0" y="0"/>
+          <a:ext cx="0" cy="0"/>
+          <a:chOff x="0" y="0"/>
+          <a:chExt cx="0" cy="0"/>
+        </a:xfrm>
+      </p:grpSpPr>
+      <p:sp>
+        <p:nvSpPr>
+          <p:cNvPr id="2" name="Title 1"/>
+          <p:cNvSpPr>
+            <a:spLocks noGrp="1"/>
+          </p:cNvSpPr>
+          <p:nvPr>
+            <p:ph type="title"/>
+          </p:nvPr>
+        </p:nvSpPr>
+        <p:spPr/>
+        <p:txBody>
+          <a:bodyPr/>
+          <a:lstStyle/>
+          <a:p>
+            <a:r>
+              <a:rPr lang="en-US" dirty="0" smtClean="0"/>
+              <a:t>Team Members</a:t>
+            </a:r>
+            <a:endParaRPr lang="en-US" dirty="0"/>
+          </a:p>
+        </p:txBody>
+      </p:sp>
+      <p:sp>
+        <p:nvSpPr>
+          <p:cNvPr id="3" name="Content Placeholder 2"/>
+          <p:cNvSpPr>
+            <a:spLocks noGrp="1"/>
+          </p:cNvSpPr>
+          <p:nvPr>
+            <p:ph idx="1"/>
+          </p:nvPr>
+        </p:nvSpPr>
+        <p:spPr/>
+        <p:txBody>
+          <a:bodyPr/>
+          <a:lstStyle/>
+          <a:p>
+            <a:pPr>
+              <a:buFont typeface="+mj-lt"/>
+              <a:buAutoNum type="arabicPeriod"/>
+            </a:pPr>
+            <a:r>
+              <a:rPr lang="hr-HR" sz="1600" dirty="0" err="1"/>
+              <a:t>Balaji</a:t>
+            </a:r>
+            <a:r>
+              <a:rPr lang="hr-HR" sz="1600" dirty="0"/>
+              <a:t> </a:t>
+            </a:r>
+            <a:r>
+              <a:rPr lang="hr-HR" sz="1600" dirty="0" err="1"/>
+              <a:t>Sankar</a:t>
+            </a:r>
+            <a:r>
+              <a:rPr lang="hr-HR" sz="1600" dirty="0"/>
+              <a:t> </a:t>
+            </a:r>
+            <a:r>
+              <a:rPr lang="mr-IN" sz="1600" dirty="0"/>
+              <a:t>–</a:t>
+            </a:r>
+            <a:r>
+              <a:rPr lang="hr-HR" sz="1600" dirty="0"/>
+              <a:t> 1209346459 </a:t>
+            </a:r>
+            <a:r>
+              <a:rPr lang="en-US" sz="1600" dirty="0"/>
+              <a:t>- </a:t>
+            </a:r>
+            <a:r>
+              <a:rPr lang="en-US" sz="1600" dirty="0">
+                <a:hlinkClick r:id="rId2"/>
+              </a:rPr>
+              <a:t>bsankar@asu.edu</a:t>
+            </a:r>
+            <a:r>
+              <a:rPr lang="en-US" sz="1600" dirty="0"/>
+              <a:t> </a:t>
+            </a:r>
+            <a:r>
+              <a:rPr lang="mr-IN" sz="1600" dirty="0"/>
+              <a:t>–</a:t>
+            </a:r>
+            <a:r>
+              <a:rPr lang="en-US" sz="1600" dirty="0"/>
+              <a:t> 20% </a:t>
+            </a:r>
+            <a:r>
+              <a:rPr lang="en-US" sz="1600" dirty="0" smtClean="0"/>
+              <a:t>contribution</a:t>
+            </a:r>
+          </a:p>
+          <a:p>
+            <a:pPr lvl="1">
+              <a:buFont typeface="+mj-lt"/>
+              <a:buAutoNum type="arabicPeriod"/>
+            </a:pPr>
+            <a:r>
+              <a:rPr lang="en-US" sz="1200" dirty="0" smtClean="0"/>
+              <a:t>&lt;contribution&gt;</a:t>
+            </a:r>
+            <a:endParaRPr lang="hr-HR" sz="1200" dirty="0"/>
+          </a:p>
+          <a:p>
+            <a:pPr>
+              <a:buFont typeface="+mj-lt"/>
+              <a:buAutoNum type="arabicPeriod"/>
+            </a:pPr>
+            <a:r>
+              <a:rPr lang="en-US" sz="1600" dirty="0" err="1"/>
+              <a:t>Karthik</a:t>
+            </a:r>
+            <a:r>
+              <a:rPr lang="en-US" sz="1600" dirty="0"/>
+              <a:t> Subramanian </a:t>
+            </a:r>
+            <a:r>
+              <a:rPr lang="mr-IN" sz="1600" dirty="0"/>
+              <a:t>–</a:t>
+            </a:r>
+            <a:r>
+              <a:rPr lang="en-US" sz="1600" dirty="0"/>
+              <a:t> 1209360876 - </a:t>
+            </a:r>
+            <a:r>
+              <a:rPr lang="en-US" sz="1600" dirty="0">
+                <a:hlinkClick r:id="rId3"/>
+              </a:rPr>
+              <a:t>ksubra19@asu.edu</a:t>
+            </a:r>
+            <a:r>
+              <a:rPr lang="en-US" sz="1600" dirty="0"/>
+              <a:t> </a:t>
+            </a:r>
+            <a:r>
+              <a:rPr lang="mr-IN" sz="1600" dirty="0"/>
+              <a:t>–</a:t>
+            </a:r>
+            <a:r>
+              <a:rPr lang="en-US" sz="1600" dirty="0"/>
+              <a:t> 20% </a:t>
+            </a:r>
+            <a:r>
+              <a:rPr lang="en-US" sz="1600" dirty="0" smtClean="0"/>
+              <a:t>contribution</a:t>
+            </a:r>
+          </a:p>
+          <a:p>
+            <a:pPr lvl="1">
+              <a:buFont typeface="+mj-lt"/>
+              <a:buAutoNum type="arabicPeriod"/>
+            </a:pPr>
+            <a:r>
+              <a:rPr lang="en-US" sz="1200" dirty="0"/>
+              <a:t>&lt;contribution&gt;</a:t>
+            </a:r>
+          </a:p>
+          <a:p>
+            <a:pPr>
+              <a:buFont typeface="+mj-lt"/>
+              <a:buAutoNum type="arabicPeriod"/>
+            </a:pPr>
+            <a:r>
+              <a:rPr lang="en-US" sz="1600" dirty="0" err="1"/>
+              <a:t>Aarti</a:t>
+            </a:r>
+            <a:r>
+              <a:rPr lang="en-US" sz="1600" dirty="0"/>
+              <a:t> Rao </a:t>
+            </a:r>
+            <a:r>
+              <a:rPr lang="en-US" sz="1600" dirty="0" err="1"/>
+              <a:t>Manjeshwar</a:t>
+            </a:r>
+            <a:r>
+              <a:rPr lang="en-US" sz="1600" dirty="0"/>
+              <a:t> </a:t>
+            </a:r>
+            <a:r>
+              <a:rPr lang="mr-IN" sz="1600" dirty="0"/>
+              <a:t>–</a:t>
+            </a:r>
+            <a:r>
+              <a:rPr lang="en-US" sz="1600" dirty="0"/>
+              <a:t> 1209163211 - </a:t>
+            </a:r>
+            <a:r>
+              <a:rPr lang="en-US" sz="1600" dirty="0">
+                <a:hlinkClick r:id="rId4"/>
+              </a:rPr>
+              <a:t>amanjesh@asu.edu</a:t>
+            </a:r>
+            <a:r>
+              <a:rPr lang="en-US" sz="1600" dirty="0"/>
+              <a:t> </a:t>
+            </a:r>
+            <a:r>
+              <a:rPr lang="mr-IN" sz="1600" dirty="0"/>
+              <a:t>–</a:t>
+            </a:r>
+            <a:r>
+              <a:rPr lang="en-US" sz="1600" dirty="0"/>
+              <a:t> 20% </a:t>
+            </a:r>
+            <a:r>
+              <a:rPr lang="en-US" sz="1600" dirty="0" smtClean="0"/>
+              <a:t>contribution</a:t>
+            </a:r>
+          </a:p>
+          <a:p>
+            <a:pPr lvl="1">
+              <a:buFont typeface="+mj-lt"/>
+              <a:buAutoNum type="arabicPeriod"/>
+            </a:pPr>
+            <a:r>
+              <a:rPr lang="en-US" sz="1200" dirty="0"/>
+              <a:t>&lt;contribution&gt;</a:t>
+            </a:r>
+          </a:p>
+          <a:p>
+            <a:pPr>
+              <a:buFont typeface="+mj-lt"/>
+              <a:buAutoNum type="arabicPeriod"/>
+            </a:pPr>
+            <a:r>
+              <a:rPr lang="en-US" sz="1600" dirty="0" err="1"/>
+              <a:t>Shwetha</a:t>
+            </a:r>
+            <a:r>
+              <a:rPr lang="en-US" sz="1600" dirty="0"/>
+              <a:t> Narayanan </a:t>
+            </a:r>
+            <a:r>
+              <a:rPr lang="mr-IN" sz="1600" dirty="0"/>
+              <a:t>–</a:t>
+            </a:r>
+            <a:r>
+              <a:rPr lang="en-US" sz="1600" dirty="0"/>
+              <a:t> 1209166097 - </a:t>
+            </a:r>
+            <a:r>
+              <a:rPr lang="en-US" sz="1600" dirty="0">
+                <a:hlinkClick r:id="rId5"/>
+              </a:rPr>
+              <a:t>snaray36@asu.edu</a:t>
+            </a:r>
+            <a:r>
+              <a:rPr lang="en-US" sz="1600" dirty="0"/>
+              <a:t> </a:t>
+            </a:r>
+            <a:r>
+              <a:rPr lang="mr-IN" sz="1600" dirty="0"/>
+              <a:t>–</a:t>
+            </a:r>
+            <a:r>
+              <a:rPr lang="en-US" sz="1600" dirty="0"/>
+              <a:t> 20% </a:t>
+            </a:r>
+            <a:r>
+              <a:rPr lang="en-US" sz="1600" dirty="0" smtClean="0"/>
+              <a:t>contribution</a:t>
+            </a:r>
+          </a:p>
+          <a:p>
+            <a:pPr lvl="1">
+              <a:buFont typeface="+mj-lt"/>
+              <a:buAutoNum type="arabicPeriod"/>
+            </a:pPr>
+            <a:r>
+              <a:rPr lang="en-US" sz="1200" dirty="0"/>
+              <a:t>&lt;contribution&gt;</a:t>
+            </a:r>
+          </a:p>
+          <a:p>
+            <a:pPr>
+              <a:buFont typeface="+mj-lt"/>
+              <a:buAutoNum type="arabicPeriod"/>
+            </a:pPr>
+            <a:r>
+              <a:rPr lang="en-US" sz="1600" dirty="0"/>
+              <a:t>Ramanathan Nachiappan </a:t>
+            </a:r>
+            <a:r>
+              <a:rPr lang="mr-IN" sz="1600" dirty="0"/>
+              <a:t>–</a:t>
+            </a:r>
+            <a:r>
+              <a:rPr lang="en-US" sz="1600" dirty="0"/>
+              <a:t> 1210822532 </a:t>
+            </a:r>
+            <a:r>
+              <a:rPr lang="mr-IN" sz="1600" dirty="0"/>
+              <a:t>–</a:t>
+            </a:r>
+            <a:r>
+              <a:rPr lang="en-US" sz="1600" dirty="0"/>
+              <a:t> </a:t>
+            </a:r>
+            <a:r>
+              <a:rPr lang="en-US" sz="1600" dirty="0">
+                <a:hlinkClick r:id="rId6"/>
+              </a:rPr>
+              <a:t>rnachiap@asu.edu</a:t>
+            </a:r>
+            <a:r>
+              <a:rPr lang="en-US" sz="1600" dirty="0"/>
+              <a:t> - 20% </a:t>
+            </a:r>
+            <a:r>
+              <a:rPr lang="en-US" sz="1600" dirty="0" smtClean="0"/>
+              <a:t>contribution</a:t>
+            </a:r>
+          </a:p>
+          <a:p>
+            <a:pPr lvl="1">
+              <a:buFont typeface="+mj-lt"/>
+              <a:buAutoNum type="arabicPeriod"/>
+            </a:pPr>
+            <a:r>
+              <a:rPr lang="en-US" sz="1200" dirty="0"/>
+              <a:t>&lt;contribution&gt;</a:t>
+            </a:r>
+          </a:p>
+          <a:p>
+            <a:pPr marL="0" marR="0" lvl="0" indent="0" defTabSz="914400" eaLnBrk="1" fontAlgn="auto" latinLnBrk="0" hangingPunct="1">
+              <a:lnSpc>
+                <a:spcPct val="100000"/>
+              </a:lnSpc>
+              <a:spcBef>
+                <a:spcPts val="0"/>
+              </a:spcBef>
+              <a:spcAft>
+                <a:spcPts val="0"/>
+              </a:spcAft>
+              <a:buClrTx/>
+              <a:buSzTx/>
+              <a:buFontTx/>
+              <a:buNone/>
+              <a:tabLst/>
+              <a:defRPr/>
+            </a:pPr>
+            <a:endParaRPr lang="en-US" sz="2000" dirty="0"/>
+          </a:p>
+        </p:txBody>
+      </p:sp>
+      <p:sp>
+        <p:nvSpPr>
+          <p:cNvPr id="4" name="Slide Number Placeholder 3"/>
+          <p:cNvSpPr>
+            <a:spLocks noGrp="1"/>
+          </p:cNvSpPr>
+          <p:nvPr>
+            <p:ph type="sldNum" sz="quarter" idx="4"/>
+          </p:nvPr>
+        </p:nvSpPr>
+        <p:spPr/>
+        <p:txBody>
+          <a:bodyPr/>
+          <a:lstStyle/>
+          <a:p>
+            <a:pPr>
+              <a:defRPr/>
+            </a:pPr>
+            <a:r>
+              <a:rPr lang="en-US" smtClean="0"/>
+              <a:t>- </a:t>
+            </a:r>
+            <a:fld id="{5702A24C-C4CD-4510-A1DD-CEB556D2535A}" type="slidenum">
+              <a:rPr lang="en-US" smtClean="0"/>
+              <a:pPr>
+                <a:defRPr/>
+              </a:pPr>
+              <a:t>18</a:t>
+            </a:fld>
+            <a:r>
+              <a:rPr lang="en-US" smtClean="0"/>
+              <a:t> -</a:t>
+            </a:r>
+            <a:endParaRPr lang="en-US"/>
+          </a:p>
+        </p:txBody>
+      </p:sp>
+      <p:sp>
+        <p:nvSpPr>
+          <p:cNvPr id="5" name="Rectangle 4"/>
+          <p:cNvSpPr/>
+          <p:nvPr/>
+        </p:nvSpPr>
+        <p:spPr>
+          <a:xfrm>
+            <a:off x="446088" y="5707132"/>
+            <a:ext cx="8229600" cy="707886"/>
+          </a:xfrm>
+          <a:prstGeom prst="rect">
+            <a:avLst/>
+          </a:prstGeom>
+        </p:spPr>
+        <p:txBody>
+          <a:bodyPr wrap="square">
+            <a:spAutoFit/>
+          </a:bodyPr>
+          <a:lstStyle/>
+          <a:p>
+            <a:r>
+              <a:rPr lang="en-US" sz="2000" dirty="0" smtClean="0">
+                <a:latin typeface="Times" charset="0"/>
+                <a:ea typeface="Times" charset="0"/>
+                <a:cs typeface="Times" charset="0"/>
+              </a:rPr>
+              <a:t>“All </a:t>
+            </a:r>
+            <a:r>
+              <a:rPr lang="en-US" sz="2000" dirty="0">
+                <a:latin typeface="Times" charset="0"/>
+                <a:ea typeface="Times" charset="0"/>
+                <a:cs typeface="Times" charset="0"/>
+              </a:rPr>
+              <a:t>the team members agree on the team members’ contributions in terms of both (a) what s/he did and (b) the </a:t>
+            </a:r>
+            <a:r>
+              <a:rPr lang="en-US" sz="2000" dirty="0" smtClean="0">
+                <a:latin typeface="Times" charset="0"/>
+                <a:ea typeface="Times" charset="0"/>
+                <a:cs typeface="Times" charset="0"/>
+              </a:rPr>
+              <a:t>percentage”</a:t>
+            </a:r>
+            <a:endParaRPr lang="en-US" sz="2000" dirty="0">
+              <a:effectLst/>
+              <a:latin typeface="Times" charset="0"/>
+              <a:ea typeface="Times" charset="0"/>
+              <a:cs typeface="Times" charset="0"/>
+            </a:endParaRPr>
+          </a:p>
+        </p:txBody>
+      </p:sp>
+    </p:spTree>
+    <p:extLst>
+      <p:ext uri="{BB962C8B-B14F-4D97-AF65-F5344CB8AC3E}">
+        <p14:creationId xmlns:p14="http://schemas.microsoft.com/office/powerpoint/2010/main" val="1394230669"/>
+      </p:ext>
+    </p:extLst>
+  </p:cSld>
+  <p:clrMapOvr>
+    <a:masterClrMapping/>
+  </p:clrMapOvr>
+</p:sld>
+</file>
+
+<file path=ppt/slides/slide19.xml><?xml version="1.0" encoding="utf-8"?>
+<p:sld xmlns:a="http://schemas.openxmlformats.org/drawingml/2006/main" xmlns:r="http://schemas.openxmlformats.org/officeDocument/2006/relationships" xmlns:p="http://schemas.openxmlformats.org/presentationml/2006/main">
+  <p:cSld>
+    <p:spTree>
+      <p:nvGrpSpPr>
+        <p:cNvPr id="1" name=""/>
+        <p:cNvGrpSpPr/>
+        <p:nvPr/>
+      </p:nvGrpSpPr>
+      <p:grpSpPr>
+        <a:xfrm>
+          <a:off x="0" y="0"/>
+          <a:ext cx="0" cy="0"/>
+          <a:chOff x="0" y="0"/>
+          <a:chExt cx="0" cy="0"/>
+        </a:xfrm>
+      </p:grpSpPr>
+      <p:sp>
+        <p:nvSpPr>
+          <p:cNvPr id="2" name="Title 1"/>
+          <p:cNvSpPr>
+            <a:spLocks noGrp="1"/>
+          </p:cNvSpPr>
+          <p:nvPr>
+            <p:ph type="title"/>
+          </p:nvPr>
+        </p:nvSpPr>
+        <p:spPr/>
+        <p:txBody>
+          <a:bodyPr/>
+          <a:lstStyle/>
+          <a:p>
+            <a:r>
+              <a:rPr lang="en-US" dirty="0" smtClean="0"/>
+              <a:t>Thank You!</a:t>
+            </a:r>
+            <a:endParaRPr lang="en-US" dirty="0"/>
+          </a:p>
+        </p:txBody>
+      </p:sp>
+      <p:sp>
+        <p:nvSpPr>
+          <p:cNvPr id="4" name="Slide Number Placeholder 3"/>
+          <p:cNvSpPr>
+            <a:spLocks noGrp="1"/>
+          </p:cNvSpPr>
+          <p:nvPr>
+            <p:ph type="sldNum" sz="quarter" idx="4"/>
+          </p:nvPr>
+        </p:nvSpPr>
+        <p:spPr/>
+        <p:txBody>
+          <a:bodyPr/>
+          <a:lstStyle/>
+          <a:p>
+            <a:pPr>
+              <a:defRPr/>
+            </a:pPr>
+            <a:r>
+              <a:rPr lang="en-US" smtClean="0"/>
+              <a:t>- </a:t>
+            </a:r>
+            <a:fld id="{5702A24C-C4CD-4510-A1DD-CEB556D2535A}" type="slidenum">
+              <a:rPr lang="en-US" smtClean="0"/>
+              <a:pPr>
+                <a:defRPr/>
+              </a:pPr>
+              <a:t>19</a:t>
             </a:fld>
             <a:r>
               <a:rPr lang="en-US" smtClean="0"/>
@@ -9884,10 +10093,10 @@
           <a:lstStyle/>
           <a:p>
             <a:r>
-              <a:rPr lang="en-US" dirty="0" smtClean="0"/>
-              <a:t>AR Modeling</a:t>
-            </a:r>
-            <a:endParaRPr lang="en-US" dirty="0"/>
+              <a:rPr lang="en-US" sz="3200" dirty="0" smtClean="0"/>
+              <a:t>Baseline Prediction for Time Series</a:t>
+            </a:r>
+            <a:endParaRPr lang="en-US" sz="3200" dirty="0"/>
           </a:p>
         </p:txBody>
       </p:sp>
@@ -9906,7 +10115,87 @@
           <a:bodyPr/>
           <a:lstStyle/>
           <a:p>
-            <a:endParaRPr lang="en-US" sz="2000" dirty="0"/>
+            <a:r>
+              <a:rPr lang="en-US" sz="2000" dirty="0" smtClean="0"/>
+              <a:t>A baseline prediction is a starting point helps us in time series to determine how well our model performs on time series</a:t>
+            </a:r>
+          </a:p>
+          <a:p>
+            <a:r>
+              <a:rPr lang="en-US" sz="2000" dirty="0" smtClean="0"/>
+              <a:t>We used the persistence algorithm in establishing the baseline performance</a:t>
+            </a:r>
+          </a:p>
+          <a:p>
+            <a:r>
+              <a:rPr lang="en-US" sz="2000" dirty="0" smtClean="0"/>
+              <a:t>Persistence Algorithm:</a:t>
+            </a:r>
+          </a:p>
+          <a:p>
+            <a:pPr lvl="1"/>
+            <a:r>
+              <a:rPr lang="en-US" sz="1600" dirty="0" smtClean="0"/>
+              <a:t>Also called “Naïve” Forecast which is equivalent to the ‘Zero Rule’ algorithm</a:t>
+            </a:r>
+          </a:p>
+          <a:p>
+            <a:pPr lvl="1"/>
+            <a:r>
+              <a:rPr lang="en-US" sz="1600" dirty="0" smtClean="0"/>
+              <a:t>This algorithm uses the value at the previous time step t-1 (input) to predict the outcome in the next time step t+1 (output)</a:t>
+            </a:r>
+          </a:p>
+          <a:p>
+            <a:r>
+              <a:rPr lang="en-US" sz="2000" dirty="0" smtClean="0"/>
+              <a:t>Dataset split </a:t>
+            </a:r>
+            <a:r>
+              <a:rPr lang="mr-IN" sz="2000" dirty="0" smtClean="0"/>
+              <a:t>–</a:t>
+            </a:r>
+            <a:r>
+              <a:rPr lang="en-US" sz="2000" dirty="0" smtClean="0"/>
+              <a:t> Training -2/3</a:t>
+            </a:r>
+            <a:r>
+              <a:rPr lang="en-US" sz="2000" baseline="30000" dirty="0" smtClean="0"/>
+              <a:t>rd</a:t>
+            </a:r>
+            <a:r>
+              <a:rPr lang="en-US" sz="2000" dirty="0" smtClean="0"/>
+              <a:t> and Testing </a:t>
+            </a:r>
+            <a:r>
+              <a:rPr lang="mr-IN" sz="2000" dirty="0" smtClean="0"/>
+              <a:t>–</a:t>
+            </a:r>
+            <a:r>
+              <a:rPr lang="en-US" sz="2000" dirty="0" smtClean="0"/>
+              <a:t> 1/3</a:t>
+            </a:r>
+            <a:r>
+              <a:rPr lang="en-US" sz="2000" baseline="30000" dirty="0" smtClean="0"/>
+              <a:t>rd</a:t>
+            </a:r>
+            <a:r>
+              <a:rPr lang="en-US" sz="2000" dirty="0" smtClean="0"/>
+              <a:t> </a:t>
+            </a:r>
+          </a:p>
+          <a:p>
+            <a:r>
+              <a:rPr lang="en-US" sz="2000" dirty="0" smtClean="0"/>
+              <a:t>This assumes nothing about the specifics about the time series to which it is applied, thus making it naïve and establishing a baseline performance</a:t>
+            </a:r>
+          </a:p>
+          <a:p>
+            <a:endParaRPr lang="en-US" sz="2000" dirty="0" smtClean="0"/>
+          </a:p>
+          <a:p>
+            <a:pPr lvl="1"/>
+            <a:endParaRPr lang="en-US" sz="1600" dirty="0"/>
           </a:p>
         </p:txBody>
       </p:sp>
@@ -9950,7 +10239,7 @@
     </p:spTree>
     <p:extLst>
       <p:ext uri="{BB962C8B-B14F-4D97-AF65-F5344CB8AC3E}">
-        <p14:creationId xmlns:p14="http://schemas.microsoft.com/office/powerpoint/2010/main" val="1256808137"/>
+        <p14:creationId xmlns:p14="http://schemas.microsoft.com/office/powerpoint/2010/main" val="1789868052"/>
       </p:ext>
     </p:extLst>
   </p:cSld>

</xml_diff>